<commit_message>
Added interests of JDW.
</commit_message>
<xml_diff>
--- a/Meeting20150425/Lack of manpower.pptx
+++ b/Meeting20150425/Lack of manpower.pptx
@@ -30265,7 +30265,7 @@
             <a:tbl>
               <a:tblPr>
                 <a:noFill/>
-                <a:tableStyleId>{05147E63-ADB0-40CD-B8A2-FBFEE0036C93}</a:tableStyleId>
+                <a:tableStyleId>{35ABD89E-17CB-4E56-9983-AB5270A396F7}</a:tableStyleId>
               </a:tblPr>
               <a:tblGrid>
                 <a:gridCol w="3619500"/>
@@ -30814,7 +30814,7 @@
             <a:tbl>
               <a:tblPr>
                 <a:noFill/>
-                <a:tableStyleId>{B4E059EE-2E02-4B30-A16F-025A9C2C113A}</a:tableStyleId>
+                <a:tableStyleId>{452E9DBA-B1F4-4388-A688-84F654DD658E}</a:tableStyleId>
               </a:tblPr>
               <a:tblGrid>
                 <a:gridCol w="3619500"/>
@@ -31291,7 +31291,7 @@
             <a:tbl>
               <a:tblPr>
                 <a:noFill/>
-                <a:tableStyleId>{FA37E64D-150B-41C6-9A9C-F708D399AC72}</a:tableStyleId>
+                <a:tableStyleId>{73651CF9-8D56-44BA-80FA-1C719FAD9A30}</a:tableStyleId>
               </a:tblPr>
               <a:tblGrid>
                 <a:gridCol w="3619500"/>
@@ -31768,7 +31768,7 @@
             <a:tbl>
               <a:tblPr>
                 <a:noFill/>
-                <a:tableStyleId>{A85FC733-2337-4F93-BD44-99C139D66CAC}</a:tableStyleId>
+                <a:tableStyleId>{42DB3454-8967-4E0D-943C-25D0B5114F27}</a:tableStyleId>
               </a:tblPr>
               <a:tblGrid>
                 <a:gridCol w="3619500"/>
@@ -32317,7 +32317,7 @@
             <a:tbl>
               <a:tblPr>
                 <a:noFill/>
-                <a:tableStyleId>{51371BDA-0AB1-4B82-8852-0006E3B6047B}</a:tableStyleId>
+                <a:tableStyleId>{DFDC708A-84DA-4B9D-93AE-F2737AAEAA97}</a:tableStyleId>
               </a:tblPr>
               <a:tblGrid>
                 <a:gridCol w="3619500"/>
@@ -32794,7 +32794,7 @@
             <a:tbl>
               <a:tblPr>
                 <a:noFill/>
-                <a:tableStyleId>{36A6A9C2-1A82-4AEC-96F0-7D2DFE8CE0B9}</a:tableStyleId>
+                <a:tableStyleId>{99378CF3-BFF5-4BB5-AF36-8B4B3C17E94D}</a:tableStyleId>
               </a:tblPr>
               <a:tblGrid>
                 <a:gridCol w="3619500"/>
@@ -32972,9 +32972,9 @@
                         <a:buNone/>
                       </a:pPr>
                       <a:r>
-                        <a:t/>
+                        <a:rPr lang="nl"/>
+                        <a:t>?</a:t>
                       </a:r>
-                      <a:endParaRPr/>
                     </a:p>
                   </a:txBody>
                   <a:tcPr marT="91425" marB="91425" marR="91425" marL="91425"/>
@@ -33016,9 +33016,13 @@
                         <a:buNone/>
                       </a:pPr>
                       <a:r>
-                        <a:t/>
+                        <a:rPr lang="nl">
+                          <a:solidFill>
+                            <a:srgbClr val="00FF00"/>
+                          </a:solidFill>
+                        </a:rPr>
+                        <a:t>V (asterisms: lead)</a:t>
                       </a:r>
-                      <a:endParaRPr/>
                     </a:p>
                   </a:txBody>
                   <a:tcPr marT="91425" marB="91425" marR="91425" marL="91425"/>
@@ -33060,9 +33064,9 @@
                         <a:buNone/>
                       </a:pPr>
                       <a:r>
-                        <a:t/>
+                        <a:rPr lang="nl"/>
+                        <a:t>?</a:t>
                       </a:r>
-                      <a:endParaRPr/>
                     </a:p>
                   </a:txBody>
                   <a:tcPr marT="91425" marB="91425" marR="91425" marL="91425"/>
@@ -33104,9 +33108,9 @@
                         <a:buNone/>
                       </a:pPr>
                       <a:r>
-                        <a:t/>
+                        <a:rPr lang="nl"/>
+                        <a:t>?</a:t>
                       </a:r>
-                      <a:endParaRPr/>
                     </a:p>
                   </a:txBody>
                   <a:tcPr marT="91425" marB="91425" marR="91425" marL="91425"/>
@@ -33148,9 +33152,13 @@
                         <a:buNone/>
                       </a:pPr>
                       <a:r>
-                        <a:t/>
+                        <a:rPr lang="nl">
+                          <a:solidFill>
+                            <a:srgbClr val="FF0000"/>
+                          </a:solidFill>
+                        </a:rPr>
+                        <a:t>X</a:t>
                       </a:r>
-                      <a:endParaRPr/>
                     </a:p>
                   </a:txBody>
                   <a:tcPr marT="91425" marB="91425" marR="91425" marL="91425"/>
@@ -33192,9 +33200,13 @@
                         <a:buNone/>
                       </a:pPr>
                       <a:r>
-                        <a:t/>
+                        <a:rPr lang="nl">
+                          <a:solidFill>
+                            <a:srgbClr val="00FF00"/>
+                          </a:solidFill>
+                        </a:rPr>
+                        <a:t>V (French)</a:t>
                       </a:r>
-                      <a:endParaRPr/>
                     </a:p>
                   </a:txBody>
                   <a:tcPr marT="91425" marB="91425" marR="91425" marL="91425"/>
@@ -33319,7 +33331,7 @@
             <a:tbl>
               <a:tblPr>
                 <a:noFill/>
-                <a:tableStyleId>{C03CEE75-20F7-4764-92C7-227B77821EE0}</a:tableStyleId>
+                <a:tableStyleId>{0F185DA8-8ED1-4B27-8D18-E0654D99A653}</a:tableStyleId>
               </a:tblPr>
               <a:tblGrid>
                 <a:gridCol w="3619500"/>

</xml_diff>

<commit_message>
Added availability of JDW.
</commit_message>
<xml_diff>
--- a/Meeting20150425/Lack of manpower.pptx
+++ b/Meeting20150425/Lack of manpower.pptx
@@ -30265,7 +30265,7 @@
             <a:tbl>
               <a:tblPr>
                 <a:noFill/>
-                <a:tableStyleId>{35ABD89E-17CB-4E56-9983-AB5270A396F7}</a:tableStyleId>
+                <a:tableStyleId>{0BC1FBB6-F04C-420D-B3E1-8E79F56C9579}</a:tableStyleId>
               </a:tblPr>
               <a:tblGrid>
                 <a:gridCol w="3619500"/>
@@ -30814,7 +30814,7 @@
             <a:tbl>
               <a:tblPr>
                 <a:noFill/>
-                <a:tableStyleId>{452E9DBA-B1F4-4388-A688-84F654DD658E}</a:tableStyleId>
+                <a:tableStyleId>{90AD7B7B-C225-4A48-ACD4-69576CDBA7E0}</a:tableStyleId>
               </a:tblPr>
               <a:tblGrid>
                 <a:gridCol w="3619500"/>
@@ -31291,7 +31291,7 @@
             <a:tbl>
               <a:tblPr>
                 <a:noFill/>
-                <a:tableStyleId>{73651CF9-8D56-44BA-80FA-1C719FAD9A30}</a:tableStyleId>
+                <a:tableStyleId>{70D44EBE-3112-42A9-B50B-D39B157FB8B3}</a:tableStyleId>
               </a:tblPr>
               <a:tblGrid>
                 <a:gridCol w="3619500"/>
@@ -31768,7 +31768,7 @@
             <a:tbl>
               <a:tblPr>
                 <a:noFill/>
-                <a:tableStyleId>{42DB3454-8967-4E0D-943C-25D0B5114F27}</a:tableStyleId>
+                <a:tableStyleId>{1A805F8A-0E14-44CD-86D9-8F55B72DDFF6}</a:tableStyleId>
               </a:tblPr>
               <a:tblGrid>
                 <a:gridCol w="3619500"/>
@@ -32317,7 +32317,7 @@
             <a:tbl>
               <a:tblPr>
                 <a:noFill/>
-                <a:tableStyleId>{DFDC708A-84DA-4B9D-93AE-F2737AAEAA97}</a:tableStyleId>
+                <a:tableStyleId>{AAA811F6-21D2-44E7-B18C-B693A088D4EE}</a:tableStyleId>
               </a:tblPr>
               <a:tblGrid>
                 <a:gridCol w="3619500"/>
@@ -32740,6 +32740,10 @@
               <a:rPr lang="nl"/>
               <a:t>JDW</a:t>
             </a:r>
+            <a:r>
+              <a:rPr lang="nl" sz="2400"/>
+              <a:t>, not before July</a:t>
+            </a:r>
           </a:p>
         </p:txBody>
       </p:sp>
@@ -32794,7 +32798,7 @@
             <a:tbl>
               <a:tblPr>
                 <a:noFill/>
-                <a:tableStyleId>{99378CF3-BFF5-4BB5-AF36-8B4B3C17E94D}</a:tableStyleId>
+                <a:tableStyleId>{0B4E03C1-9374-4960-AE57-F2553D14477F}</a:tableStyleId>
               </a:tblPr>
               <a:tblGrid>
                 <a:gridCol w="3619500"/>
@@ -33331,7 +33335,7 @@
             <a:tbl>
               <a:tblPr>
                 <a:noFill/>
-                <a:tableStyleId>{0F185DA8-8ED1-4B27-8D18-E0654D99A653}</a:tableStyleId>
+                <a:tableStyleId>{2000785D-C8BD-4395-81AC-27520309F939}</a:tableStyleId>
               </a:tblPr>
               <a:tblGrid>
                 <a:gridCol w="3619500"/>
@@ -33705,283 +33709,6 @@
 </file>
 
 <file path=ppt/theme/theme1.xml><?xml version="1.0" encoding="utf-8"?>
-<a:theme xmlns:a="http://schemas.openxmlformats.org/drawingml/2006/main" xmlns:r="http://schemas.openxmlformats.org/officeDocument/2006/relationships" name="Custom Theme">
-  <a:themeElements>
-    <a:clrScheme name="Default">
-      <a:dk1>
-        <a:srgbClr val="000000"/>
-      </a:dk1>
-      <a:lt1>
-        <a:srgbClr val="FFFFFF"/>
-      </a:lt1>
-      <a:dk2>
-        <a:srgbClr val="158158"/>
-      </a:dk2>
-      <a:lt2>
-        <a:srgbClr val="F3F3F3"/>
-      </a:lt2>
-      <a:accent1>
-        <a:srgbClr val="058DC7"/>
-      </a:accent1>
-      <a:accent2>
-        <a:srgbClr val="50B432"/>
-      </a:accent2>
-      <a:accent3>
-        <a:srgbClr val="ED561B"/>
-      </a:accent3>
-      <a:accent4>
-        <a:srgbClr val="EDEF00"/>
-      </a:accent4>
-      <a:accent5>
-        <a:srgbClr val="24CBE5"/>
-      </a:accent5>
-      <a:accent6>
-        <a:srgbClr val="64E572"/>
-      </a:accent6>
-      <a:hlink>
-        <a:srgbClr val="2200CC"/>
-      </a:hlink>
-      <a:folHlink>
-        <a:srgbClr val="551A8B"/>
-      </a:folHlink>
-    </a:clrScheme>
-    <a:fontScheme name="Office">
-      <a:majorFont>
-        <a:latin typeface="Arial"/>
-        <a:ea typeface=""/>
-        <a:cs typeface=""/>
-        <a:font script="Jpan" typeface="ＭＳ Ｐゴシック"/>
-        <a:font script="Hang" typeface="맑은 고딕"/>
-        <a:font script="Hans" typeface="宋体"/>
-        <a:font script="Hant" typeface="新細明體"/>
-        <a:font script="Arab" typeface="Times New Roman"/>
-        <a:font script="Hebr" typeface="Times New Roman"/>
-        <a:font script="Thai" typeface="Angsana New"/>
-        <a:font script="Ethi" typeface="Nyala"/>
-        <a:font script="Beng" typeface="Vrinda"/>
-        <a:font script="Gujr" typeface="Shruti"/>
-        <a:font script="Khmr" typeface="MoolBoran"/>
-        <a:font script="Knda" typeface="Tunga"/>
-        <a:font script="Guru" typeface="Raavi"/>
-        <a:font script="Cans" typeface="Euphemia"/>
-        <a:font script="Cher" typeface="Plantagenet Cherokee"/>
-        <a:font script="Yiii" typeface="Microsoft Yi Baiti"/>
-        <a:font script="Tibt" typeface="Microsoft Himalaya"/>
-        <a:font script="Thaa" typeface="MV Boli"/>
-        <a:font script="Deva" typeface="Mangal"/>
-        <a:font script="Telu" typeface="Gautami"/>
-        <a:font script="Taml" typeface="Latha"/>
-        <a:font script="Syrc" typeface="Estrangelo Edessa"/>
-        <a:font script="Orya" typeface="Kalinga"/>
-        <a:font script="Mlym" typeface="Kartika"/>
-        <a:font script="Laoo" typeface="DokChampa"/>
-        <a:font script="Sinh" typeface="Iskoola Pota"/>
-        <a:font script="Mong" typeface="Mongolian Baiti"/>
-        <a:font script="Viet" typeface="Times New Roman"/>
-        <a:font script="Uigh" typeface="Microsoft Uighur"/>
-      </a:majorFont>
-      <a:minorFont>
-        <a:latin typeface="Arial"/>
-        <a:ea typeface=""/>
-        <a:cs typeface=""/>
-        <a:font script="Jpan" typeface="ＭＳ Ｐゴシック"/>
-        <a:font script="Hang" typeface="맑은 고딕"/>
-        <a:font script="Hans" typeface="宋体"/>
-        <a:font script="Hant" typeface="新細明體"/>
-        <a:font script="Arab" typeface="Times New Roman"/>
-        <a:font script="Hebr" typeface="Times New Roman"/>
-        <a:font script="Thai" typeface="Angsana New"/>
-        <a:font script="Ethi" typeface="Nyala"/>
-        <a:font script="Beng" typeface="Vrinda"/>
-        <a:font script="Gujr" typeface="Shruti"/>
-        <a:font script="Khmr" typeface="MoolBoran"/>
-        <a:font script="Knda" typeface="Tunga"/>
-        <a:font script="Guru" typeface="Raavi"/>
-        <a:font script="Cans" typeface="Euphemia"/>
-        <a:font script="Cher" typeface="Plantagenet Cherokee"/>
-        <a:font script="Yiii" typeface="Microsoft Yi Baiti"/>
-        <a:font script="Tibt" typeface="Microsoft Himalaya"/>
-        <a:font script="Thaa" typeface="MV Boli"/>
-        <a:font script="Deva" typeface="Mangal"/>
-        <a:font script="Telu" typeface="Gautami"/>
-        <a:font script="Taml" typeface="Latha"/>
-        <a:font script="Syrc" typeface="Estrangelo Edessa"/>
-        <a:font script="Orya" typeface="Kalinga"/>
-        <a:font script="Mlym" typeface="Kartika"/>
-        <a:font script="Laoo" typeface="DokChampa"/>
-        <a:font script="Sinh" typeface="Iskoola Pota"/>
-        <a:font script="Mong" typeface="Mongolian Baiti"/>
-        <a:font script="Viet" typeface="Times New Roman"/>
-        <a:font script="Uigh" typeface="Microsoft Uighur"/>
-      </a:minorFont>
-    </a:fontScheme>
-    <a:fmtScheme name="Office">
-      <a:fillStyleLst>
-        <a:solidFill>
-          <a:schemeClr val="phClr"/>
-        </a:solidFill>
-        <a:gradFill rotWithShape="1">
-          <a:gsLst>
-            <a:gs pos="0">
-              <a:schemeClr val="phClr">
-                <a:tint val="50000"/>
-                <a:satMod val="300000"/>
-              </a:schemeClr>
-            </a:gs>
-            <a:gs pos="35000">
-              <a:schemeClr val="phClr">
-                <a:tint val="37000"/>
-                <a:satMod val="300000"/>
-              </a:schemeClr>
-            </a:gs>
-            <a:gs pos="100000">
-              <a:schemeClr val="phClr">
-                <a:tint val="15000"/>
-                <a:satMod val="350000"/>
-              </a:schemeClr>
-            </a:gs>
-          </a:gsLst>
-          <a:lin ang="16200000" scaled="1"/>
-        </a:gradFill>
-        <a:gradFill rotWithShape="1">
-          <a:gsLst>
-            <a:gs pos="0">
-              <a:schemeClr val="phClr">
-                <a:tint val="100000"/>
-                <a:shade val="100000"/>
-                <a:satMod val="130000"/>
-              </a:schemeClr>
-            </a:gs>
-            <a:gs pos="100000">
-              <a:schemeClr val="phClr">
-                <a:tint val="50000"/>
-                <a:shade val="100000"/>
-                <a:satMod val="350000"/>
-              </a:schemeClr>
-            </a:gs>
-          </a:gsLst>
-          <a:lin ang="16200000" scaled="0"/>
-        </a:gradFill>
-      </a:fillStyleLst>
-      <a:lnStyleLst>
-        <a:ln cap="flat" cmpd="sng" w="9525" algn="ctr">
-          <a:solidFill>
-            <a:schemeClr val="phClr">
-              <a:shade val="95000"/>
-              <a:satMod val="105000"/>
-            </a:schemeClr>
-          </a:solidFill>
-          <a:prstDash val="solid"/>
-        </a:ln>
-        <a:ln cap="flat" cmpd="sng" w="25400" algn="ctr">
-          <a:solidFill>
-            <a:schemeClr val="phClr"/>
-          </a:solidFill>
-          <a:prstDash val="solid"/>
-        </a:ln>
-        <a:ln cap="flat" cmpd="sng" w="38100" algn="ctr">
-          <a:solidFill>
-            <a:schemeClr val="phClr"/>
-          </a:solidFill>
-          <a:prstDash val="solid"/>
-        </a:ln>
-      </a:lnStyleLst>
-      <a:effectStyleLst>
-        <a:effectStyle>
-          <a:effectLst>
-            <a:outerShdw blurRad="40000" rotWithShape="0" dir="5400000" dist="20000">
-              <a:srgbClr val="000000">
-                <a:alpha val="38000"/>
-              </a:srgbClr>
-            </a:outerShdw>
-          </a:effectLst>
-        </a:effectStyle>
-        <a:effectStyle>
-          <a:effectLst>
-            <a:outerShdw blurRad="40000" rotWithShape="0" dir="5400000" dist="23000">
-              <a:srgbClr val="000000">
-                <a:alpha val="35000"/>
-              </a:srgbClr>
-            </a:outerShdw>
-          </a:effectLst>
-        </a:effectStyle>
-        <a:effectStyle>
-          <a:effectLst>
-            <a:outerShdw blurRad="40000" rotWithShape="0" dir="5400000" dist="23000">
-              <a:srgbClr val="000000">
-                <a:alpha val="35000"/>
-              </a:srgbClr>
-            </a:outerShdw>
-          </a:effectLst>
-          <a:scene3d>
-            <a:camera prst="orthographicFront">
-              <a:rot lat="0" lon="0" rev="0"/>
-            </a:camera>
-            <a:lightRig dir="t" rig="threePt">
-              <a:rot lat="0" lon="0" rev="1200000"/>
-            </a:lightRig>
-          </a:scene3d>
-          <a:sp3d>
-            <a:bevelT h="25400" w="63500"/>
-          </a:sp3d>
-        </a:effectStyle>
-      </a:effectStyleLst>
-      <a:bgFillStyleLst>
-        <a:solidFill>
-          <a:schemeClr val="phClr"/>
-        </a:solidFill>
-        <a:gradFill rotWithShape="1">
-          <a:gsLst>
-            <a:gs pos="0">
-              <a:schemeClr val="phClr">
-                <a:tint val="40000"/>
-                <a:satMod val="350000"/>
-              </a:schemeClr>
-            </a:gs>
-            <a:gs pos="40000">
-              <a:schemeClr val="phClr">
-                <a:tint val="45000"/>
-                <a:shade val="99000"/>
-                <a:satMod val="350000"/>
-              </a:schemeClr>
-            </a:gs>
-            <a:gs pos="100000">
-              <a:schemeClr val="phClr">
-                <a:shade val="20000"/>
-                <a:satMod val="255000"/>
-              </a:schemeClr>
-            </a:gs>
-          </a:gsLst>
-          <a:path path="circle">
-            <a:fillToRect b="180000" l="50000" r="50000" t="-80000"/>
-          </a:path>
-        </a:gradFill>
-        <a:gradFill rotWithShape="1">
-          <a:gsLst>
-            <a:gs pos="0">
-              <a:schemeClr val="phClr">
-                <a:tint val="80000"/>
-                <a:satMod val="300000"/>
-              </a:schemeClr>
-            </a:gs>
-            <a:gs pos="100000">
-              <a:schemeClr val="phClr">
-                <a:shade val="30000"/>
-                <a:satMod val="200000"/>
-              </a:schemeClr>
-            </a:gs>
-          </a:gsLst>
-          <a:path path="circle">
-            <a:fillToRect b="50000" l="50000" r="50000" t="50000"/>
-          </a:path>
-        </a:gradFill>
-      </a:bgFillStyleLst>
-    </a:fmtScheme>
-  </a:themeElements>
-</a:theme>
-</file>
-
-<file path=ppt/theme/theme2.xml><?xml version="1.0" encoding="utf-8"?>
 <a:theme xmlns:a="http://schemas.openxmlformats.org/drawingml/2006/main" xmlns:r="http://schemas.openxmlformats.org/officeDocument/2006/relationships" name="sketched">
   <a:themeElements>
     <a:clrScheme name="Custom 398">
@@ -34258,7 +33985,7 @@
 </a:theme>
 </file>
 
-<file path=ppt/theme/theme3.xml><?xml version="1.0" encoding="utf-8"?>
+<file path=ppt/theme/theme2.xml><?xml version="1.0" encoding="utf-8"?>
 <a:theme xmlns:a="http://schemas.openxmlformats.org/drawingml/2006/main" xmlns:r="http://schemas.openxmlformats.org/officeDocument/2006/relationships" name="Office Theme">
   <a:themeElements>
     <a:clrScheme name="Office">
@@ -34573,4 +34300,281 @@
     </a:lnDef>
   </a:objectDefaults>
 </a:theme>
+</file>
+
+<file path=ppt/theme/theme3.xml><?xml version="1.0" encoding="utf-8"?>
+<a:theme xmlns:a="http://schemas.openxmlformats.org/drawingml/2006/main" xmlns:r="http://schemas.openxmlformats.org/officeDocument/2006/relationships" name="Custom Theme">
+  <a:themeElements>
+    <a:clrScheme name="Default">
+      <a:dk1>
+        <a:srgbClr val="000000"/>
+      </a:dk1>
+      <a:lt1>
+        <a:srgbClr val="FFFFFF"/>
+      </a:lt1>
+      <a:dk2>
+        <a:srgbClr val="158158"/>
+      </a:dk2>
+      <a:lt2>
+        <a:srgbClr val="F3F3F3"/>
+      </a:lt2>
+      <a:accent1>
+        <a:srgbClr val="058DC7"/>
+      </a:accent1>
+      <a:accent2>
+        <a:srgbClr val="50B432"/>
+      </a:accent2>
+      <a:accent3>
+        <a:srgbClr val="ED561B"/>
+      </a:accent3>
+      <a:accent4>
+        <a:srgbClr val="EDEF00"/>
+      </a:accent4>
+      <a:accent5>
+        <a:srgbClr val="24CBE5"/>
+      </a:accent5>
+      <a:accent6>
+        <a:srgbClr val="64E572"/>
+      </a:accent6>
+      <a:hlink>
+        <a:srgbClr val="2200CC"/>
+      </a:hlink>
+      <a:folHlink>
+        <a:srgbClr val="551A8B"/>
+      </a:folHlink>
+    </a:clrScheme>
+    <a:fontScheme name="Office">
+      <a:majorFont>
+        <a:latin typeface="Arial"/>
+        <a:ea typeface=""/>
+        <a:cs typeface=""/>
+        <a:font script="Jpan" typeface="ＭＳ Ｐゴシック"/>
+        <a:font script="Hang" typeface="맑은 고딕"/>
+        <a:font script="Hans" typeface="宋体"/>
+        <a:font script="Hant" typeface="新細明體"/>
+        <a:font script="Arab" typeface="Times New Roman"/>
+        <a:font script="Hebr" typeface="Times New Roman"/>
+        <a:font script="Thai" typeface="Angsana New"/>
+        <a:font script="Ethi" typeface="Nyala"/>
+        <a:font script="Beng" typeface="Vrinda"/>
+        <a:font script="Gujr" typeface="Shruti"/>
+        <a:font script="Khmr" typeface="MoolBoran"/>
+        <a:font script="Knda" typeface="Tunga"/>
+        <a:font script="Guru" typeface="Raavi"/>
+        <a:font script="Cans" typeface="Euphemia"/>
+        <a:font script="Cher" typeface="Plantagenet Cherokee"/>
+        <a:font script="Yiii" typeface="Microsoft Yi Baiti"/>
+        <a:font script="Tibt" typeface="Microsoft Himalaya"/>
+        <a:font script="Thaa" typeface="MV Boli"/>
+        <a:font script="Deva" typeface="Mangal"/>
+        <a:font script="Telu" typeface="Gautami"/>
+        <a:font script="Taml" typeface="Latha"/>
+        <a:font script="Syrc" typeface="Estrangelo Edessa"/>
+        <a:font script="Orya" typeface="Kalinga"/>
+        <a:font script="Mlym" typeface="Kartika"/>
+        <a:font script="Laoo" typeface="DokChampa"/>
+        <a:font script="Sinh" typeface="Iskoola Pota"/>
+        <a:font script="Mong" typeface="Mongolian Baiti"/>
+        <a:font script="Viet" typeface="Times New Roman"/>
+        <a:font script="Uigh" typeface="Microsoft Uighur"/>
+      </a:majorFont>
+      <a:minorFont>
+        <a:latin typeface="Arial"/>
+        <a:ea typeface=""/>
+        <a:cs typeface=""/>
+        <a:font script="Jpan" typeface="ＭＳ Ｐゴシック"/>
+        <a:font script="Hang" typeface="맑은 고딕"/>
+        <a:font script="Hans" typeface="宋体"/>
+        <a:font script="Hant" typeface="新細明體"/>
+        <a:font script="Arab" typeface="Times New Roman"/>
+        <a:font script="Hebr" typeface="Times New Roman"/>
+        <a:font script="Thai" typeface="Angsana New"/>
+        <a:font script="Ethi" typeface="Nyala"/>
+        <a:font script="Beng" typeface="Vrinda"/>
+        <a:font script="Gujr" typeface="Shruti"/>
+        <a:font script="Khmr" typeface="MoolBoran"/>
+        <a:font script="Knda" typeface="Tunga"/>
+        <a:font script="Guru" typeface="Raavi"/>
+        <a:font script="Cans" typeface="Euphemia"/>
+        <a:font script="Cher" typeface="Plantagenet Cherokee"/>
+        <a:font script="Yiii" typeface="Microsoft Yi Baiti"/>
+        <a:font script="Tibt" typeface="Microsoft Himalaya"/>
+        <a:font script="Thaa" typeface="MV Boli"/>
+        <a:font script="Deva" typeface="Mangal"/>
+        <a:font script="Telu" typeface="Gautami"/>
+        <a:font script="Taml" typeface="Latha"/>
+        <a:font script="Syrc" typeface="Estrangelo Edessa"/>
+        <a:font script="Orya" typeface="Kalinga"/>
+        <a:font script="Mlym" typeface="Kartika"/>
+        <a:font script="Laoo" typeface="DokChampa"/>
+        <a:font script="Sinh" typeface="Iskoola Pota"/>
+        <a:font script="Mong" typeface="Mongolian Baiti"/>
+        <a:font script="Viet" typeface="Times New Roman"/>
+        <a:font script="Uigh" typeface="Microsoft Uighur"/>
+      </a:minorFont>
+    </a:fontScheme>
+    <a:fmtScheme name="Office">
+      <a:fillStyleLst>
+        <a:solidFill>
+          <a:schemeClr val="phClr"/>
+        </a:solidFill>
+        <a:gradFill rotWithShape="1">
+          <a:gsLst>
+            <a:gs pos="0">
+              <a:schemeClr val="phClr">
+                <a:tint val="50000"/>
+                <a:satMod val="300000"/>
+              </a:schemeClr>
+            </a:gs>
+            <a:gs pos="35000">
+              <a:schemeClr val="phClr">
+                <a:tint val="37000"/>
+                <a:satMod val="300000"/>
+              </a:schemeClr>
+            </a:gs>
+            <a:gs pos="100000">
+              <a:schemeClr val="phClr">
+                <a:tint val="15000"/>
+                <a:satMod val="350000"/>
+              </a:schemeClr>
+            </a:gs>
+          </a:gsLst>
+          <a:lin ang="16200000" scaled="1"/>
+        </a:gradFill>
+        <a:gradFill rotWithShape="1">
+          <a:gsLst>
+            <a:gs pos="0">
+              <a:schemeClr val="phClr">
+                <a:tint val="100000"/>
+                <a:shade val="100000"/>
+                <a:satMod val="130000"/>
+              </a:schemeClr>
+            </a:gs>
+            <a:gs pos="100000">
+              <a:schemeClr val="phClr">
+                <a:tint val="50000"/>
+                <a:shade val="100000"/>
+                <a:satMod val="350000"/>
+              </a:schemeClr>
+            </a:gs>
+          </a:gsLst>
+          <a:lin ang="16200000" scaled="0"/>
+        </a:gradFill>
+      </a:fillStyleLst>
+      <a:lnStyleLst>
+        <a:ln cap="flat" cmpd="sng" w="9525" algn="ctr">
+          <a:solidFill>
+            <a:schemeClr val="phClr">
+              <a:shade val="95000"/>
+              <a:satMod val="105000"/>
+            </a:schemeClr>
+          </a:solidFill>
+          <a:prstDash val="solid"/>
+        </a:ln>
+        <a:ln cap="flat" cmpd="sng" w="25400" algn="ctr">
+          <a:solidFill>
+            <a:schemeClr val="phClr"/>
+          </a:solidFill>
+          <a:prstDash val="solid"/>
+        </a:ln>
+        <a:ln cap="flat" cmpd="sng" w="38100" algn="ctr">
+          <a:solidFill>
+            <a:schemeClr val="phClr"/>
+          </a:solidFill>
+          <a:prstDash val="solid"/>
+        </a:ln>
+      </a:lnStyleLst>
+      <a:effectStyleLst>
+        <a:effectStyle>
+          <a:effectLst>
+            <a:outerShdw blurRad="40000" rotWithShape="0" dir="5400000" dist="20000">
+              <a:srgbClr val="000000">
+                <a:alpha val="38000"/>
+              </a:srgbClr>
+            </a:outerShdw>
+          </a:effectLst>
+        </a:effectStyle>
+        <a:effectStyle>
+          <a:effectLst>
+            <a:outerShdw blurRad="40000" rotWithShape="0" dir="5400000" dist="23000">
+              <a:srgbClr val="000000">
+                <a:alpha val="35000"/>
+              </a:srgbClr>
+            </a:outerShdw>
+          </a:effectLst>
+        </a:effectStyle>
+        <a:effectStyle>
+          <a:effectLst>
+            <a:outerShdw blurRad="40000" rotWithShape="0" dir="5400000" dist="23000">
+              <a:srgbClr val="000000">
+                <a:alpha val="35000"/>
+              </a:srgbClr>
+            </a:outerShdw>
+          </a:effectLst>
+          <a:scene3d>
+            <a:camera prst="orthographicFront">
+              <a:rot lat="0" lon="0" rev="0"/>
+            </a:camera>
+            <a:lightRig dir="t" rig="threePt">
+              <a:rot lat="0" lon="0" rev="1200000"/>
+            </a:lightRig>
+          </a:scene3d>
+          <a:sp3d>
+            <a:bevelT h="25400" w="63500"/>
+          </a:sp3d>
+        </a:effectStyle>
+      </a:effectStyleLst>
+      <a:bgFillStyleLst>
+        <a:solidFill>
+          <a:schemeClr val="phClr"/>
+        </a:solidFill>
+        <a:gradFill rotWithShape="1">
+          <a:gsLst>
+            <a:gs pos="0">
+              <a:schemeClr val="phClr">
+                <a:tint val="40000"/>
+                <a:satMod val="350000"/>
+              </a:schemeClr>
+            </a:gs>
+            <a:gs pos="40000">
+              <a:schemeClr val="phClr">
+                <a:tint val="45000"/>
+                <a:shade val="99000"/>
+                <a:satMod val="350000"/>
+              </a:schemeClr>
+            </a:gs>
+            <a:gs pos="100000">
+              <a:schemeClr val="phClr">
+                <a:shade val="20000"/>
+                <a:satMod val="255000"/>
+              </a:schemeClr>
+            </a:gs>
+          </a:gsLst>
+          <a:path path="circle">
+            <a:fillToRect b="180000" l="50000" r="50000" t="-80000"/>
+          </a:path>
+        </a:gradFill>
+        <a:gradFill rotWithShape="1">
+          <a:gsLst>
+            <a:gs pos="0">
+              <a:schemeClr val="phClr">
+                <a:tint val="80000"/>
+                <a:satMod val="300000"/>
+              </a:schemeClr>
+            </a:gs>
+            <a:gs pos="100000">
+              <a:schemeClr val="phClr">
+                <a:shade val="30000"/>
+                <a:satMod val="200000"/>
+              </a:schemeClr>
+            </a:gs>
+          </a:gsLst>
+          <a:path path="circle">
+            <a:fillToRect b="50000" l="50000" r="50000" t="50000"/>
+          </a:path>
+        </a:gradFill>
+      </a:bgFillStyleLst>
+    </a:fmtScheme>
+  </a:themeElements>
+</a:theme>
 </file>
</xml_diff>

<commit_message>
At a list with TODOs.
</commit_message>
<xml_diff>
--- a/Meeting20150425/Lack of manpower.pptx
+++ b/Meeting20150425/Lack of manpower.pptx
@@ -16,6 +16,7 @@
     <p:sldId id="261" r:id="rId11"/>
     <p:sldId id="262" r:id="rId12"/>
     <p:sldId id="263" r:id="rId13"/>
+    <p:sldId id="264" r:id="rId14"/>
   </p:sldIdLst>
   <p:sldSz cy="5143500" cx="9144000"/>
   <p:notesSz cx="6858000" cy="9144000"/>
@@ -1181,6 +1182,111 @@
       <p:sp>
         <p:nvSpPr>
           <p:cNvPr id="165" name="Shape 165"/>
+          <p:cNvSpPr txBox="1"/>
+          <p:nvPr>
+            <p:ph idx="1" type="body"/>
+          </p:nvPr>
+        </p:nvSpPr>
+        <p:spPr>
+          <a:xfrm>
+            <a:off x="685800" y="4343400"/>
+            <a:ext cx="5486399" cy="4114800"/>
+          </a:xfrm>
+          <a:prstGeom prst="rect">
+            <a:avLst/>
+          </a:prstGeom>
+        </p:spPr>
+        <p:txBody>
+          <a:bodyPr anchorCtr="0" anchor="t" bIns="91425" lIns="91425" rIns="91425" tIns="91425">
+            <a:noAutofit/>
+          </a:bodyPr>
+          <a:lstStyle/>
+          <a:p>
+            <a:pPr>
+              <a:spcBef>
+                <a:spcPts val="0"/>
+              </a:spcBef>
+              <a:buNone/>
+            </a:pPr>
+            <a:r>
+              <a:t/>
+            </a:r>
+            <a:endParaRPr/>
+          </a:p>
+        </p:txBody>
+      </p:sp>
+    </p:spTree>
+  </p:cSld>
+  <p:clrMapOvr>
+    <a:masterClrMapping/>
+  </p:clrMapOvr>
+</p:notes>
+</file>
+
+<file path=ppt/notesSlides/notesSlide9.xml><?xml version="1.0" encoding="utf-8"?>
+<p:notes xmlns:a="http://schemas.openxmlformats.org/drawingml/2006/main" xmlns:r="http://schemas.openxmlformats.org/officeDocument/2006/relationships" xmlns:mc="http://schemas.openxmlformats.org/markup-compatibility/2006" xmlns:mv="urn:schemas-microsoft-com:mac:vml" xmlns:p="http://schemas.openxmlformats.org/presentationml/2006/main" xmlns:c="http://schemas.openxmlformats.org/drawingml/2006/chart" xmlns:dgm="http://schemas.openxmlformats.org/drawingml/2006/diagram" xmlns:o="urn:schemas-microsoft-com:office:office" xmlns:v="urn:schemas-microsoft-com:vml" xmlns:pvml="urn:schemas-microsoft-com:office:powerpoint" xmlns:com="http://schemas.openxmlformats.org/drawingml/2006/compatibility" xmlns:p14="http://schemas.microsoft.com/office/powerpoint/2010/main" showMasterPhAnim="0" showMasterSp="0">
+  <p:cSld>
+    <p:spTree>
+      <p:nvGrpSpPr>
+        <p:cNvPr id="169" name="Shape 169"/>
+        <p:cNvGrpSpPr/>
+        <p:nvPr/>
+      </p:nvGrpSpPr>
+      <p:grpSpPr>
+        <a:xfrm>
+          <a:off x="0" y="0"/>
+          <a:ext cx="0" cy="0"/>
+          <a:chOff x="0" y="0"/>
+          <a:chExt cx="0" cy="0"/>
+        </a:xfrm>
+      </p:grpSpPr>
+      <p:sp>
+        <p:nvSpPr>
+          <p:cNvPr id="170" name="Shape 170"/>
+          <p:cNvSpPr/>
+          <p:nvPr>
+            <p:ph idx="2" type="sldImg"/>
+          </p:nvPr>
+        </p:nvSpPr>
+        <p:spPr>
+          <a:xfrm>
+            <a:off x="381187" y="685800"/>
+            <a:ext cx="6096299" cy="3429000"/>
+          </a:xfrm>
+          <a:custGeom>
+            <a:pathLst>
+              <a:path extrusionOk="0" h="120000" w="120000">
+                <a:moveTo>
+                  <a:pt x="0" y="0"/>
+                </a:moveTo>
+                <a:lnTo>
+                  <a:pt x="120000" y="0"/>
+                </a:lnTo>
+                <a:lnTo>
+                  <a:pt x="120000" y="120000"/>
+                </a:lnTo>
+                <a:lnTo>
+                  <a:pt x="0" y="120000"/>
+                </a:lnTo>
+                <a:close/>
+              </a:path>
+            </a:pathLst>
+          </a:custGeom>
+          <a:noFill/>
+          <a:ln cap="flat" w="9525">
+            <a:solidFill>
+              <a:srgbClr val="000000"/>
+            </a:solidFill>
+            <a:prstDash val="solid"/>
+            <a:round/>
+            <a:headEnd len="med" w="med" type="none"/>
+            <a:tailEnd len="med" w="med" type="none"/>
+          </a:ln>
+        </p:spPr>
+      </p:sp>
+      <p:sp>
+        <p:nvSpPr>
+          <p:cNvPr id="171" name="Shape 171"/>
           <p:cNvSpPr txBox="1"/>
           <p:nvPr>
             <p:ph idx="1" type="body"/>
@@ -30265,7 +30371,7 @@
             <a:tbl>
               <a:tblPr>
                 <a:noFill/>
-                <a:tableStyleId>{0BC1FBB6-F04C-420D-B3E1-8E79F56C9579}</a:tableStyleId>
+                <a:tableStyleId>{700B010A-7A02-4B48-9FBB-216F5F0DA87C}</a:tableStyleId>
               </a:tblPr>
               <a:tblGrid>
                 <a:gridCol w="3619500"/>
@@ -30814,7 +30920,7 @@
             <a:tbl>
               <a:tblPr>
                 <a:noFill/>
-                <a:tableStyleId>{90AD7B7B-C225-4A48-ACD4-69576CDBA7E0}</a:tableStyleId>
+                <a:tableStyleId>{632B650F-9EB0-4D64-89AB-B1FF1F921B32}</a:tableStyleId>
               </a:tblPr>
               <a:tblGrid>
                 <a:gridCol w="3619500"/>
@@ -31291,7 +31397,7 @@
             <a:tbl>
               <a:tblPr>
                 <a:noFill/>
-                <a:tableStyleId>{70D44EBE-3112-42A9-B50B-D39B157FB8B3}</a:tableStyleId>
+                <a:tableStyleId>{33A9F24E-4F56-4198-BA70-DEFF9FCD9D6F}</a:tableStyleId>
               </a:tblPr>
               <a:tblGrid>
                 <a:gridCol w="3619500"/>
@@ -31768,7 +31874,7 @@
             <a:tbl>
               <a:tblPr>
                 <a:noFill/>
-                <a:tableStyleId>{1A805F8A-0E14-44CD-86D9-8F55B72DDFF6}</a:tableStyleId>
+                <a:tableStyleId>{98F0C9AE-0E83-4013-9F5D-2BA0E8B784DD}</a:tableStyleId>
               </a:tblPr>
               <a:tblGrid>
                 <a:gridCol w="3619500"/>
@@ -32317,7 +32423,7 @@
             <a:tbl>
               <a:tblPr>
                 <a:noFill/>
-                <a:tableStyleId>{AAA811F6-21D2-44E7-B18C-B693A088D4EE}</a:tableStyleId>
+                <a:tableStyleId>{39747206-D9E7-4B34-AC1F-95DA65D7A0B9}</a:tableStyleId>
               </a:tblPr>
               <a:tblGrid>
                 <a:gridCol w="3619500"/>
@@ -32798,7 +32904,7 @@
             <a:tbl>
               <a:tblPr>
                 <a:noFill/>
-                <a:tableStyleId>{0B4E03C1-9374-4960-AE57-F2553D14477F}</a:tableStyleId>
+                <a:tableStyleId>{E5A0CA09-480D-4039-9B78-1DB735F492F6}</a:tableStyleId>
               </a:tblPr>
               <a:tblGrid>
                 <a:gridCol w="3619500"/>
@@ -33335,7 +33441,7 @@
             <a:tbl>
               <a:tblPr>
                 <a:noFill/>
-                <a:tableStyleId>{2000785D-C8BD-4395-81AC-27520309F939}</a:tableStyleId>
+                <a:tableStyleId>{ED13EE80-E13D-4FA3-9911-70CE0C809190}</a:tableStyleId>
               </a:tblPr>
               <a:tblGrid>
                 <a:gridCol w="3619500"/>
@@ -33708,10 +33814,217 @@
 </p:sld>
 </file>
 
+<file path=ppt/slides/slide9.xml><?xml version="1.0" encoding="utf-8"?>
+<p:sld xmlns:a="http://schemas.openxmlformats.org/drawingml/2006/main" xmlns:r="http://schemas.openxmlformats.org/officeDocument/2006/relationships" xmlns:mc="http://schemas.openxmlformats.org/markup-compatibility/2006" xmlns:mv="urn:schemas-microsoft-com:mac:vml" xmlns:p="http://schemas.openxmlformats.org/presentationml/2006/main" xmlns:c="http://schemas.openxmlformats.org/drawingml/2006/chart" xmlns:dgm="http://schemas.openxmlformats.org/drawingml/2006/diagram" xmlns:o="urn:schemas-microsoft-com:office:office" xmlns:v="urn:schemas-microsoft-com:vml" xmlns:pvml="urn:schemas-microsoft-com:office:powerpoint" xmlns:com="http://schemas.openxmlformats.org/drawingml/2006/compatibility" xmlns:p14="http://schemas.microsoft.com/office/powerpoint/2010/main">
+  <p:cSld>
+    <p:spTree>
+      <p:nvGrpSpPr>
+        <p:cNvPr id="166" name="Shape 166"/>
+        <p:cNvGrpSpPr/>
+        <p:nvPr/>
+      </p:nvGrpSpPr>
+      <p:grpSpPr>
+        <a:xfrm>
+          <a:off x="0" y="0"/>
+          <a:ext cx="0" cy="0"/>
+          <a:chOff x="0" y="0"/>
+          <a:chExt cx="0" cy="0"/>
+        </a:xfrm>
+      </p:grpSpPr>
+      <p:sp>
+        <p:nvSpPr>
+          <p:cNvPr id="167" name="Shape 167"/>
+          <p:cNvSpPr txBox="1"/>
+          <p:nvPr>
+            <p:ph type="title"/>
+          </p:nvPr>
+        </p:nvSpPr>
+        <p:spPr>
+          <a:xfrm>
+            <a:off x="457200" y="155628"/>
+            <a:ext cx="8229600" cy="1044599"/>
+          </a:xfrm>
+          <a:prstGeom prst="rect">
+            <a:avLst/>
+          </a:prstGeom>
+        </p:spPr>
+        <p:txBody>
+          <a:bodyPr anchorCtr="0" anchor="b" bIns="91425" lIns="91425" rIns="91425" tIns="91425">
+            <a:noAutofit/>
+          </a:bodyPr>
+          <a:lstStyle/>
+          <a:p>
+            <a:pPr>
+              <a:spcBef>
+                <a:spcPts val="0"/>
+              </a:spcBef>
+              <a:buNone/>
+            </a:pPr>
+            <a:r>
+              <a:rPr lang="nl"/>
+              <a:t>TODO</a:t>
+            </a:r>
+          </a:p>
+        </p:txBody>
+      </p:sp>
+      <p:sp>
+        <p:nvSpPr>
+          <p:cNvPr id="168" name="Shape 168"/>
+          <p:cNvSpPr txBox="1"/>
+          <p:nvPr>
+            <p:ph idx="1" type="body"/>
+          </p:nvPr>
+        </p:nvSpPr>
+        <p:spPr>
+          <a:xfrm>
+            <a:off x="457200" y="1297780"/>
+            <a:ext cx="8229600" cy="3627900"/>
+          </a:xfrm>
+          <a:prstGeom prst="rect">
+            <a:avLst/>
+          </a:prstGeom>
+        </p:spPr>
+        <p:txBody>
+          <a:bodyPr anchorCtr="0" anchor="t" bIns="91425" lIns="91425" rIns="91425" tIns="91425">
+            <a:noAutofit/>
+          </a:bodyPr>
+          <a:lstStyle/>
+          <a:p>
+            <a:pPr indent="-419100" lvl="0" marL="457200" rtl="0">
+              <a:spcBef>
+                <a:spcPts val="0"/>
+              </a:spcBef>
+              <a:buClr>
+                <a:schemeClr val="dk2"/>
+              </a:buClr>
+              <a:buSzPct val="100000"/>
+              <a:buFont typeface="Arial"/>
+              <a:buChar char="●"/>
+            </a:pPr>
+            <a:r>
+              <a:rPr lang="nl"/>
+              <a:t>Make GitHub accounts: All</a:t>
+            </a:r>
+          </a:p>
+          <a:p>
+            <a:pPr indent="-419100" lvl="0" marL="457200" rtl="0">
+              <a:spcBef>
+                <a:spcPts val="0"/>
+              </a:spcBef>
+              <a:buClr>
+                <a:schemeClr val="dk2"/>
+              </a:buClr>
+              <a:buSzPct val="100000"/>
+              <a:buFont typeface="Arial"/>
+              <a:buChar char="●"/>
+            </a:pPr>
+            <a:r>
+              <a:rPr lang="nl"/>
+              <a:t>Send GitHub username to WDM: All</a:t>
+            </a:r>
+          </a:p>
+          <a:p>
+            <a:pPr indent="-419100" lvl="0" marL="457200" rtl="0">
+              <a:spcBef>
+                <a:spcPts val="0"/>
+              </a:spcBef>
+              <a:buClr>
+                <a:schemeClr val="dk2"/>
+              </a:buClr>
+              <a:buSzPct val="100000"/>
+              <a:buFont typeface="Arial"/>
+              <a:buChar char="●"/>
+            </a:pPr>
+            <a:r>
+              <a:rPr lang="nl"/>
+              <a:t>Move svn to GitHub: WDM</a:t>
+            </a:r>
+          </a:p>
+          <a:p>
+            <a:pPr indent="-419100" lvl="0" marL="457200" rtl="0">
+              <a:spcBef>
+                <a:spcPts val="0"/>
+              </a:spcBef>
+              <a:buClr>
+                <a:schemeClr val="dk2"/>
+              </a:buClr>
+              <a:buSzPct val="100000"/>
+              <a:buFont typeface="Arial"/>
+              <a:buChar char="●"/>
+            </a:pPr>
+            <a:r>
+              <a:rPr lang="nl"/>
+              <a:t>Move issues to GitHub: WDM</a:t>
+            </a:r>
+          </a:p>
+          <a:p>
+            <a:pPr indent="-419100" lvl="0" marL="457200" rtl="0">
+              <a:spcBef>
+                <a:spcPts val="0"/>
+              </a:spcBef>
+              <a:buClr>
+                <a:schemeClr val="dk2"/>
+              </a:buClr>
+              <a:buSzPct val="100000"/>
+              <a:buFont typeface="Arial"/>
+              <a:buChar char="●"/>
+            </a:pPr>
+            <a:r>
+              <a:rPr lang="nl"/>
+              <a:t>Invite people to DeepskyLog organisation on GitHub: WDM</a:t>
+            </a:r>
+          </a:p>
+          <a:p>
+            <a:pPr indent="-419100" lvl="0" marL="457200" rtl="0">
+              <a:spcBef>
+                <a:spcPts val="0"/>
+              </a:spcBef>
+              <a:buClr>
+                <a:schemeClr val="dk2"/>
+              </a:buClr>
+              <a:buSzPct val="100000"/>
+              <a:buFont typeface="Arial"/>
+              <a:buChar char="●"/>
+            </a:pPr>
+            <a:r>
+              <a:rPr lang="nl"/>
+              <a:t>Move documentation to GitHub: ?</a:t>
+            </a:r>
+          </a:p>
+          <a:p>
+            <a:pPr indent="-419100" lvl="0" marL="457200">
+              <a:spcBef>
+                <a:spcPts val="0"/>
+              </a:spcBef>
+              <a:buClr>
+                <a:schemeClr val="dk2"/>
+              </a:buClr>
+              <a:buSzPct val="100000"/>
+              <a:buFont typeface="Arial"/>
+              <a:buChar char="●"/>
+            </a:pPr>
+            <a:r>
+              <a:rPr lang="nl"/>
+              <a:t>Deepsky database (Mail from GvdB): ?</a:t>
+            </a:r>
+          </a:p>
+        </p:txBody>
+      </p:sp>
+    </p:spTree>
+  </p:cSld>
+  <p:clrMapOvr>
+    <a:masterClrMapping/>
+  </p:clrMapOvr>
+  <p:transition spd="slow">
+    <p:cut/>
+  </p:transition>
+</p:sld>
+</file>
+
 <file path=ppt/theme/theme1.xml><?xml version="1.0" encoding="utf-8"?>
-<a:theme xmlns:a="http://schemas.openxmlformats.org/drawingml/2006/main" xmlns:r="http://schemas.openxmlformats.org/officeDocument/2006/relationships" name="sketched">
+<a:theme xmlns:a="http://schemas.openxmlformats.org/drawingml/2006/main" xmlns:r="http://schemas.openxmlformats.org/officeDocument/2006/relationships" name="Custom Theme">
   <a:themeElements>
-    <a:clrScheme name="Custom 398">
+    <a:clrScheme name="Default">
       <a:dk1>
         <a:srgbClr val="000000"/>
       </a:dk1>
@@ -33719,34 +34032,34 @@
         <a:srgbClr val="FFFFFF"/>
       </a:lt1>
       <a:dk2>
-        <a:srgbClr val="51535D"/>
+        <a:srgbClr val="158158"/>
       </a:dk2>
       <a:lt2>
-        <a:srgbClr val="EDEDED"/>
+        <a:srgbClr val="F3F3F3"/>
       </a:lt2>
       <a:accent1>
-        <a:srgbClr val="676871"/>
+        <a:srgbClr val="058DC7"/>
       </a:accent1>
       <a:accent2>
-        <a:srgbClr val="988489"/>
+        <a:srgbClr val="50B432"/>
       </a:accent2>
       <a:accent3>
-        <a:srgbClr val="6B7B67"/>
+        <a:srgbClr val="ED561B"/>
       </a:accent3>
       <a:accent4>
-        <a:srgbClr val="747B85"/>
+        <a:srgbClr val="EDEF00"/>
       </a:accent4>
       <a:accent5>
-        <a:srgbClr val="A5A9AF"/>
+        <a:srgbClr val="24CBE5"/>
       </a:accent5>
       <a:accent6>
-        <a:srgbClr val="85716D"/>
+        <a:srgbClr val="64E572"/>
       </a:accent6>
       <a:hlink>
-        <a:srgbClr val="676871"/>
+        <a:srgbClr val="2200CC"/>
       </a:hlink>
       <a:folHlink>
-        <a:srgbClr val="3F414A"/>
+        <a:srgbClr val="551A8B"/>
       </a:folHlink>
     </a:clrScheme>
     <a:fontScheme name="Office">
@@ -34303,9 +34616,9 @@
 </file>
 
 <file path=ppt/theme/theme3.xml><?xml version="1.0" encoding="utf-8"?>
-<a:theme xmlns:a="http://schemas.openxmlformats.org/drawingml/2006/main" xmlns:r="http://schemas.openxmlformats.org/officeDocument/2006/relationships" name="Custom Theme">
+<a:theme xmlns:a="http://schemas.openxmlformats.org/drawingml/2006/main" xmlns:r="http://schemas.openxmlformats.org/officeDocument/2006/relationships" name="sketched">
   <a:themeElements>
-    <a:clrScheme name="Default">
+    <a:clrScheme name="Custom 398">
       <a:dk1>
         <a:srgbClr val="000000"/>
       </a:dk1>
@@ -34313,34 +34626,34 @@
         <a:srgbClr val="FFFFFF"/>
       </a:lt1>
       <a:dk2>
-        <a:srgbClr val="158158"/>
+        <a:srgbClr val="51535D"/>
       </a:dk2>
       <a:lt2>
-        <a:srgbClr val="F3F3F3"/>
+        <a:srgbClr val="EDEDED"/>
       </a:lt2>
       <a:accent1>
-        <a:srgbClr val="058DC7"/>
+        <a:srgbClr val="676871"/>
       </a:accent1>
       <a:accent2>
-        <a:srgbClr val="50B432"/>
+        <a:srgbClr val="988489"/>
       </a:accent2>
       <a:accent3>
-        <a:srgbClr val="ED561B"/>
+        <a:srgbClr val="6B7B67"/>
       </a:accent3>
       <a:accent4>
-        <a:srgbClr val="EDEF00"/>
+        <a:srgbClr val="747B85"/>
       </a:accent4>
       <a:accent5>
-        <a:srgbClr val="24CBE5"/>
+        <a:srgbClr val="A5A9AF"/>
       </a:accent5>
       <a:accent6>
-        <a:srgbClr val="64E572"/>
+        <a:srgbClr val="85716D"/>
       </a:accent6>
       <a:hlink>
-        <a:srgbClr val="2200CC"/>
+        <a:srgbClr val="676871"/>
       </a:hlink>
       <a:folHlink>
-        <a:srgbClr val="551A8B"/>
+        <a:srgbClr val="3F414A"/>
       </a:folHlink>
     </a:clrScheme>
     <a:fontScheme name="Office">

</xml_diff>

<commit_message>
Add CW to list of interested people.
</commit_message>
<xml_diff>
--- a/Meeting20150425/Lack of manpower.pptx
+++ b/Meeting20150425/Lack of manpower.pptx
@@ -18,6 +18,7 @@
     <p:sldId id="263" r:id="rId13"/>
     <p:sldId id="264" r:id="rId14"/>
     <p:sldId id="265" r:id="rId15"/>
+    <p:sldId id="266" r:id="rId16"/>
   </p:sldIdLst>
   <p:sldSz cy="5143500" cx="9144000"/>
   <p:notesSz cx="6858000" cy="9144000"/>
@@ -494,7 +495,7 @@
   <p:cSld>
     <p:spTree>
       <p:nvGrpSpPr>
-        <p:cNvPr id="175" name="Shape 175"/>
+        <p:cNvPr id="176" name="Shape 176"/>
         <p:cNvGrpSpPr/>
         <p:nvPr/>
       </p:nvGrpSpPr>
@@ -508,7 +509,7 @@
       </p:grpSpPr>
       <p:sp>
         <p:nvSpPr>
-          <p:cNvPr id="176" name="Shape 176"/>
+          <p:cNvPr id="177" name="Shape 177"/>
           <p:cNvSpPr/>
           <p:nvPr>
             <p:ph idx="2" type="sldImg"/>
@@ -552,7 +553,112 @@
       </p:sp>
       <p:sp>
         <p:nvSpPr>
-          <p:cNvPr id="177" name="Shape 177"/>
+          <p:cNvPr id="178" name="Shape 178"/>
+          <p:cNvSpPr txBox="1"/>
+          <p:nvPr>
+            <p:ph idx="1" type="body"/>
+          </p:nvPr>
+        </p:nvSpPr>
+        <p:spPr>
+          <a:xfrm>
+            <a:off x="685800" y="4343400"/>
+            <a:ext cx="5486399" cy="4114800"/>
+          </a:xfrm>
+          <a:prstGeom prst="rect">
+            <a:avLst/>
+          </a:prstGeom>
+        </p:spPr>
+        <p:txBody>
+          <a:bodyPr anchorCtr="0" anchor="t" bIns="91425" lIns="91425" rIns="91425" tIns="91425">
+            <a:noAutofit/>
+          </a:bodyPr>
+          <a:lstStyle/>
+          <a:p>
+            <a:pPr>
+              <a:spcBef>
+                <a:spcPts val="0"/>
+              </a:spcBef>
+              <a:buNone/>
+            </a:pPr>
+            <a:r>
+              <a:t/>
+            </a:r>
+            <a:endParaRPr/>
+          </a:p>
+        </p:txBody>
+      </p:sp>
+    </p:spTree>
+  </p:cSld>
+  <p:clrMapOvr>
+    <a:masterClrMapping/>
+  </p:clrMapOvr>
+</p:notes>
+</file>
+
+<file path=ppt/notesSlides/notesSlide11.xml><?xml version="1.0" encoding="utf-8"?>
+<p:notes xmlns:a="http://schemas.openxmlformats.org/drawingml/2006/main" xmlns:r="http://schemas.openxmlformats.org/officeDocument/2006/relationships" xmlns:mc="http://schemas.openxmlformats.org/markup-compatibility/2006" xmlns:mv="urn:schemas-microsoft-com:mac:vml" xmlns:p="http://schemas.openxmlformats.org/presentationml/2006/main" xmlns:c="http://schemas.openxmlformats.org/drawingml/2006/chart" xmlns:dgm="http://schemas.openxmlformats.org/drawingml/2006/diagram" xmlns:o="urn:schemas-microsoft-com:office:office" xmlns:v="urn:schemas-microsoft-com:vml" xmlns:pvml="urn:schemas-microsoft-com:office:powerpoint" xmlns:com="http://schemas.openxmlformats.org/drawingml/2006/compatibility" xmlns:p14="http://schemas.microsoft.com/office/powerpoint/2010/main" showMasterPhAnim="0" showMasterSp="0">
+  <p:cSld>
+    <p:spTree>
+      <p:nvGrpSpPr>
+        <p:cNvPr id="182" name="Shape 182"/>
+        <p:cNvGrpSpPr/>
+        <p:nvPr/>
+      </p:nvGrpSpPr>
+      <p:grpSpPr>
+        <a:xfrm>
+          <a:off x="0" y="0"/>
+          <a:ext cx="0" cy="0"/>
+          <a:chOff x="0" y="0"/>
+          <a:chExt cx="0" cy="0"/>
+        </a:xfrm>
+      </p:grpSpPr>
+      <p:sp>
+        <p:nvSpPr>
+          <p:cNvPr id="183" name="Shape 183"/>
+          <p:cNvSpPr/>
+          <p:nvPr>
+            <p:ph idx="2" type="sldImg"/>
+          </p:nvPr>
+        </p:nvSpPr>
+        <p:spPr>
+          <a:xfrm>
+            <a:off x="381187" y="685800"/>
+            <a:ext cx="6096299" cy="3429000"/>
+          </a:xfrm>
+          <a:custGeom>
+            <a:pathLst>
+              <a:path extrusionOk="0" h="120000" w="120000">
+                <a:moveTo>
+                  <a:pt x="0" y="0"/>
+                </a:moveTo>
+                <a:lnTo>
+                  <a:pt x="120000" y="0"/>
+                </a:lnTo>
+                <a:lnTo>
+                  <a:pt x="120000" y="120000"/>
+                </a:lnTo>
+                <a:lnTo>
+                  <a:pt x="0" y="120000"/>
+                </a:lnTo>
+                <a:close/>
+              </a:path>
+            </a:pathLst>
+          </a:custGeom>
+          <a:noFill/>
+          <a:ln cap="flat" w="9525">
+            <a:solidFill>
+              <a:srgbClr val="000000"/>
+            </a:solidFill>
+            <a:prstDash val="solid"/>
+            <a:round/>
+            <a:headEnd len="med" w="med" type="none"/>
+            <a:tailEnd len="med" w="med" type="none"/>
+          </a:ln>
+        </p:spPr>
+      </p:sp>
+      <p:sp>
+        <p:nvSpPr>
+          <p:cNvPr id="184" name="Shape 184"/>
           <p:cNvSpPr txBox="1"/>
           <p:nvPr>
             <p:ph idx="1" type="body"/>
@@ -1334,7 +1440,7 @@
   <p:cSld>
     <p:spTree>
       <p:nvGrpSpPr>
-        <p:cNvPr id="169" name="Shape 169"/>
+        <p:cNvPr id="170" name="Shape 170"/>
         <p:cNvGrpSpPr/>
         <p:nvPr/>
       </p:nvGrpSpPr>
@@ -1348,7 +1454,7 @@
       </p:grpSpPr>
       <p:sp>
         <p:nvSpPr>
-          <p:cNvPr id="170" name="Shape 170"/>
+          <p:cNvPr id="171" name="Shape 171"/>
           <p:cNvSpPr/>
           <p:nvPr>
             <p:ph idx="2" type="sldImg"/>
@@ -1392,7 +1498,7 @@
       </p:sp>
       <p:sp>
         <p:nvSpPr>
-          <p:cNvPr id="171" name="Shape 171"/>
+          <p:cNvPr id="172" name="Shape 172"/>
           <p:cNvSpPr txBox="1"/>
           <p:nvPr>
             <p:ph idx="1" type="body"/>
@@ -30378,7 +30484,7 @@
   <p:cSld>
     <p:spTree>
       <p:nvGrpSpPr>
-        <p:cNvPr id="172" name="Shape 172"/>
+        <p:cNvPr id="173" name="Shape 173"/>
         <p:cNvGrpSpPr/>
         <p:nvPr/>
       </p:nvGrpSpPr>
@@ -30392,7 +30498,203 @@
       </p:grpSpPr>
       <p:sp>
         <p:nvSpPr>
-          <p:cNvPr id="173" name="Shape 173"/>
+          <p:cNvPr id="174" name="Shape 174"/>
+          <p:cNvSpPr txBox="1"/>
+          <p:nvPr>
+            <p:ph type="title"/>
+          </p:nvPr>
+        </p:nvSpPr>
+        <p:spPr>
+          <a:xfrm>
+            <a:off x="457200" y="155628"/>
+            <a:ext cx="8229600" cy="1044599"/>
+          </a:xfrm>
+          <a:prstGeom prst="rect">
+            <a:avLst/>
+          </a:prstGeom>
+        </p:spPr>
+        <p:txBody>
+          <a:bodyPr anchorCtr="0" anchor="b" bIns="91425" lIns="91425" rIns="91425" tIns="91425">
+            <a:noAutofit/>
+          </a:bodyPr>
+          <a:lstStyle/>
+          <a:p>
+            <a:pPr>
+              <a:spcBef>
+                <a:spcPts val="0"/>
+              </a:spcBef>
+              <a:buNone/>
+            </a:pPr>
+            <a:r>
+              <a:rPr lang="nl"/>
+              <a:t>Lead</a:t>
+            </a:r>
+          </a:p>
+        </p:txBody>
+      </p:sp>
+      <p:sp>
+        <p:nvSpPr>
+          <p:cNvPr id="175" name="Shape 175"/>
+          <p:cNvSpPr txBox="1"/>
+          <p:nvPr>
+            <p:ph idx="1" type="body"/>
+          </p:nvPr>
+        </p:nvSpPr>
+        <p:spPr>
+          <a:xfrm>
+            <a:off x="457200" y="1297780"/>
+            <a:ext cx="8229600" cy="3627900"/>
+          </a:xfrm>
+          <a:prstGeom prst="rect">
+            <a:avLst/>
+          </a:prstGeom>
+        </p:spPr>
+        <p:txBody>
+          <a:bodyPr anchorCtr="0" anchor="t" bIns="91425" lIns="91425" rIns="91425" tIns="91425">
+            <a:noAutofit/>
+          </a:bodyPr>
+          <a:lstStyle/>
+          <a:p>
+            <a:pPr rtl="0">
+              <a:spcBef>
+                <a:spcPts val="0"/>
+              </a:spcBef>
+              <a:buNone/>
+            </a:pPr>
+            <a:r>
+              <a:rPr lang="nl"/>
+              <a:t>Development: ? </a:t>
+            </a:r>
+          </a:p>
+          <a:p>
+            <a:pPr rtl="0">
+              <a:spcBef>
+                <a:spcPts val="0"/>
+              </a:spcBef>
+              <a:buNone/>
+            </a:pPr>
+            <a:r>
+              <a:rPr lang="nl"/>
+              <a:t>Project management: WDM</a:t>
+            </a:r>
+          </a:p>
+          <a:p>
+            <a:pPr rtl="0">
+              <a:spcBef>
+                <a:spcPts val="0"/>
+              </a:spcBef>
+              <a:buNone/>
+            </a:pPr>
+            <a:r>
+              <a:rPr lang="nl"/>
+              <a:t>Issues, testing: ?</a:t>
+            </a:r>
+          </a:p>
+          <a:p>
+            <a:pPr rtl="0">
+              <a:spcBef>
+                <a:spcPts val="0"/>
+              </a:spcBef>
+              <a:buNone/>
+            </a:pPr>
+            <a:r>
+              <a:rPr lang="nl"/>
+              <a:t>Deepsky-database: ?</a:t>
+            </a:r>
+          </a:p>
+          <a:p>
+            <a:pPr rtl="0">
+              <a:spcBef>
+                <a:spcPts val="0"/>
+              </a:spcBef>
+              <a:buNone/>
+            </a:pPr>
+            <a:r>
+              <a:rPr lang="nl"/>
+              <a:t>Documentation: ?</a:t>
+            </a:r>
+          </a:p>
+          <a:p>
+            <a:pPr rtl="0">
+              <a:spcBef>
+                <a:spcPts val="0"/>
+              </a:spcBef>
+              <a:buNone/>
+            </a:pPr>
+            <a:r>
+              <a:rPr lang="nl"/>
+              <a:t>Popularisation: ?</a:t>
+            </a:r>
+          </a:p>
+          <a:p>
+            <a:pPr rtl="0">
+              <a:spcBef>
+                <a:spcPts val="0"/>
+              </a:spcBef>
+              <a:buNone/>
+            </a:pPr>
+            <a:r>
+              <a:rPr lang="nl"/>
+              <a:t>Vela: WDM</a:t>
+            </a:r>
+          </a:p>
+          <a:p>
+            <a:pPr rtl="0">
+              <a:spcBef>
+                <a:spcPts val="0"/>
+              </a:spcBef>
+              <a:buNone/>
+            </a:pPr>
+            <a:r>
+              <a:rPr lang="nl"/>
+              <a:t>Translation: ?</a:t>
+            </a:r>
+          </a:p>
+          <a:p>
+            <a:pPr>
+              <a:spcBef>
+                <a:spcPts val="0"/>
+              </a:spcBef>
+              <a:buNone/>
+            </a:pPr>
+            <a:r>
+              <a:t/>
+            </a:r>
+            <a:endParaRPr/>
+          </a:p>
+        </p:txBody>
+      </p:sp>
+    </p:spTree>
+  </p:cSld>
+  <p:clrMapOvr>
+    <a:masterClrMapping/>
+  </p:clrMapOvr>
+  <p:transition spd="slow">
+    <p:cut/>
+  </p:transition>
+</p:sld>
+</file>
+
+<file path=ppt/slides/slide11.xml><?xml version="1.0" encoding="utf-8"?>
+<p:sld xmlns:a="http://schemas.openxmlformats.org/drawingml/2006/main" xmlns:r="http://schemas.openxmlformats.org/officeDocument/2006/relationships" xmlns:mc="http://schemas.openxmlformats.org/markup-compatibility/2006" xmlns:mv="urn:schemas-microsoft-com:mac:vml" xmlns:p="http://schemas.openxmlformats.org/presentationml/2006/main" xmlns:c="http://schemas.openxmlformats.org/drawingml/2006/chart" xmlns:dgm="http://schemas.openxmlformats.org/drawingml/2006/diagram" xmlns:o="urn:schemas-microsoft-com:office:office" xmlns:v="urn:schemas-microsoft-com:vml" xmlns:pvml="urn:schemas-microsoft-com:office:powerpoint" xmlns:com="http://schemas.openxmlformats.org/drawingml/2006/compatibility" xmlns:p14="http://schemas.microsoft.com/office/powerpoint/2010/main">
+  <p:cSld>
+    <p:spTree>
+      <p:nvGrpSpPr>
+        <p:cNvPr id="179" name="Shape 179"/>
+        <p:cNvGrpSpPr/>
+        <p:nvPr/>
+      </p:nvGrpSpPr>
+      <p:grpSpPr>
+        <a:xfrm>
+          <a:off x="0" y="0"/>
+          <a:ext cx="0" cy="0"/>
+          <a:chOff x="0" y="0"/>
+          <a:chExt cx="0" cy="0"/>
+        </a:xfrm>
+      </p:grpSpPr>
+      <p:sp>
+        <p:nvSpPr>
+          <p:cNvPr id="180" name="Shape 180"/>
           <p:cNvSpPr txBox="1"/>
           <p:nvPr>
             <p:ph type="title"/>
@@ -30428,7 +30730,7 @@
       </p:sp>
       <p:sp>
         <p:nvSpPr>
-          <p:cNvPr id="174" name="Shape 174"/>
+          <p:cNvPr id="181" name="Shape 181"/>
           <p:cNvSpPr txBox="1"/>
           <p:nvPr>
             <p:ph idx="1" type="body"/>
@@ -30684,7 +30986,7 @@
             <a:tbl>
               <a:tblPr>
                 <a:noFill/>
-                <a:tableStyleId>{57AAD720-E539-4634-BF64-08BC6204B20D}</a:tableStyleId>
+                <a:tableStyleId>{9AD4A55D-4D84-41DF-80A0-1DDD75480BD6}</a:tableStyleId>
               </a:tblPr>
               <a:tblGrid>
                 <a:gridCol w="3619500"/>
@@ -31233,7 +31535,7 @@
             <a:tbl>
               <a:tblPr>
                 <a:noFill/>
-                <a:tableStyleId>{06119ADA-5C52-45CB-9ECA-DC6CEF3837E1}</a:tableStyleId>
+                <a:tableStyleId>{AC9A62E9-8C81-4C36-BD0A-9CE0E2C226B3}</a:tableStyleId>
               </a:tblPr>
               <a:tblGrid>
                 <a:gridCol w="3619500"/>
@@ -31710,7 +32012,7 @@
             <a:tbl>
               <a:tblPr>
                 <a:noFill/>
-                <a:tableStyleId>{CD9BF033-F317-4082-A7F2-77D2FBFEB501}</a:tableStyleId>
+                <a:tableStyleId>{B9874E1F-F119-49A0-89D7-A03F992777F8}</a:tableStyleId>
               </a:tblPr>
               <a:tblGrid>
                 <a:gridCol w="3619500"/>
@@ -32187,7 +32489,7 @@
             <a:tbl>
               <a:tblPr>
                 <a:noFill/>
-                <a:tableStyleId>{8D88958F-5E1F-480A-998C-C736D2E798A7}</a:tableStyleId>
+                <a:tableStyleId>{341DEBA6-5514-4137-B370-5DFC4CDA9814}</a:tableStyleId>
               </a:tblPr>
               <a:tblGrid>
                 <a:gridCol w="3619500"/>
@@ -32736,7 +33038,7 @@
             <a:tbl>
               <a:tblPr>
                 <a:noFill/>
-                <a:tableStyleId>{D573D46E-A64D-422D-A821-A626ECBDFD09}</a:tableStyleId>
+                <a:tableStyleId>{06FAD3CF-CDFB-4A5C-B51F-2928AD093A3D}</a:tableStyleId>
               </a:tblPr>
               <a:tblGrid>
                 <a:gridCol w="3619500"/>
@@ -33217,7 +33519,7 @@
             <a:tbl>
               <a:tblPr>
                 <a:noFill/>
-                <a:tableStyleId>{5C3D47CA-53F2-40E2-82EA-581F02F7DE21}</a:tableStyleId>
+                <a:tableStyleId>{091F7709-59C6-4C94-AE08-FED723674C65}</a:tableStyleId>
               </a:tblPr>
               <a:tblGrid>
                 <a:gridCol w="3619500"/>
@@ -33754,7 +34056,7 @@
             <a:tbl>
               <a:tblPr>
                 <a:noFill/>
-                <a:tableStyleId>{7BCA14E4-5D2F-4D4F-B39D-1547339B76AB}</a:tableStyleId>
+                <a:tableStyleId>{867D4779-3D2F-484C-A724-91EEDCCD2375}</a:tableStyleId>
               </a:tblPr>
               <a:tblGrid>
                 <a:gridCol w="3619500"/>
@@ -34167,7 +34469,7 @@
           </a:bodyPr>
           <a:lstStyle/>
           <a:p>
-            <a:pPr>
+            <a:pPr lvl="0" rtl="0">
               <a:spcBef>
                 <a:spcPts val="0"/>
               </a:spcBef>
@@ -34175,7 +34477,7 @@
             </a:pPr>
             <a:r>
               <a:rPr lang="nl"/>
-              <a:t>Lead</a:t>
+              <a:t>CW</a:t>
             </a:r>
           </a:p>
         </p:txBody>
@@ -34203,103 +34505,7 @@
           </a:bodyPr>
           <a:lstStyle/>
           <a:p>
-            <a:pPr rtl="0">
-              <a:spcBef>
-                <a:spcPts val="0"/>
-              </a:spcBef>
-              <a:buNone/>
-            </a:pPr>
-            <a:r>
-              <a:rPr lang="nl"/>
-              <a:t>Development: ? </a:t>
-            </a:r>
-          </a:p>
-          <a:p>
-            <a:pPr rtl="0">
-              <a:spcBef>
-                <a:spcPts val="0"/>
-              </a:spcBef>
-              <a:buNone/>
-            </a:pPr>
-            <a:r>
-              <a:rPr lang="nl"/>
-              <a:t>Project management: WDM</a:t>
-            </a:r>
-          </a:p>
-          <a:p>
-            <a:pPr rtl="0">
-              <a:spcBef>
-                <a:spcPts val="0"/>
-              </a:spcBef>
-              <a:buNone/>
-            </a:pPr>
-            <a:r>
-              <a:rPr lang="nl"/>
-              <a:t>Issues, testing: ?</a:t>
-            </a:r>
-          </a:p>
-          <a:p>
-            <a:pPr rtl="0">
-              <a:spcBef>
-                <a:spcPts val="0"/>
-              </a:spcBef>
-              <a:buNone/>
-            </a:pPr>
-            <a:r>
-              <a:rPr lang="nl"/>
-              <a:t>Deepsky-database: ?</a:t>
-            </a:r>
-          </a:p>
-          <a:p>
-            <a:pPr rtl="0">
-              <a:spcBef>
-                <a:spcPts val="0"/>
-              </a:spcBef>
-              <a:buNone/>
-            </a:pPr>
-            <a:r>
-              <a:rPr lang="nl"/>
-              <a:t>Documentation: ?</a:t>
-            </a:r>
-          </a:p>
-          <a:p>
-            <a:pPr rtl="0">
-              <a:spcBef>
-                <a:spcPts val="0"/>
-              </a:spcBef>
-              <a:buNone/>
-            </a:pPr>
-            <a:r>
-              <a:rPr lang="nl"/>
-              <a:t>Popularisation: ?</a:t>
-            </a:r>
-          </a:p>
-          <a:p>
-            <a:pPr rtl="0">
-              <a:spcBef>
-                <a:spcPts val="0"/>
-              </a:spcBef>
-              <a:buNone/>
-            </a:pPr>
-            <a:r>
-              <a:rPr lang="nl"/>
-              <a:t>Vela: WDM</a:t>
-            </a:r>
-          </a:p>
-          <a:p>
-            <a:pPr rtl="0">
-              <a:spcBef>
-                <a:spcPts val="0"/>
-              </a:spcBef>
-              <a:buNone/>
-            </a:pPr>
-            <a:r>
-              <a:rPr lang="nl"/>
-              <a:t>Translation: ?</a:t>
-            </a:r>
-          </a:p>
-          <a:p>
-            <a:pPr>
+            <a:pPr lvl="0" rtl="0">
               <a:spcBef>
                 <a:spcPts val="0"/>
               </a:spcBef>
@@ -34312,6 +34518,383 @@
           </a:p>
         </p:txBody>
       </p:sp>
+      <p:graphicFrame>
+        <p:nvGraphicFramePr>
+          <p:cNvPr id="169" name="Shape 169"/>
+          <p:cNvGraphicFramePr/>
+          <p:nvPr/>
+        </p:nvGraphicFramePr>
+        <p:xfrm>
+          <a:off x="0" y="1845875"/>
+          <a:ext cx="3000000" cy="3000000"/>
+        </p:xfrm>
+        <a:graphic>
+          <a:graphicData uri="http://schemas.openxmlformats.org/drawingml/2006/table">
+            <a:tbl>
+              <a:tblPr>
+                <a:noFill/>
+                <a:tableStyleId>{C1C41D91-9EF4-410F-8ACC-D9CF96DE7703}</a:tableStyleId>
+              </a:tblPr>
+              <a:tblGrid>
+                <a:gridCol w="3619500"/>
+                <a:gridCol w="3619500"/>
+              </a:tblGrid>
+              <a:tr h="381000">
+                <a:tc>
+                  <a:txBody>
+                    <a:bodyPr>
+                      <a:noAutofit/>
+                    </a:bodyPr>
+                    <a:lstStyle/>
+                    <a:p>
+                      <a:pPr lvl="0" rtl="0">
+                        <a:spcBef>
+                          <a:spcPts val="0"/>
+                        </a:spcBef>
+                        <a:buNone/>
+                      </a:pPr>
+                      <a:r>
+                        <a:rPr lang="nl"/>
+                        <a:t>Development</a:t>
+                      </a:r>
+                    </a:p>
+                  </a:txBody>
+                  <a:tcPr marT="91425" marB="91425" marR="91425" marL="91425"/>
+                </a:tc>
+                <a:tc>
+                  <a:txBody>
+                    <a:bodyPr>
+                      <a:noAutofit/>
+                    </a:bodyPr>
+                    <a:lstStyle/>
+                    <a:p>
+                      <a:pPr lvl="0" rtl="0">
+                        <a:spcBef>
+                          <a:spcPts val="0"/>
+                        </a:spcBef>
+                        <a:buNone/>
+                      </a:pPr>
+                      <a:r>
+                        <a:rPr lang="nl"/>
+                        <a:t>php:      mysql:      android:      iOS:</a:t>
+                      </a:r>
+                    </a:p>
+                  </a:txBody>
+                  <a:tcPr marT="91425" marB="91425" marR="91425" marL="91425"/>
+                </a:tc>
+              </a:tr>
+              <a:tr h="381000">
+                <a:tc>
+                  <a:txBody>
+                    <a:bodyPr>
+                      <a:noAutofit/>
+                    </a:bodyPr>
+                    <a:lstStyle/>
+                    <a:p>
+                      <a:pPr lvl="0" rtl="0">
+                        <a:spcBef>
+                          <a:spcPts val="0"/>
+                        </a:spcBef>
+                        <a:buNone/>
+                      </a:pPr>
+                      <a:r>
+                        <a:rPr lang="nl"/>
+                        <a:t>Project management</a:t>
+                      </a:r>
+                    </a:p>
+                  </a:txBody>
+                  <a:tcPr marT="91425" marB="91425" marR="91425" marL="91425"/>
+                </a:tc>
+                <a:tc>
+                  <a:txBody>
+                    <a:bodyPr>
+                      <a:noAutofit/>
+                    </a:bodyPr>
+                    <a:lstStyle/>
+                    <a:p>
+                      <a:pPr lvl="0" rtl="0">
+                        <a:spcBef>
+                          <a:spcPts val="0"/>
+                        </a:spcBef>
+                        <a:buNone/>
+                      </a:pPr>
+                      <a:r>
+                        <a:t/>
+                      </a:r>
+                      <a:endParaRPr/>
+                    </a:p>
+                  </a:txBody>
+                  <a:tcPr marT="91425" marB="91425" marR="91425" marL="91425"/>
+                </a:tc>
+              </a:tr>
+              <a:tr h="381000">
+                <a:tc>
+                  <a:txBody>
+                    <a:bodyPr>
+                      <a:noAutofit/>
+                    </a:bodyPr>
+                    <a:lstStyle/>
+                    <a:p>
+                      <a:pPr lvl="0" rtl="0">
+                        <a:spcBef>
+                          <a:spcPts val="0"/>
+                        </a:spcBef>
+                        <a:buNone/>
+                      </a:pPr>
+                      <a:r>
+                        <a:rPr lang="nl"/>
+                        <a:t>Issues, testing</a:t>
+                      </a:r>
+                    </a:p>
+                  </a:txBody>
+                  <a:tcPr marT="91425" marB="91425" marR="91425" marL="91425"/>
+                </a:tc>
+                <a:tc>
+                  <a:txBody>
+                    <a:bodyPr>
+                      <a:noAutofit/>
+                    </a:bodyPr>
+                    <a:lstStyle/>
+                    <a:p>
+                      <a:pPr lvl="0" rtl="0">
+                        <a:spcBef>
+                          <a:spcPts val="0"/>
+                        </a:spcBef>
+                        <a:buNone/>
+                      </a:pPr>
+                      <a:r>
+                        <a:t/>
+                      </a:r>
+                      <a:endParaRPr/>
+                    </a:p>
+                  </a:txBody>
+                  <a:tcPr marT="91425" marB="91425" marR="91425" marL="91425"/>
+                </a:tc>
+              </a:tr>
+              <a:tr h="381000">
+                <a:tc>
+                  <a:txBody>
+                    <a:bodyPr>
+                      <a:noAutofit/>
+                    </a:bodyPr>
+                    <a:lstStyle/>
+                    <a:p>
+                      <a:pPr lvl="0" rtl="0">
+                        <a:spcBef>
+                          <a:spcPts val="0"/>
+                        </a:spcBef>
+                        <a:buNone/>
+                      </a:pPr>
+                      <a:r>
+                        <a:rPr lang="nl"/>
+                        <a:t>Deepsky-database</a:t>
+                      </a:r>
+                    </a:p>
+                  </a:txBody>
+                  <a:tcPr marT="91425" marB="91425" marR="91425" marL="91425"/>
+                </a:tc>
+                <a:tc>
+                  <a:txBody>
+                    <a:bodyPr>
+                      <a:noAutofit/>
+                    </a:bodyPr>
+                    <a:lstStyle/>
+                    <a:p>
+                      <a:pPr lvl="0" rtl="0">
+                        <a:spcBef>
+                          <a:spcPts val="0"/>
+                        </a:spcBef>
+                        <a:buNone/>
+                      </a:pPr>
+                      <a:r>
+                        <a:t/>
+                      </a:r>
+                      <a:endParaRPr/>
+                    </a:p>
+                  </a:txBody>
+                  <a:tcPr marT="91425" marB="91425" marR="91425" marL="91425"/>
+                </a:tc>
+              </a:tr>
+              <a:tr h="381000">
+                <a:tc>
+                  <a:txBody>
+                    <a:bodyPr>
+                      <a:noAutofit/>
+                    </a:bodyPr>
+                    <a:lstStyle/>
+                    <a:p>
+                      <a:pPr lvl="0" rtl="0">
+                        <a:spcBef>
+                          <a:spcPts val="0"/>
+                        </a:spcBef>
+                        <a:buNone/>
+                      </a:pPr>
+                      <a:r>
+                        <a:rPr lang="nl"/>
+                        <a:t>Documentation</a:t>
+                      </a:r>
+                    </a:p>
+                  </a:txBody>
+                  <a:tcPr marT="91425" marB="91425" marR="91425" marL="91425"/>
+                </a:tc>
+                <a:tc>
+                  <a:txBody>
+                    <a:bodyPr>
+                      <a:noAutofit/>
+                    </a:bodyPr>
+                    <a:lstStyle/>
+                    <a:p>
+                      <a:pPr lvl="0" rtl="0">
+                        <a:spcBef>
+                          <a:spcPts val="0"/>
+                        </a:spcBef>
+                        <a:buNone/>
+                      </a:pPr>
+                      <a:r>
+                        <a:t/>
+                      </a:r>
+                      <a:endParaRPr/>
+                    </a:p>
+                  </a:txBody>
+                  <a:tcPr marT="91425" marB="91425" marR="91425" marL="91425"/>
+                </a:tc>
+              </a:tr>
+              <a:tr h="381000">
+                <a:tc>
+                  <a:txBody>
+                    <a:bodyPr>
+                      <a:noAutofit/>
+                    </a:bodyPr>
+                    <a:lstStyle/>
+                    <a:p>
+                      <a:pPr lvl="0" rtl="0">
+                        <a:spcBef>
+                          <a:spcPts val="0"/>
+                        </a:spcBef>
+                        <a:buNone/>
+                      </a:pPr>
+                      <a:r>
+                        <a:rPr lang="nl"/>
+                        <a:t>Popularisation</a:t>
+                      </a:r>
+                    </a:p>
+                  </a:txBody>
+                  <a:tcPr marT="91425" marB="91425" marR="91425" marL="91425"/>
+                </a:tc>
+                <a:tc>
+                  <a:txBody>
+                    <a:bodyPr>
+                      <a:noAutofit/>
+                    </a:bodyPr>
+                    <a:lstStyle/>
+                    <a:p>
+                      <a:pPr lvl="0" rtl="0">
+                        <a:spcBef>
+                          <a:spcPts val="0"/>
+                        </a:spcBef>
+                        <a:buNone/>
+                      </a:pPr>
+                      <a:r>
+                        <a:t/>
+                      </a:r>
+                      <a:endParaRPr/>
+                    </a:p>
+                  </a:txBody>
+                  <a:tcPr marT="91425" marB="91425" marR="91425" marL="91425"/>
+                </a:tc>
+              </a:tr>
+              <a:tr h="381000">
+                <a:tc>
+                  <a:txBody>
+                    <a:bodyPr>
+                      <a:noAutofit/>
+                    </a:bodyPr>
+                    <a:lstStyle/>
+                    <a:p>
+                      <a:pPr lvl="0" rtl="0">
+                        <a:spcBef>
+                          <a:spcPts val="0"/>
+                        </a:spcBef>
+                        <a:buNone/>
+                      </a:pPr>
+                      <a:r>
+                        <a:rPr lang="nl"/>
+                        <a:t>Vela</a:t>
+                      </a:r>
+                    </a:p>
+                  </a:txBody>
+                  <a:tcPr marT="91425" marB="91425" marR="91425" marL="91425"/>
+                </a:tc>
+                <a:tc>
+                  <a:txBody>
+                    <a:bodyPr>
+                      <a:noAutofit/>
+                    </a:bodyPr>
+                    <a:lstStyle/>
+                    <a:p>
+                      <a:pPr lvl="0" rtl="0">
+                        <a:spcBef>
+                          <a:spcPts val="0"/>
+                        </a:spcBef>
+                        <a:buNone/>
+                      </a:pPr>
+                      <a:r>
+                        <a:t/>
+                      </a:r>
+                      <a:endParaRPr/>
+                    </a:p>
+                  </a:txBody>
+                  <a:tcPr marT="91425" marB="91425" marR="91425" marL="91425"/>
+                </a:tc>
+              </a:tr>
+              <a:tr h="381000">
+                <a:tc>
+                  <a:txBody>
+                    <a:bodyPr>
+                      <a:noAutofit/>
+                    </a:bodyPr>
+                    <a:lstStyle/>
+                    <a:p>
+                      <a:pPr lvl="0" rtl="0">
+                        <a:spcBef>
+                          <a:spcPts val="0"/>
+                        </a:spcBef>
+                        <a:buNone/>
+                      </a:pPr>
+                      <a:r>
+                        <a:rPr lang="nl"/>
+                        <a:t>Translation</a:t>
+                      </a:r>
+                    </a:p>
+                  </a:txBody>
+                  <a:tcPr marT="91425" marB="91425" marR="91425" marL="91425"/>
+                </a:tc>
+                <a:tc>
+                  <a:txBody>
+                    <a:bodyPr>
+                      <a:noAutofit/>
+                    </a:bodyPr>
+                    <a:lstStyle/>
+                    <a:p>
+                      <a:pPr lvl="0" rtl="0">
+                        <a:spcBef>
+                          <a:spcPts val="0"/>
+                        </a:spcBef>
+                        <a:buNone/>
+                      </a:pPr>
+                      <a:r>
+                        <a:t/>
+                      </a:r>
+                      <a:endParaRPr/>
+                    </a:p>
+                  </a:txBody>
+                  <a:tcPr marT="91425" marB="91425" marR="91425" marL="91425"/>
+                </a:tc>
+              </a:tr>
+            </a:tbl>
+          </a:graphicData>
+        </a:graphic>
+      </p:graphicFrame>
     </p:spTree>
   </p:cSld>
   <p:clrMapOvr>
@@ -34324,283 +34907,6 @@
 </file>
 
 <file path=ppt/theme/theme1.xml><?xml version="1.0" encoding="utf-8"?>
-<a:theme xmlns:a="http://schemas.openxmlformats.org/drawingml/2006/main" xmlns:r="http://schemas.openxmlformats.org/officeDocument/2006/relationships" name="Custom Theme">
-  <a:themeElements>
-    <a:clrScheme name="Default">
-      <a:dk1>
-        <a:srgbClr val="000000"/>
-      </a:dk1>
-      <a:lt1>
-        <a:srgbClr val="FFFFFF"/>
-      </a:lt1>
-      <a:dk2>
-        <a:srgbClr val="158158"/>
-      </a:dk2>
-      <a:lt2>
-        <a:srgbClr val="F3F3F3"/>
-      </a:lt2>
-      <a:accent1>
-        <a:srgbClr val="058DC7"/>
-      </a:accent1>
-      <a:accent2>
-        <a:srgbClr val="50B432"/>
-      </a:accent2>
-      <a:accent3>
-        <a:srgbClr val="ED561B"/>
-      </a:accent3>
-      <a:accent4>
-        <a:srgbClr val="EDEF00"/>
-      </a:accent4>
-      <a:accent5>
-        <a:srgbClr val="24CBE5"/>
-      </a:accent5>
-      <a:accent6>
-        <a:srgbClr val="64E572"/>
-      </a:accent6>
-      <a:hlink>
-        <a:srgbClr val="2200CC"/>
-      </a:hlink>
-      <a:folHlink>
-        <a:srgbClr val="551A8B"/>
-      </a:folHlink>
-    </a:clrScheme>
-    <a:fontScheme name="Office">
-      <a:majorFont>
-        <a:latin typeface="Arial"/>
-        <a:ea typeface=""/>
-        <a:cs typeface=""/>
-        <a:font script="Jpan" typeface="ＭＳ Ｐゴシック"/>
-        <a:font script="Hang" typeface="맑은 고딕"/>
-        <a:font script="Hans" typeface="宋体"/>
-        <a:font script="Hant" typeface="新細明體"/>
-        <a:font script="Arab" typeface="Times New Roman"/>
-        <a:font script="Hebr" typeface="Times New Roman"/>
-        <a:font script="Thai" typeface="Angsana New"/>
-        <a:font script="Ethi" typeface="Nyala"/>
-        <a:font script="Beng" typeface="Vrinda"/>
-        <a:font script="Gujr" typeface="Shruti"/>
-        <a:font script="Khmr" typeface="MoolBoran"/>
-        <a:font script="Knda" typeface="Tunga"/>
-        <a:font script="Guru" typeface="Raavi"/>
-        <a:font script="Cans" typeface="Euphemia"/>
-        <a:font script="Cher" typeface="Plantagenet Cherokee"/>
-        <a:font script="Yiii" typeface="Microsoft Yi Baiti"/>
-        <a:font script="Tibt" typeface="Microsoft Himalaya"/>
-        <a:font script="Thaa" typeface="MV Boli"/>
-        <a:font script="Deva" typeface="Mangal"/>
-        <a:font script="Telu" typeface="Gautami"/>
-        <a:font script="Taml" typeface="Latha"/>
-        <a:font script="Syrc" typeface="Estrangelo Edessa"/>
-        <a:font script="Orya" typeface="Kalinga"/>
-        <a:font script="Mlym" typeface="Kartika"/>
-        <a:font script="Laoo" typeface="DokChampa"/>
-        <a:font script="Sinh" typeface="Iskoola Pota"/>
-        <a:font script="Mong" typeface="Mongolian Baiti"/>
-        <a:font script="Viet" typeface="Times New Roman"/>
-        <a:font script="Uigh" typeface="Microsoft Uighur"/>
-      </a:majorFont>
-      <a:minorFont>
-        <a:latin typeface="Arial"/>
-        <a:ea typeface=""/>
-        <a:cs typeface=""/>
-        <a:font script="Jpan" typeface="ＭＳ Ｐゴシック"/>
-        <a:font script="Hang" typeface="맑은 고딕"/>
-        <a:font script="Hans" typeface="宋体"/>
-        <a:font script="Hant" typeface="新細明體"/>
-        <a:font script="Arab" typeface="Times New Roman"/>
-        <a:font script="Hebr" typeface="Times New Roman"/>
-        <a:font script="Thai" typeface="Angsana New"/>
-        <a:font script="Ethi" typeface="Nyala"/>
-        <a:font script="Beng" typeface="Vrinda"/>
-        <a:font script="Gujr" typeface="Shruti"/>
-        <a:font script="Khmr" typeface="MoolBoran"/>
-        <a:font script="Knda" typeface="Tunga"/>
-        <a:font script="Guru" typeface="Raavi"/>
-        <a:font script="Cans" typeface="Euphemia"/>
-        <a:font script="Cher" typeface="Plantagenet Cherokee"/>
-        <a:font script="Yiii" typeface="Microsoft Yi Baiti"/>
-        <a:font script="Tibt" typeface="Microsoft Himalaya"/>
-        <a:font script="Thaa" typeface="MV Boli"/>
-        <a:font script="Deva" typeface="Mangal"/>
-        <a:font script="Telu" typeface="Gautami"/>
-        <a:font script="Taml" typeface="Latha"/>
-        <a:font script="Syrc" typeface="Estrangelo Edessa"/>
-        <a:font script="Orya" typeface="Kalinga"/>
-        <a:font script="Mlym" typeface="Kartika"/>
-        <a:font script="Laoo" typeface="DokChampa"/>
-        <a:font script="Sinh" typeface="Iskoola Pota"/>
-        <a:font script="Mong" typeface="Mongolian Baiti"/>
-        <a:font script="Viet" typeface="Times New Roman"/>
-        <a:font script="Uigh" typeface="Microsoft Uighur"/>
-      </a:minorFont>
-    </a:fontScheme>
-    <a:fmtScheme name="Office">
-      <a:fillStyleLst>
-        <a:solidFill>
-          <a:schemeClr val="phClr"/>
-        </a:solidFill>
-        <a:gradFill rotWithShape="1">
-          <a:gsLst>
-            <a:gs pos="0">
-              <a:schemeClr val="phClr">
-                <a:tint val="50000"/>
-                <a:satMod val="300000"/>
-              </a:schemeClr>
-            </a:gs>
-            <a:gs pos="35000">
-              <a:schemeClr val="phClr">
-                <a:tint val="37000"/>
-                <a:satMod val="300000"/>
-              </a:schemeClr>
-            </a:gs>
-            <a:gs pos="100000">
-              <a:schemeClr val="phClr">
-                <a:tint val="15000"/>
-                <a:satMod val="350000"/>
-              </a:schemeClr>
-            </a:gs>
-          </a:gsLst>
-          <a:lin ang="16200000" scaled="1"/>
-        </a:gradFill>
-        <a:gradFill rotWithShape="1">
-          <a:gsLst>
-            <a:gs pos="0">
-              <a:schemeClr val="phClr">
-                <a:tint val="100000"/>
-                <a:shade val="100000"/>
-                <a:satMod val="130000"/>
-              </a:schemeClr>
-            </a:gs>
-            <a:gs pos="100000">
-              <a:schemeClr val="phClr">
-                <a:tint val="50000"/>
-                <a:shade val="100000"/>
-                <a:satMod val="350000"/>
-              </a:schemeClr>
-            </a:gs>
-          </a:gsLst>
-          <a:lin ang="16200000" scaled="0"/>
-        </a:gradFill>
-      </a:fillStyleLst>
-      <a:lnStyleLst>
-        <a:ln cap="flat" cmpd="sng" w="9525" algn="ctr">
-          <a:solidFill>
-            <a:schemeClr val="phClr">
-              <a:shade val="95000"/>
-              <a:satMod val="105000"/>
-            </a:schemeClr>
-          </a:solidFill>
-          <a:prstDash val="solid"/>
-        </a:ln>
-        <a:ln cap="flat" cmpd="sng" w="25400" algn="ctr">
-          <a:solidFill>
-            <a:schemeClr val="phClr"/>
-          </a:solidFill>
-          <a:prstDash val="solid"/>
-        </a:ln>
-        <a:ln cap="flat" cmpd="sng" w="38100" algn="ctr">
-          <a:solidFill>
-            <a:schemeClr val="phClr"/>
-          </a:solidFill>
-          <a:prstDash val="solid"/>
-        </a:ln>
-      </a:lnStyleLst>
-      <a:effectStyleLst>
-        <a:effectStyle>
-          <a:effectLst>
-            <a:outerShdw blurRad="40000" rotWithShape="0" dir="5400000" dist="20000">
-              <a:srgbClr val="000000">
-                <a:alpha val="38000"/>
-              </a:srgbClr>
-            </a:outerShdw>
-          </a:effectLst>
-        </a:effectStyle>
-        <a:effectStyle>
-          <a:effectLst>
-            <a:outerShdw blurRad="40000" rotWithShape="0" dir="5400000" dist="23000">
-              <a:srgbClr val="000000">
-                <a:alpha val="35000"/>
-              </a:srgbClr>
-            </a:outerShdw>
-          </a:effectLst>
-        </a:effectStyle>
-        <a:effectStyle>
-          <a:effectLst>
-            <a:outerShdw blurRad="40000" rotWithShape="0" dir="5400000" dist="23000">
-              <a:srgbClr val="000000">
-                <a:alpha val="35000"/>
-              </a:srgbClr>
-            </a:outerShdw>
-          </a:effectLst>
-          <a:scene3d>
-            <a:camera prst="orthographicFront">
-              <a:rot lat="0" lon="0" rev="0"/>
-            </a:camera>
-            <a:lightRig dir="t" rig="threePt">
-              <a:rot lat="0" lon="0" rev="1200000"/>
-            </a:lightRig>
-          </a:scene3d>
-          <a:sp3d>
-            <a:bevelT h="25400" w="63500"/>
-          </a:sp3d>
-        </a:effectStyle>
-      </a:effectStyleLst>
-      <a:bgFillStyleLst>
-        <a:solidFill>
-          <a:schemeClr val="phClr"/>
-        </a:solidFill>
-        <a:gradFill rotWithShape="1">
-          <a:gsLst>
-            <a:gs pos="0">
-              <a:schemeClr val="phClr">
-                <a:tint val="40000"/>
-                <a:satMod val="350000"/>
-              </a:schemeClr>
-            </a:gs>
-            <a:gs pos="40000">
-              <a:schemeClr val="phClr">
-                <a:tint val="45000"/>
-                <a:shade val="99000"/>
-                <a:satMod val="350000"/>
-              </a:schemeClr>
-            </a:gs>
-            <a:gs pos="100000">
-              <a:schemeClr val="phClr">
-                <a:shade val="20000"/>
-                <a:satMod val="255000"/>
-              </a:schemeClr>
-            </a:gs>
-          </a:gsLst>
-          <a:path path="circle">
-            <a:fillToRect b="180000" l="50000" r="50000" t="-80000"/>
-          </a:path>
-        </a:gradFill>
-        <a:gradFill rotWithShape="1">
-          <a:gsLst>
-            <a:gs pos="0">
-              <a:schemeClr val="phClr">
-                <a:tint val="80000"/>
-                <a:satMod val="300000"/>
-              </a:schemeClr>
-            </a:gs>
-            <a:gs pos="100000">
-              <a:schemeClr val="phClr">
-                <a:shade val="30000"/>
-                <a:satMod val="200000"/>
-              </a:schemeClr>
-            </a:gs>
-          </a:gsLst>
-          <a:path path="circle">
-            <a:fillToRect b="50000" l="50000" r="50000" t="50000"/>
-          </a:path>
-        </a:gradFill>
-      </a:bgFillStyleLst>
-    </a:fmtScheme>
-  </a:themeElements>
-</a:theme>
-</file>
-
-<file path=ppt/theme/theme2.xml><?xml version="1.0" encoding="utf-8"?>
 <a:theme xmlns:a="http://schemas.openxmlformats.org/drawingml/2006/main" xmlns:r="http://schemas.openxmlformats.org/officeDocument/2006/relationships" name="sketched">
   <a:themeElements>
     <a:clrScheme name="Custom 398">
@@ -34877,7 +35183,7 @@
 </a:theme>
 </file>
 
-<file path=ppt/theme/theme3.xml><?xml version="1.0" encoding="utf-8"?>
+<file path=ppt/theme/theme2.xml><?xml version="1.0" encoding="utf-8"?>
 <a:theme xmlns:a="http://schemas.openxmlformats.org/drawingml/2006/main" xmlns:r="http://schemas.openxmlformats.org/officeDocument/2006/relationships" name="Office Theme">
   <a:themeElements>
     <a:clrScheme name="Office">
@@ -35192,4 +35498,281 @@
     </a:lnDef>
   </a:objectDefaults>
 </a:theme>
+</file>
+
+<file path=ppt/theme/theme3.xml><?xml version="1.0" encoding="utf-8"?>
+<a:theme xmlns:a="http://schemas.openxmlformats.org/drawingml/2006/main" xmlns:r="http://schemas.openxmlformats.org/officeDocument/2006/relationships" name="Custom Theme">
+  <a:themeElements>
+    <a:clrScheme name="Default">
+      <a:dk1>
+        <a:srgbClr val="000000"/>
+      </a:dk1>
+      <a:lt1>
+        <a:srgbClr val="FFFFFF"/>
+      </a:lt1>
+      <a:dk2>
+        <a:srgbClr val="158158"/>
+      </a:dk2>
+      <a:lt2>
+        <a:srgbClr val="F3F3F3"/>
+      </a:lt2>
+      <a:accent1>
+        <a:srgbClr val="058DC7"/>
+      </a:accent1>
+      <a:accent2>
+        <a:srgbClr val="50B432"/>
+      </a:accent2>
+      <a:accent3>
+        <a:srgbClr val="ED561B"/>
+      </a:accent3>
+      <a:accent4>
+        <a:srgbClr val="EDEF00"/>
+      </a:accent4>
+      <a:accent5>
+        <a:srgbClr val="24CBE5"/>
+      </a:accent5>
+      <a:accent6>
+        <a:srgbClr val="64E572"/>
+      </a:accent6>
+      <a:hlink>
+        <a:srgbClr val="2200CC"/>
+      </a:hlink>
+      <a:folHlink>
+        <a:srgbClr val="551A8B"/>
+      </a:folHlink>
+    </a:clrScheme>
+    <a:fontScheme name="Office">
+      <a:majorFont>
+        <a:latin typeface="Arial"/>
+        <a:ea typeface=""/>
+        <a:cs typeface=""/>
+        <a:font script="Jpan" typeface="ＭＳ Ｐゴシック"/>
+        <a:font script="Hang" typeface="맑은 고딕"/>
+        <a:font script="Hans" typeface="宋体"/>
+        <a:font script="Hant" typeface="新細明體"/>
+        <a:font script="Arab" typeface="Times New Roman"/>
+        <a:font script="Hebr" typeface="Times New Roman"/>
+        <a:font script="Thai" typeface="Angsana New"/>
+        <a:font script="Ethi" typeface="Nyala"/>
+        <a:font script="Beng" typeface="Vrinda"/>
+        <a:font script="Gujr" typeface="Shruti"/>
+        <a:font script="Khmr" typeface="MoolBoran"/>
+        <a:font script="Knda" typeface="Tunga"/>
+        <a:font script="Guru" typeface="Raavi"/>
+        <a:font script="Cans" typeface="Euphemia"/>
+        <a:font script="Cher" typeface="Plantagenet Cherokee"/>
+        <a:font script="Yiii" typeface="Microsoft Yi Baiti"/>
+        <a:font script="Tibt" typeface="Microsoft Himalaya"/>
+        <a:font script="Thaa" typeface="MV Boli"/>
+        <a:font script="Deva" typeface="Mangal"/>
+        <a:font script="Telu" typeface="Gautami"/>
+        <a:font script="Taml" typeface="Latha"/>
+        <a:font script="Syrc" typeface="Estrangelo Edessa"/>
+        <a:font script="Orya" typeface="Kalinga"/>
+        <a:font script="Mlym" typeface="Kartika"/>
+        <a:font script="Laoo" typeface="DokChampa"/>
+        <a:font script="Sinh" typeface="Iskoola Pota"/>
+        <a:font script="Mong" typeface="Mongolian Baiti"/>
+        <a:font script="Viet" typeface="Times New Roman"/>
+        <a:font script="Uigh" typeface="Microsoft Uighur"/>
+      </a:majorFont>
+      <a:minorFont>
+        <a:latin typeface="Arial"/>
+        <a:ea typeface=""/>
+        <a:cs typeface=""/>
+        <a:font script="Jpan" typeface="ＭＳ Ｐゴシック"/>
+        <a:font script="Hang" typeface="맑은 고딕"/>
+        <a:font script="Hans" typeface="宋体"/>
+        <a:font script="Hant" typeface="新細明體"/>
+        <a:font script="Arab" typeface="Times New Roman"/>
+        <a:font script="Hebr" typeface="Times New Roman"/>
+        <a:font script="Thai" typeface="Angsana New"/>
+        <a:font script="Ethi" typeface="Nyala"/>
+        <a:font script="Beng" typeface="Vrinda"/>
+        <a:font script="Gujr" typeface="Shruti"/>
+        <a:font script="Khmr" typeface="MoolBoran"/>
+        <a:font script="Knda" typeface="Tunga"/>
+        <a:font script="Guru" typeface="Raavi"/>
+        <a:font script="Cans" typeface="Euphemia"/>
+        <a:font script="Cher" typeface="Plantagenet Cherokee"/>
+        <a:font script="Yiii" typeface="Microsoft Yi Baiti"/>
+        <a:font script="Tibt" typeface="Microsoft Himalaya"/>
+        <a:font script="Thaa" typeface="MV Boli"/>
+        <a:font script="Deva" typeface="Mangal"/>
+        <a:font script="Telu" typeface="Gautami"/>
+        <a:font script="Taml" typeface="Latha"/>
+        <a:font script="Syrc" typeface="Estrangelo Edessa"/>
+        <a:font script="Orya" typeface="Kalinga"/>
+        <a:font script="Mlym" typeface="Kartika"/>
+        <a:font script="Laoo" typeface="DokChampa"/>
+        <a:font script="Sinh" typeface="Iskoola Pota"/>
+        <a:font script="Mong" typeface="Mongolian Baiti"/>
+        <a:font script="Viet" typeface="Times New Roman"/>
+        <a:font script="Uigh" typeface="Microsoft Uighur"/>
+      </a:minorFont>
+    </a:fontScheme>
+    <a:fmtScheme name="Office">
+      <a:fillStyleLst>
+        <a:solidFill>
+          <a:schemeClr val="phClr"/>
+        </a:solidFill>
+        <a:gradFill rotWithShape="1">
+          <a:gsLst>
+            <a:gs pos="0">
+              <a:schemeClr val="phClr">
+                <a:tint val="50000"/>
+                <a:satMod val="300000"/>
+              </a:schemeClr>
+            </a:gs>
+            <a:gs pos="35000">
+              <a:schemeClr val="phClr">
+                <a:tint val="37000"/>
+                <a:satMod val="300000"/>
+              </a:schemeClr>
+            </a:gs>
+            <a:gs pos="100000">
+              <a:schemeClr val="phClr">
+                <a:tint val="15000"/>
+                <a:satMod val="350000"/>
+              </a:schemeClr>
+            </a:gs>
+          </a:gsLst>
+          <a:lin ang="16200000" scaled="1"/>
+        </a:gradFill>
+        <a:gradFill rotWithShape="1">
+          <a:gsLst>
+            <a:gs pos="0">
+              <a:schemeClr val="phClr">
+                <a:tint val="100000"/>
+                <a:shade val="100000"/>
+                <a:satMod val="130000"/>
+              </a:schemeClr>
+            </a:gs>
+            <a:gs pos="100000">
+              <a:schemeClr val="phClr">
+                <a:tint val="50000"/>
+                <a:shade val="100000"/>
+                <a:satMod val="350000"/>
+              </a:schemeClr>
+            </a:gs>
+          </a:gsLst>
+          <a:lin ang="16200000" scaled="0"/>
+        </a:gradFill>
+      </a:fillStyleLst>
+      <a:lnStyleLst>
+        <a:ln cap="flat" cmpd="sng" w="9525" algn="ctr">
+          <a:solidFill>
+            <a:schemeClr val="phClr">
+              <a:shade val="95000"/>
+              <a:satMod val="105000"/>
+            </a:schemeClr>
+          </a:solidFill>
+          <a:prstDash val="solid"/>
+        </a:ln>
+        <a:ln cap="flat" cmpd="sng" w="25400" algn="ctr">
+          <a:solidFill>
+            <a:schemeClr val="phClr"/>
+          </a:solidFill>
+          <a:prstDash val="solid"/>
+        </a:ln>
+        <a:ln cap="flat" cmpd="sng" w="38100" algn="ctr">
+          <a:solidFill>
+            <a:schemeClr val="phClr"/>
+          </a:solidFill>
+          <a:prstDash val="solid"/>
+        </a:ln>
+      </a:lnStyleLst>
+      <a:effectStyleLst>
+        <a:effectStyle>
+          <a:effectLst>
+            <a:outerShdw blurRad="40000" rotWithShape="0" dir="5400000" dist="20000">
+              <a:srgbClr val="000000">
+                <a:alpha val="38000"/>
+              </a:srgbClr>
+            </a:outerShdw>
+          </a:effectLst>
+        </a:effectStyle>
+        <a:effectStyle>
+          <a:effectLst>
+            <a:outerShdw blurRad="40000" rotWithShape="0" dir="5400000" dist="23000">
+              <a:srgbClr val="000000">
+                <a:alpha val="35000"/>
+              </a:srgbClr>
+            </a:outerShdw>
+          </a:effectLst>
+        </a:effectStyle>
+        <a:effectStyle>
+          <a:effectLst>
+            <a:outerShdw blurRad="40000" rotWithShape="0" dir="5400000" dist="23000">
+              <a:srgbClr val="000000">
+                <a:alpha val="35000"/>
+              </a:srgbClr>
+            </a:outerShdw>
+          </a:effectLst>
+          <a:scene3d>
+            <a:camera prst="orthographicFront">
+              <a:rot lat="0" lon="0" rev="0"/>
+            </a:camera>
+            <a:lightRig dir="t" rig="threePt">
+              <a:rot lat="0" lon="0" rev="1200000"/>
+            </a:lightRig>
+          </a:scene3d>
+          <a:sp3d>
+            <a:bevelT h="25400" w="63500"/>
+          </a:sp3d>
+        </a:effectStyle>
+      </a:effectStyleLst>
+      <a:bgFillStyleLst>
+        <a:solidFill>
+          <a:schemeClr val="phClr"/>
+        </a:solidFill>
+        <a:gradFill rotWithShape="1">
+          <a:gsLst>
+            <a:gs pos="0">
+              <a:schemeClr val="phClr">
+                <a:tint val="40000"/>
+                <a:satMod val="350000"/>
+              </a:schemeClr>
+            </a:gs>
+            <a:gs pos="40000">
+              <a:schemeClr val="phClr">
+                <a:tint val="45000"/>
+                <a:shade val="99000"/>
+                <a:satMod val="350000"/>
+              </a:schemeClr>
+            </a:gs>
+            <a:gs pos="100000">
+              <a:schemeClr val="phClr">
+                <a:shade val="20000"/>
+                <a:satMod val="255000"/>
+              </a:schemeClr>
+            </a:gs>
+          </a:gsLst>
+          <a:path path="circle">
+            <a:fillToRect b="180000" l="50000" r="50000" t="-80000"/>
+          </a:path>
+        </a:gradFill>
+        <a:gradFill rotWithShape="1">
+          <a:gsLst>
+            <a:gs pos="0">
+              <a:schemeClr val="phClr">
+                <a:tint val="80000"/>
+                <a:satMod val="300000"/>
+              </a:schemeClr>
+            </a:gs>
+            <a:gs pos="100000">
+              <a:schemeClr val="phClr">
+                <a:shade val="30000"/>
+                <a:satMod val="200000"/>
+              </a:schemeClr>
+            </a:gs>
+          </a:gsLst>
+          <a:path path="circle">
+            <a:fillToRect b="50000" l="50000" r="50000" t="50000"/>
+          </a:path>
+        </a:gradFill>
+      </a:bgFillStyleLst>
+    </a:fmtScheme>
+  </a:themeElements>
+</a:theme>
 </file>
</xml_diff>

<commit_message>
Added interests of DE.
</commit_message>
<xml_diff>
--- a/Meeting20150425/Lack of manpower.pptx
+++ b/Meeting20150425/Lack of manpower.pptx
@@ -30986,7 +30986,7 @@
             <a:tbl>
               <a:tblPr>
                 <a:noFill/>
-                <a:tableStyleId>{9AD4A55D-4D84-41DF-80A0-1DDD75480BD6}</a:tableStyleId>
+                <a:tableStyleId>{0C526C1A-4E81-44DF-88A3-32675EB21BB0}</a:tableStyleId>
               </a:tblPr>
               <a:tblGrid>
                 <a:gridCol w="3619500"/>
@@ -31535,7 +31535,7 @@
             <a:tbl>
               <a:tblPr>
                 <a:noFill/>
-                <a:tableStyleId>{AC9A62E9-8C81-4C36-BD0A-9CE0E2C226B3}</a:tableStyleId>
+                <a:tableStyleId>{389E12B7-D518-452B-B9FA-65E8B425847D}</a:tableStyleId>
               </a:tblPr>
               <a:tblGrid>
                 <a:gridCol w="3619500"/>
@@ -32012,7 +32012,7 @@
             <a:tbl>
               <a:tblPr>
                 <a:noFill/>
-                <a:tableStyleId>{B9874E1F-F119-49A0-89D7-A03F992777F8}</a:tableStyleId>
+                <a:tableStyleId>{F6EB6D6C-C05F-45FA-A359-7BED2881157F}</a:tableStyleId>
               </a:tblPr>
               <a:tblGrid>
                 <a:gridCol w="3619500"/>
@@ -32055,7 +32055,51 @@
                       </a:pPr>
                       <a:r>
                         <a:rPr lang="nl"/>
-                        <a:t>php:      mysql:      android:      iOS:</a:t>
+                        <a:t>php: </a:t>
+                      </a:r>
+                      <a:r>
+                        <a:rPr lang="nl">
+                          <a:solidFill>
+                            <a:srgbClr val="FF0000"/>
+                          </a:solidFill>
+                        </a:rPr>
+                        <a:t>X</a:t>
+                      </a:r>
+                      <a:r>
+                        <a:rPr lang="nl"/>
+                        <a:t>    mysql: </a:t>
+                      </a:r>
+                      <a:r>
+                        <a:rPr lang="nl">
+                          <a:solidFill>
+                            <a:srgbClr val="FF0000"/>
+                          </a:solidFill>
+                        </a:rPr>
+                        <a:t>X</a:t>
+                      </a:r>
+                      <a:r>
+                        <a:rPr lang="nl"/>
+                        <a:t>    android: </a:t>
+                      </a:r>
+                      <a:r>
+                        <a:rPr lang="nl">
+                          <a:solidFill>
+                            <a:srgbClr val="FF0000"/>
+                          </a:solidFill>
+                        </a:rPr>
+                        <a:t>X</a:t>
+                      </a:r>
+                      <a:r>
+                        <a:rPr lang="nl"/>
+                        <a:t>    iOS: </a:t>
+                      </a:r>
+                      <a:r>
+                        <a:rPr lang="nl">
+                          <a:solidFill>
+                            <a:srgbClr val="FF0000"/>
+                          </a:solidFill>
+                        </a:rPr>
+                        <a:t>X</a:t>
                       </a:r>
                     </a:p>
                   </a:txBody>
@@ -32098,9 +32142,13 @@
                         <a:buNone/>
                       </a:pPr>
                       <a:r>
-                        <a:t/>
+                        <a:rPr lang="nl">
+                          <a:solidFill>
+                            <a:srgbClr val="FF0000"/>
+                          </a:solidFill>
+                        </a:rPr>
+                        <a:t>X</a:t>
                       </a:r>
-                      <a:endParaRPr/>
                     </a:p>
                   </a:txBody>
                   <a:tcPr marT="91425" marB="91425" marR="91425" marL="91425"/>
@@ -32142,9 +32190,13 @@
                         <a:buNone/>
                       </a:pPr>
                       <a:r>
-                        <a:t/>
+                        <a:rPr lang="nl">
+                          <a:solidFill>
+                            <a:srgbClr val="FF0000"/>
+                          </a:solidFill>
+                        </a:rPr>
+                        <a:t>X</a:t>
                       </a:r>
-                      <a:endParaRPr/>
                     </a:p>
                   </a:txBody>
                   <a:tcPr marT="91425" marB="91425" marR="91425" marL="91425"/>
@@ -32186,9 +32238,13 @@
                         <a:buNone/>
                       </a:pPr>
                       <a:r>
-                        <a:t/>
+                        <a:rPr lang="nl">
+                          <a:solidFill>
+                            <a:srgbClr val="FF0000"/>
+                          </a:solidFill>
+                        </a:rPr>
+                        <a:t>X</a:t>
                       </a:r>
-                      <a:endParaRPr/>
                     </a:p>
                   </a:txBody>
                   <a:tcPr marT="91425" marB="91425" marR="91425" marL="91425"/>
@@ -32230,9 +32286,13 @@
                         <a:buNone/>
                       </a:pPr>
                       <a:r>
-                        <a:t/>
+                        <a:rPr lang="nl">
+                          <a:solidFill>
+                            <a:srgbClr val="FF0000"/>
+                          </a:solidFill>
+                        </a:rPr>
+                        <a:t>X</a:t>
                       </a:r>
-                      <a:endParaRPr/>
                     </a:p>
                   </a:txBody>
                   <a:tcPr marT="91425" marB="91425" marR="91425" marL="91425"/>
@@ -32274,9 +32334,13 @@
                         <a:buNone/>
                       </a:pPr>
                       <a:r>
-                        <a:t/>
+                        <a:rPr lang="nl">
+                          <a:solidFill>
+                            <a:srgbClr val="FF0000"/>
+                          </a:solidFill>
+                        </a:rPr>
+                        <a:t>X</a:t>
                       </a:r>
-                      <a:endParaRPr/>
                     </a:p>
                   </a:txBody>
                   <a:tcPr marT="91425" marB="91425" marR="91425" marL="91425"/>
@@ -32318,9 +32382,13 @@
                         <a:buNone/>
                       </a:pPr>
                       <a:r>
-                        <a:t/>
+                        <a:rPr lang="nl">
+                          <a:solidFill>
+                            <a:srgbClr val="FF0000"/>
+                          </a:solidFill>
+                        </a:rPr>
+                        <a:t>X</a:t>
                       </a:r>
-                      <a:endParaRPr/>
                     </a:p>
                   </a:txBody>
                   <a:tcPr marT="91425" marB="91425" marR="91425" marL="91425"/>
@@ -32362,9 +32430,13 @@
                         <a:buNone/>
                       </a:pPr>
                       <a:r>
-                        <a:t/>
+                        <a:rPr lang="nl">
+                          <a:solidFill>
+                            <a:srgbClr val="FF0000"/>
+                          </a:solidFill>
+                        </a:rPr>
+                        <a:t>X</a:t>
                       </a:r>
-                      <a:endParaRPr/>
                     </a:p>
                   </a:txBody>
                   <a:tcPr marT="91425" marB="91425" marR="91425" marL="91425"/>
@@ -32489,7 +32561,7 @@
             <a:tbl>
               <a:tblPr>
                 <a:noFill/>
-                <a:tableStyleId>{341DEBA6-5514-4137-B370-5DFC4CDA9814}</a:tableStyleId>
+                <a:tableStyleId>{55E79A2C-6CA3-46CE-8A9C-00C812D2B800}</a:tableStyleId>
               </a:tblPr>
               <a:tblGrid>
                 <a:gridCol w="3619500"/>
@@ -33038,7 +33110,7 @@
             <a:tbl>
               <a:tblPr>
                 <a:noFill/>
-                <a:tableStyleId>{06FAD3CF-CDFB-4A5C-B51F-2928AD093A3D}</a:tableStyleId>
+                <a:tableStyleId>{98CA4586-909D-4689-B08E-6C524162D6A8}</a:tableStyleId>
               </a:tblPr>
               <a:tblGrid>
                 <a:gridCol w="3619500"/>
@@ -33519,7 +33591,7 @@
             <a:tbl>
               <a:tblPr>
                 <a:noFill/>
-                <a:tableStyleId>{091F7709-59C6-4C94-AE08-FED723674C65}</a:tableStyleId>
+                <a:tableStyleId>{05B364C3-B6D0-4A9B-B38C-C4FEF2543CC4}</a:tableStyleId>
               </a:tblPr>
               <a:tblGrid>
                 <a:gridCol w="3619500"/>
@@ -34056,7 +34128,7 @@
             <a:tbl>
               <a:tblPr>
                 <a:noFill/>
-                <a:tableStyleId>{867D4779-3D2F-484C-A724-91EEDCCD2375}</a:tableStyleId>
+                <a:tableStyleId>{1051AA15-5913-4414-B006-E2619B89F9A4}</a:tableStyleId>
               </a:tblPr>
               <a:tblGrid>
                 <a:gridCol w="3619500"/>
@@ -34533,7 +34605,7 @@
             <a:tbl>
               <a:tblPr>
                 <a:noFill/>
-                <a:tableStyleId>{C1C41D91-9EF4-410F-8ACC-D9CF96DE7703}</a:tableStyleId>
+                <a:tableStyleId>{195BE24D-4049-4C8B-B9A3-8B8B0836B228}</a:tableStyleId>
               </a:tblPr>
               <a:tblGrid>
                 <a:gridCol w="3619500"/>
@@ -34907,283 +34979,6 @@
 </file>
 
 <file path=ppt/theme/theme1.xml><?xml version="1.0" encoding="utf-8"?>
-<a:theme xmlns:a="http://schemas.openxmlformats.org/drawingml/2006/main" xmlns:r="http://schemas.openxmlformats.org/officeDocument/2006/relationships" name="sketched">
-  <a:themeElements>
-    <a:clrScheme name="Custom 398">
-      <a:dk1>
-        <a:srgbClr val="000000"/>
-      </a:dk1>
-      <a:lt1>
-        <a:srgbClr val="FFFFFF"/>
-      </a:lt1>
-      <a:dk2>
-        <a:srgbClr val="51535D"/>
-      </a:dk2>
-      <a:lt2>
-        <a:srgbClr val="EDEDED"/>
-      </a:lt2>
-      <a:accent1>
-        <a:srgbClr val="676871"/>
-      </a:accent1>
-      <a:accent2>
-        <a:srgbClr val="988489"/>
-      </a:accent2>
-      <a:accent3>
-        <a:srgbClr val="6B7B67"/>
-      </a:accent3>
-      <a:accent4>
-        <a:srgbClr val="747B85"/>
-      </a:accent4>
-      <a:accent5>
-        <a:srgbClr val="A5A9AF"/>
-      </a:accent5>
-      <a:accent6>
-        <a:srgbClr val="85716D"/>
-      </a:accent6>
-      <a:hlink>
-        <a:srgbClr val="676871"/>
-      </a:hlink>
-      <a:folHlink>
-        <a:srgbClr val="3F414A"/>
-      </a:folHlink>
-    </a:clrScheme>
-    <a:fontScheme name="Office">
-      <a:majorFont>
-        <a:latin typeface="Arial"/>
-        <a:ea typeface=""/>
-        <a:cs typeface=""/>
-        <a:font script="Jpan" typeface="ＭＳ Ｐゴシック"/>
-        <a:font script="Hang" typeface="맑은 고딕"/>
-        <a:font script="Hans" typeface="宋体"/>
-        <a:font script="Hant" typeface="新細明體"/>
-        <a:font script="Arab" typeface="Times New Roman"/>
-        <a:font script="Hebr" typeface="Times New Roman"/>
-        <a:font script="Thai" typeface="Angsana New"/>
-        <a:font script="Ethi" typeface="Nyala"/>
-        <a:font script="Beng" typeface="Vrinda"/>
-        <a:font script="Gujr" typeface="Shruti"/>
-        <a:font script="Khmr" typeface="MoolBoran"/>
-        <a:font script="Knda" typeface="Tunga"/>
-        <a:font script="Guru" typeface="Raavi"/>
-        <a:font script="Cans" typeface="Euphemia"/>
-        <a:font script="Cher" typeface="Plantagenet Cherokee"/>
-        <a:font script="Yiii" typeface="Microsoft Yi Baiti"/>
-        <a:font script="Tibt" typeface="Microsoft Himalaya"/>
-        <a:font script="Thaa" typeface="MV Boli"/>
-        <a:font script="Deva" typeface="Mangal"/>
-        <a:font script="Telu" typeface="Gautami"/>
-        <a:font script="Taml" typeface="Latha"/>
-        <a:font script="Syrc" typeface="Estrangelo Edessa"/>
-        <a:font script="Orya" typeface="Kalinga"/>
-        <a:font script="Mlym" typeface="Kartika"/>
-        <a:font script="Laoo" typeface="DokChampa"/>
-        <a:font script="Sinh" typeface="Iskoola Pota"/>
-        <a:font script="Mong" typeface="Mongolian Baiti"/>
-        <a:font script="Viet" typeface="Times New Roman"/>
-        <a:font script="Uigh" typeface="Microsoft Uighur"/>
-      </a:majorFont>
-      <a:minorFont>
-        <a:latin typeface="Arial"/>
-        <a:ea typeface=""/>
-        <a:cs typeface=""/>
-        <a:font script="Jpan" typeface="ＭＳ Ｐゴシック"/>
-        <a:font script="Hang" typeface="맑은 고딕"/>
-        <a:font script="Hans" typeface="宋体"/>
-        <a:font script="Hant" typeface="新細明體"/>
-        <a:font script="Arab" typeface="Times New Roman"/>
-        <a:font script="Hebr" typeface="Times New Roman"/>
-        <a:font script="Thai" typeface="Angsana New"/>
-        <a:font script="Ethi" typeface="Nyala"/>
-        <a:font script="Beng" typeface="Vrinda"/>
-        <a:font script="Gujr" typeface="Shruti"/>
-        <a:font script="Khmr" typeface="MoolBoran"/>
-        <a:font script="Knda" typeface="Tunga"/>
-        <a:font script="Guru" typeface="Raavi"/>
-        <a:font script="Cans" typeface="Euphemia"/>
-        <a:font script="Cher" typeface="Plantagenet Cherokee"/>
-        <a:font script="Yiii" typeface="Microsoft Yi Baiti"/>
-        <a:font script="Tibt" typeface="Microsoft Himalaya"/>
-        <a:font script="Thaa" typeface="MV Boli"/>
-        <a:font script="Deva" typeface="Mangal"/>
-        <a:font script="Telu" typeface="Gautami"/>
-        <a:font script="Taml" typeface="Latha"/>
-        <a:font script="Syrc" typeface="Estrangelo Edessa"/>
-        <a:font script="Orya" typeface="Kalinga"/>
-        <a:font script="Mlym" typeface="Kartika"/>
-        <a:font script="Laoo" typeface="DokChampa"/>
-        <a:font script="Sinh" typeface="Iskoola Pota"/>
-        <a:font script="Mong" typeface="Mongolian Baiti"/>
-        <a:font script="Viet" typeface="Times New Roman"/>
-        <a:font script="Uigh" typeface="Microsoft Uighur"/>
-      </a:minorFont>
-    </a:fontScheme>
-    <a:fmtScheme name="Office">
-      <a:fillStyleLst>
-        <a:solidFill>
-          <a:schemeClr val="phClr"/>
-        </a:solidFill>
-        <a:gradFill rotWithShape="1">
-          <a:gsLst>
-            <a:gs pos="0">
-              <a:schemeClr val="phClr">
-                <a:tint val="50000"/>
-                <a:satMod val="300000"/>
-              </a:schemeClr>
-            </a:gs>
-            <a:gs pos="35000">
-              <a:schemeClr val="phClr">
-                <a:tint val="37000"/>
-                <a:satMod val="300000"/>
-              </a:schemeClr>
-            </a:gs>
-            <a:gs pos="100000">
-              <a:schemeClr val="phClr">
-                <a:tint val="15000"/>
-                <a:satMod val="350000"/>
-              </a:schemeClr>
-            </a:gs>
-          </a:gsLst>
-          <a:lin ang="16200000" scaled="1"/>
-        </a:gradFill>
-        <a:gradFill rotWithShape="1">
-          <a:gsLst>
-            <a:gs pos="0">
-              <a:schemeClr val="phClr">
-                <a:tint val="100000"/>
-                <a:shade val="100000"/>
-                <a:satMod val="130000"/>
-              </a:schemeClr>
-            </a:gs>
-            <a:gs pos="100000">
-              <a:schemeClr val="phClr">
-                <a:tint val="50000"/>
-                <a:shade val="100000"/>
-                <a:satMod val="350000"/>
-              </a:schemeClr>
-            </a:gs>
-          </a:gsLst>
-          <a:lin ang="16200000" scaled="0"/>
-        </a:gradFill>
-      </a:fillStyleLst>
-      <a:lnStyleLst>
-        <a:ln cap="flat" cmpd="sng" w="9525" algn="ctr">
-          <a:solidFill>
-            <a:schemeClr val="phClr">
-              <a:shade val="95000"/>
-              <a:satMod val="105000"/>
-            </a:schemeClr>
-          </a:solidFill>
-          <a:prstDash val="solid"/>
-        </a:ln>
-        <a:ln cap="flat" cmpd="sng" w="25400" algn="ctr">
-          <a:solidFill>
-            <a:schemeClr val="phClr"/>
-          </a:solidFill>
-          <a:prstDash val="solid"/>
-        </a:ln>
-        <a:ln cap="flat" cmpd="sng" w="38100" algn="ctr">
-          <a:solidFill>
-            <a:schemeClr val="phClr"/>
-          </a:solidFill>
-          <a:prstDash val="solid"/>
-        </a:ln>
-      </a:lnStyleLst>
-      <a:effectStyleLst>
-        <a:effectStyle>
-          <a:effectLst>
-            <a:outerShdw blurRad="40000" rotWithShape="0" dir="5400000" dist="20000">
-              <a:srgbClr val="000000">
-                <a:alpha val="38000"/>
-              </a:srgbClr>
-            </a:outerShdw>
-          </a:effectLst>
-        </a:effectStyle>
-        <a:effectStyle>
-          <a:effectLst>
-            <a:outerShdw blurRad="40000" rotWithShape="0" dir="5400000" dist="23000">
-              <a:srgbClr val="000000">
-                <a:alpha val="35000"/>
-              </a:srgbClr>
-            </a:outerShdw>
-          </a:effectLst>
-        </a:effectStyle>
-        <a:effectStyle>
-          <a:effectLst>
-            <a:outerShdw blurRad="40000" rotWithShape="0" dir="5400000" dist="23000">
-              <a:srgbClr val="000000">
-                <a:alpha val="35000"/>
-              </a:srgbClr>
-            </a:outerShdw>
-          </a:effectLst>
-          <a:scene3d>
-            <a:camera prst="orthographicFront">
-              <a:rot lat="0" lon="0" rev="0"/>
-            </a:camera>
-            <a:lightRig dir="t" rig="threePt">
-              <a:rot lat="0" lon="0" rev="1200000"/>
-            </a:lightRig>
-          </a:scene3d>
-          <a:sp3d>
-            <a:bevelT h="25400" w="63500"/>
-          </a:sp3d>
-        </a:effectStyle>
-      </a:effectStyleLst>
-      <a:bgFillStyleLst>
-        <a:solidFill>
-          <a:schemeClr val="phClr"/>
-        </a:solidFill>
-        <a:gradFill rotWithShape="1">
-          <a:gsLst>
-            <a:gs pos="0">
-              <a:schemeClr val="phClr">
-                <a:tint val="40000"/>
-                <a:satMod val="350000"/>
-              </a:schemeClr>
-            </a:gs>
-            <a:gs pos="40000">
-              <a:schemeClr val="phClr">
-                <a:tint val="45000"/>
-                <a:shade val="99000"/>
-                <a:satMod val="350000"/>
-              </a:schemeClr>
-            </a:gs>
-            <a:gs pos="100000">
-              <a:schemeClr val="phClr">
-                <a:shade val="20000"/>
-                <a:satMod val="255000"/>
-              </a:schemeClr>
-            </a:gs>
-          </a:gsLst>
-          <a:path path="circle">
-            <a:fillToRect b="180000" l="50000" r="50000" t="-80000"/>
-          </a:path>
-        </a:gradFill>
-        <a:gradFill rotWithShape="1">
-          <a:gsLst>
-            <a:gs pos="0">
-              <a:schemeClr val="phClr">
-                <a:tint val="80000"/>
-                <a:satMod val="300000"/>
-              </a:schemeClr>
-            </a:gs>
-            <a:gs pos="100000">
-              <a:schemeClr val="phClr">
-                <a:shade val="30000"/>
-                <a:satMod val="200000"/>
-              </a:schemeClr>
-            </a:gs>
-          </a:gsLst>
-          <a:path path="circle">
-            <a:fillToRect b="50000" l="50000" r="50000" t="50000"/>
-          </a:path>
-        </a:gradFill>
-      </a:bgFillStyleLst>
-    </a:fmtScheme>
-  </a:themeElements>
-</a:theme>
-</file>
-
-<file path=ppt/theme/theme2.xml><?xml version="1.0" encoding="utf-8"?>
 <a:theme xmlns:a="http://schemas.openxmlformats.org/drawingml/2006/main" xmlns:r="http://schemas.openxmlformats.org/officeDocument/2006/relationships" name="Office Theme">
   <a:themeElements>
     <a:clrScheme name="Office">
@@ -35500,6 +35295,283 @@
 </a:theme>
 </file>
 
+<file path=ppt/theme/theme2.xml><?xml version="1.0" encoding="utf-8"?>
+<a:theme xmlns:a="http://schemas.openxmlformats.org/drawingml/2006/main" xmlns:r="http://schemas.openxmlformats.org/officeDocument/2006/relationships" name="sketched">
+  <a:themeElements>
+    <a:clrScheme name="Custom 398">
+      <a:dk1>
+        <a:srgbClr val="000000"/>
+      </a:dk1>
+      <a:lt1>
+        <a:srgbClr val="FFFFFF"/>
+      </a:lt1>
+      <a:dk2>
+        <a:srgbClr val="51535D"/>
+      </a:dk2>
+      <a:lt2>
+        <a:srgbClr val="EDEDED"/>
+      </a:lt2>
+      <a:accent1>
+        <a:srgbClr val="676871"/>
+      </a:accent1>
+      <a:accent2>
+        <a:srgbClr val="988489"/>
+      </a:accent2>
+      <a:accent3>
+        <a:srgbClr val="6B7B67"/>
+      </a:accent3>
+      <a:accent4>
+        <a:srgbClr val="747B85"/>
+      </a:accent4>
+      <a:accent5>
+        <a:srgbClr val="A5A9AF"/>
+      </a:accent5>
+      <a:accent6>
+        <a:srgbClr val="85716D"/>
+      </a:accent6>
+      <a:hlink>
+        <a:srgbClr val="676871"/>
+      </a:hlink>
+      <a:folHlink>
+        <a:srgbClr val="3F414A"/>
+      </a:folHlink>
+    </a:clrScheme>
+    <a:fontScheme name="Office">
+      <a:majorFont>
+        <a:latin typeface="Arial"/>
+        <a:ea typeface=""/>
+        <a:cs typeface=""/>
+        <a:font script="Jpan" typeface="ＭＳ Ｐゴシック"/>
+        <a:font script="Hang" typeface="맑은 고딕"/>
+        <a:font script="Hans" typeface="宋体"/>
+        <a:font script="Hant" typeface="新細明體"/>
+        <a:font script="Arab" typeface="Times New Roman"/>
+        <a:font script="Hebr" typeface="Times New Roman"/>
+        <a:font script="Thai" typeface="Angsana New"/>
+        <a:font script="Ethi" typeface="Nyala"/>
+        <a:font script="Beng" typeface="Vrinda"/>
+        <a:font script="Gujr" typeface="Shruti"/>
+        <a:font script="Khmr" typeface="MoolBoran"/>
+        <a:font script="Knda" typeface="Tunga"/>
+        <a:font script="Guru" typeface="Raavi"/>
+        <a:font script="Cans" typeface="Euphemia"/>
+        <a:font script="Cher" typeface="Plantagenet Cherokee"/>
+        <a:font script="Yiii" typeface="Microsoft Yi Baiti"/>
+        <a:font script="Tibt" typeface="Microsoft Himalaya"/>
+        <a:font script="Thaa" typeface="MV Boli"/>
+        <a:font script="Deva" typeface="Mangal"/>
+        <a:font script="Telu" typeface="Gautami"/>
+        <a:font script="Taml" typeface="Latha"/>
+        <a:font script="Syrc" typeface="Estrangelo Edessa"/>
+        <a:font script="Orya" typeface="Kalinga"/>
+        <a:font script="Mlym" typeface="Kartika"/>
+        <a:font script="Laoo" typeface="DokChampa"/>
+        <a:font script="Sinh" typeface="Iskoola Pota"/>
+        <a:font script="Mong" typeface="Mongolian Baiti"/>
+        <a:font script="Viet" typeface="Times New Roman"/>
+        <a:font script="Uigh" typeface="Microsoft Uighur"/>
+      </a:majorFont>
+      <a:minorFont>
+        <a:latin typeface="Arial"/>
+        <a:ea typeface=""/>
+        <a:cs typeface=""/>
+        <a:font script="Jpan" typeface="ＭＳ Ｐゴシック"/>
+        <a:font script="Hang" typeface="맑은 고딕"/>
+        <a:font script="Hans" typeface="宋体"/>
+        <a:font script="Hant" typeface="新細明體"/>
+        <a:font script="Arab" typeface="Times New Roman"/>
+        <a:font script="Hebr" typeface="Times New Roman"/>
+        <a:font script="Thai" typeface="Angsana New"/>
+        <a:font script="Ethi" typeface="Nyala"/>
+        <a:font script="Beng" typeface="Vrinda"/>
+        <a:font script="Gujr" typeface="Shruti"/>
+        <a:font script="Khmr" typeface="MoolBoran"/>
+        <a:font script="Knda" typeface="Tunga"/>
+        <a:font script="Guru" typeface="Raavi"/>
+        <a:font script="Cans" typeface="Euphemia"/>
+        <a:font script="Cher" typeface="Plantagenet Cherokee"/>
+        <a:font script="Yiii" typeface="Microsoft Yi Baiti"/>
+        <a:font script="Tibt" typeface="Microsoft Himalaya"/>
+        <a:font script="Thaa" typeface="MV Boli"/>
+        <a:font script="Deva" typeface="Mangal"/>
+        <a:font script="Telu" typeface="Gautami"/>
+        <a:font script="Taml" typeface="Latha"/>
+        <a:font script="Syrc" typeface="Estrangelo Edessa"/>
+        <a:font script="Orya" typeface="Kalinga"/>
+        <a:font script="Mlym" typeface="Kartika"/>
+        <a:font script="Laoo" typeface="DokChampa"/>
+        <a:font script="Sinh" typeface="Iskoola Pota"/>
+        <a:font script="Mong" typeface="Mongolian Baiti"/>
+        <a:font script="Viet" typeface="Times New Roman"/>
+        <a:font script="Uigh" typeface="Microsoft Uighur"/>
+      </a:minorFont>
+    </a:fontScheme>
+    <a:fmtScheme name="Office">
+      <a:fillStyleLst>
+        <a:solidFill>
+          <a:schemeClr val="phClr"/>
+        </a:solidFill>
+        <a:gradFill rotWithShape="1">
+          <a:gsLst>
+            <a:gs pos="0">
+              <a:schemeClr val="phClr">
+                <a:tint val="50000"/>
+                <a:satMod val="300000"/>
+              </a:schemeClr>
+            </a:gs>
+            <a:gs pos="35000">
+              <a:schemeClr val="phClr">
+                <a:tint val="37000"/>
+                <a:satMod val="300000"/>
+              </a:schemeClr>
+            </a:gs>
+            <a:gs pos="100000">
+              <a:schemeClr val="phClr">
+                <a:tint val="15000"/>
+                <a:satMod val="350000"/>
+              </a:schemeClr>
+            </a:gs>
+          </a:gsLst>
+          <a:lin ang="16200000" scaled="1"/>
+        </a:gradFill>
+        <a:gradFill rotWithShape="1">
+          <a:gsLst>
+            <a:gs pos="0">
+              <a:schemeClr val="phClr">
+                <a:tint val="100000"/>
+                <a:shade val="100000"/>
+                <a:satMod val="130000"/>
+              </a:schemeClr>
+            </a:gs>
+            <a:gs pos="100000">
+              <a:schemeClr val="phClr">
+                <a:tint val="50000"/>
+                <a:shade val="100000"/>
+                <a:satMod val="350000"/>
+              </a:schemeClr>
+            </a:gs>
+          </a:gsLst>
+          <a:lin ang="16200000" scaled="0"/>
+        </a:gradFill>
+      </a:fillStyleLst>
+      <a:lnStyleLst>
+        <a:ln cap="flat" cmpd="sng" w="9525" algn="ctr">
+          <a:solidFill>
+            <a:schemeClr val="phClr">
+              <a:shade val="95000"/>
+              <a:satMod val="105000"/>
+            </a:schemeClr>
+          </a:solidFill>
+          <a:prstDash val="solid"/>
+        </a:ln>
+        <a:ln cap="flat" cmpd="sng" w="25400" algn="ctr">
+          <a:solidFill>
+            <a:schemeClr val="phClr"/>
+          </a:solidFill>
+          <a:prstDash val="solid"/>
+        </a:ln>
+        <a:ln cap="flat" cmpd="sng" w="38100" algn="ctr">
+          <a:solidFill>
+            <a:schemeClr val="phClr"/>
+          </a:solidFill>
+          <a:prstDash val="solid"/>
+        </a:ln>
+      </a:lnStyleLst>
+      <a:effectStyleLst>
+        <a:effectStyle>
+          <a:effectLst>
+            <a:outerShdw blurRad="40000" rotWithShape="0" dir="5400000" dist="20000">
+              <a:srgbClr val="000000">
+                <a:alpha val="38000"/>
+              </a:srgbClr>
+            </a:outerShdw>
+          </a:effectLst>
+        </a:effectStyle>
+        <a:effectStyle>
+          <a:effectLst>
+            <a:outerShdw blurRad="40000" rotWithShape="0" dir="5400000" dist="23000">
+              <a:srgbClr val="000000">
+                <a:alpha val="35000"/>
+              </a:srgbClr>
+            </a:outerShdw>
+          </a:effectLst>
+        </a:effectStyle>
+        <a:effectStyle>
+          <a:effectLst>
+            <a:outerShdw blurRad="40000" rotWithShape="0" dir="5400000" dist="23000">
+              <a:srgbClr val="000000">
+                <a:alpha val="35000"/>
+              </a:srgbClr>
+            </a:outerShdw>
+          </a:effectLst>
+          <a:scene3d>
+            <a:camera prst="orthographicFront">
+              <a:rot lat="0" lon="0" rev="0"/>
+            </a:camera>
+            <a:lightRig dir="t" rig="threePt">
+              <a:rot lat="0" lon="0" rev="1200000"/>
+            </a:lightRig>
+          </a:scene3d>
+          <a:sp3d>
+            <a:bevelT h="25400" w="63500"/>
+          </a:sp3d>
+        </a:effectStyle>
+      </a:effectStyleLst>
+      <a:bgFillStyleLst>
+        <a:solidFill>
+          <a:schemeClr val="phClr"/>
+        </a:solidFill>
+        <a:gradFill rotWithShape="1">
+          <a:gsLst>
+            <a:gs pos="0">
+              <a:schemeClr val="phClr">
+                <a:tint val="40000"/>
+                <a:satMod val="350000"/>
+              </a:schemeClr>
+            </a:gs>
+            <a:gs pos="40000">
+              <a:schemeClr val="phClr">
+                <a:tint val="45000"/>
+                <a:shade val="99000"/>
+                <a:satMod val="350000"/>
+              </a:schemeClr>
+            </a:gs>
+            <a:gs pos="100000">
+              <a:schemeClr val="phClr">
+                <a:shade val="20000"/>
+                <a:satMod val="255000"/>
+              </a:schemeClr>
+            </a:gs>
+          </a:gsLst>
+          <a:path path="circle">
+            <a:fillToRect b="180000" l="50000" r="50000" t="-80000"/>
+          </a:path>
+        </a:gradFill>
+        <a:gradFill rotWithShape="1">
+          <a:gsLst>
+            <a:gs pos="0">
+              <a:schemeClr val="phClr">
+                <a:tint val="80000"/>
+                <a:satMod val="300000"/>
+              </a:schemeClr>
+            </a:gs>
+            <a:gs pos="100000">
+              <a:schemeClr val="phClr">
+                <a:shade val="30000"/>
+                <a:satMod val="200000"/>
+              </a:schemeClr>
+            </a:gs>
+          </a:gsLst>
+          <a:path path="circle">
+            <a:fillToRect b="50000" l="50000" r="50000" t="50000"/>
+          </a:path>
+        </a:gradFill>
+      </a:bgFillStyleLst>
+    </a:fmtScheme>
+  </a:themeElements>
+</a:theme>
+</file>
+
 <file path=ppt/theme/theme3.xml><?xml version="1.0" encoding="utf-8"?>
 <a:theme xmlns:a="http://schemas.openxmlformats.org/drawingml/2006/main" xmlns:r="http://schemas.openxmlformats.org/officeDocument/2006/relationships" name="Custom Theme">
   <a:themeElements>

</xml_diff>

<commit_message>
Update with interests of people.
</commit_message>
<xml_diff>
--- a/Meeting20150425/Lack of manpower.pptx
+++ b/Meeting20150425/Lack of manpower.pptx
@@ -30563,7 +30563,7 @@
             </a:pPr>
             <a:r>
               <a:rPr lang="nl"/>
-              <a:t>Development: ? </a:t>
+              <a:t>Development: WDM</a:t>
             </a:r>
           </a:p>
           <a:p>
@@ -30599,7 +30599,7 @@
             </a:pPr>
             <a:r>
               <a:rPr lang="nl"/>
-              <a:t>Deepsky-database: ?</a:t>
+              <a:t>Deepsky-database: EvdJ</a:t>
             </a:r>
           </a:p>
           <a:p>
@@ -30986,7 +30986,7 @@
             <a:tbl>
               <a:tblPr>
                 <a:noFill/>
-                <a:tableStyleId>{2CA20650-118A-4380-843D-0F94B0586DC5}</a:tableStyleId>
+                <a:tableStyleId>{6F3971F6-C8E7-4DE4-A285-0F7F7C67FEB2}</a:tableStyleId>
               </a:tblPr>
               <a:tblGrid>
                 <a:gridCol w="3619500"/>
@@ -31535,7 +31535,7 @@
             <a:tbl>
               <a:tblPr>
                 <a:noFill/>
-                <a:tableStyleId>{5760CE72-62FD-4AC7-AF24-63D294D96567}</a:tableStyleId>
+                <a:tableStyleId>{D7A304F0-313B-42BD-B8AD-00FCE21F1C61}</a:tableStyleId>
               </a:tblPr>
               <a:tblGrid>
                 <a:gridCol w="3619500"/>
@@ -32012,7 +32012,7 @@
             <a:tbl>
               <a:tblPr>
                 <a:noFill/>
-                <a:tableStyleId>{42BB5316-C967-42C2-9EFE-D8723F1E1BD7}</a:tableStyleId>
+                <a:tableStyleId>{F17281D8-5D7B-4E76-8C8A-53B53F1A319D}</a:tableStyleId>
               </a:tblPr>
               <a:tblGrid>
                 <a:gridCol w="3619500"/>
@@ -32561,7 +32561,7 @@
             <a:tbl>
               <a:tblPr>
                 <a:noFill/>
-                <a:tableStyleId>{5EF351C5-6A7E-4237-8E88-583FE54A24B3}</a:tableStyleId>
+                <a:tableStyleId>{3AAB625D-7A7B-45B9-B50C-4F5CE6590BF7}</a:tableStyleId>
               </a:tblPr>
               <a:tblGrid>
                 <a:gridCol w="3619500"/>
@@ -33110,7 +33110,7 @@
             <a:tbl>
               <a:tblPr>
                 <a:noFill/>
-                <a:tableStyleId>{FB4A89CA-87EF-463F-B733-6BD7B38B6187}</a:tableStyleId>
+                <a:tableStyleId>{DF7C1563-4758-4A96-9472-AD6E870FD448}</a:tableStyleId>
               </a:tblPr>
               <a:tblGrid>
                 <a:gridCol w="3619500"/>
@@ -33591,7 +33591,7 @@
             <a:tbl>
               <a:tblPr>
                 <a:noFill/>
-                <a:tableStyleId>{B019918A-D1DF-4F18-8FFA-F23C8E78E4C9}</a:tableStyleId>
+                <a:tableStyleId>{88AA6145-3139-4354-AEA4-1FF8BFAE4B8C}</a:tableStyleId>
               </a:tblPr>
               <a:tblGrid>
                 <a:gridCol w="3619500"/>
@@ -33769,8 +33769,12 @@
                         <a:buNone/>
                       </a:pPr>
                       <a:r>
-                        <a:rPr lang="nl"/>
-                        <a:t>?</a:t>
+                        <a:rPr lang="nl">
+                          <a:solidFill>
+                            <a:srgbClr val="FF0000"/>
+                          </a:solidFill>
+                        </a:rPr>
+                        <a:t>X</a:t>
                       </a:r>
                     </a:p>
                   </a:txBody>
@@ -33861,8 +33865,12 @@
                         <a:buNone/>
                       </a:pPr>
                       <a:r>
-                        <a:rPr lang="nl"/>
-                        <a:t>?</a:t>
+                        <a:rPr lang="nl">
+                          <a:solidFill>
+                            <a:srgbClr val="FF0000"/>
+                          </a:solidFill>
+                        </a:rPr>
+                        <a:t>X</a:t>
                       </a:r>
                     </a:p>
                   </a:txBody>
@@ -33905,8 +33913,12 @@
                         <a:buNone/>
                       </a:pPr>
                       <a:r>
-                        <a:rPr lang="nl"/>
-                        <a:t>?</a:t>
+                        <a:rPr lang="nl">
+                          <a:solidFill>
+                            <a:srgbClr val="FF0000"/>
+                          </a:solidFill>
+                        </a:rPr>
+                        <a:t>X</a:t>
                       </a:r>
                     </a:p>
                   </a:txBody>
@@ -34128,7 +34140,7 @@
             <a:tbl>
               <a:tblPr>
                 <a:noFill/>
-                <a:tableStyleId>{CC551C95-95A1-4D0E-B86D-9F27E93733F1}</a:tableStyleId>
+                <a:tableStyleId>{C4E02172-A11A-4333-AC28-C11DEA62CD45}</a:tableStyleId>
               </a:tblPr>
               <a:tblGrid>
                 <a:gridCol w="3619500"/>
@@ -34171,7 +34183,51 @@
                       </a:pPr>
                       <a:r>
                         <a:rPr lang="nl"/>
-                        <a:t>php:      mysql:      android:      iOS:</a:t>
+                        <a:t>php: </a:t>
+                      </a:r>
+                      <a:r>
+                        <a:rPr lang="nl">
+                          <a:solidFill>
+                            <a:srgbClr val="FF0000"/>
+                          </a:solidFill>
+                        </a:rPr>
+                        <a:t>X</a:t>
+                      </a:r>
+                      <a:r>
+                        <a:rPr lang="nl"/>
+                        <a:t>    mysql: </a:t>
+                      </a:r>
+                      <a:r>
+                        <a:rPr lang="nl">
+                          <a:solidFill>
+                            <a:srgbClr val="FF0000"/>
+                          </a:solidFill>
+                        </a:rPr>
+                        <a:t>X</a:t>
+                      </a:r>
+                      <a:r>
+                        <a:rPr lang="nl"/>
+                        <a:t>    android: </a:t>
+                      </a:r>
+                      <a:r>
+                        <a:rPr lang="nl">
+                          <a:solidFill>
+                            <a:srgbClr val="FF0000"/>
+                          </a:solidFill>
+                        </a:rPr>
+                        <a:t>X</a:t>
+                      </a:r>
+                      <a:r>
+                        <a:rPr lang="nl"/>
+                        <a:t>    iOS: </a:t>
+                      </a:r>
+                      <a:r>
+                        <a:rPr lang="nl">
+                          <a:solidFill>
+                            <a:srgbClr val="FF0000"/>
+                          </a:solidFill>
+                        </a:rPr>
+                        <a:t>X</a:t>
                       </a:r>
                     </a:p>
                   </a:txBody>
@@ -34214,9 +34270,13 @@
                         <a:buNone/>
                       </a:pPr>
                       <a:r>
-                        <a:t/>
+                        <a:rPr lang="nl">
+                          <a:solidFill>
+                            <a:srgbClr val="FF0000"/>
+                          </a:solidFill>
+                        </a:rPr>
+                        <a:t>X</a:t>
                       </a:r>
-                      <a:endParaRPr/>
                     </a:p>
                   </a:txBody>
                   <a:tcPr marT="91425" marB="91425" marR="91425" marL="91425"/>
@@ -34258,9 +34318,13 @@
                         <a:buNone/>
                       </a:pPr>
                       <a:r>
-                        <a:t/>
+                        <a:rPr lang="nl">
+                          <a:solidFill>
+                            <a:srgbClr val="00FF00"/>
+                          </a:solidFill>
+                        </a:rPr>
+                        <a:t>V</a:t>
                       </a:r>
-                      <a:endParaRPr/>
                     </a:p>
                   </a:txBody>
                   <a:tcPr marT="91425" marB="91425" marR="91425" marL="91425"/>
@@ -34302,9 +34366,13 @@
                         <a:buNone/>
                       </a:pPr>
                       <a:r>
-                        <a:t/>
+                        <a:rPr lang="nl">
+                          <a:solidFill>
+                            <a:srgbClr val="00FF00"/>
+                          </a:solidFill>
+                        </a:rPr>
+                        <a:t>V (Lead)</a:t>
                       </a:r>
-                      <a:endParaRPr/>
                     </a:p>
                   </a:txBody>
                   <a:tcPr marT="91425" marB="91425" marR="91425" marL="91425"/>
@@ -34346,9 +34414,13 @@
                         <a:buNone/>
                       </a:pPr>
                       <a:r>
-                        <a:t/>
+                        <a:rPr lang="nl">
+                          <a:solidFill>
+                            <a:srgbClr val="00FF00"/>
+                          </a:solidFill>
+                        </a:rPr>
+                        <a:t>V</a:t>
                       </a:r>
-                      <a:endParaRPr/>
                     </a:p>
                   </a:txBody>
                   <a:tcPr marT="91425" marB="91425" marR="91425" marL="91425"/>
@@ -34390,9 +34462,13 @@
                         <a:buNone/>
                       </a:pPr>
                       <a:r>
-                        <a:t/>
+                        <a:rPr lang="nl">
+                          <a:solidFill>
+                            <a:srgbClr val="00FF00"/>
+                          </a:solidFill>
+                        </a:rPr>
+                        <a:t>V</a:t>
                       </a:r>
-                      <a:endParaRPr/>
                     </a:p>
                   </a:txBody>
                   <a:tcPr marT="91425" marB="91425" marR="91425" marL="91425"/>
@@ -34434,9 +34510,13 @@
                         <a:buNone/>
                       </a:pPr>
                       <a:r>
-                        <a:t/>
+                        <a:rPr lang="nl">
+                          <a:solidFill>
+                            <a:srgbClr val="FF0000"/>
+                          </a:solidFill>
+                        </a:rPr>
+                        <a:t>X</a:t>
                       </a:r>
-                      <a:endParaRPr/>
                     </a:p>
                   </a:txBody>
                   <a:tcPr marT="91425" marB="91425" marR="91425" marL="91425"/>
@@ -34478,9 +34558,13 @@
                         <a:buNone/>
                       </a:pPr>
                       <a:r>
-                        <a:t/>
+                        <a:rPr lang="nl">
+                          <a:solidFill>
+                            <a:srgbClr val="FF0000"/>
+                          </a:solidFill>
+                        </a:rPr>
+                        <a:t>X</a:t>
                       </a:r>
-                      <a:endParaRPr/>
                     </a:p>
                   </a:txBody>
                   <a:tcPr marT="91425" marB="91425" marR="91425" marL="91425"/>
@@ -34605,7 +34689,7 @@
             <a:tbl>
               <a:tblPr>
                 <a:noFill/>
-                <a:tableStyleId>{3AAC8EF6-CAD2-43E0-9A66-B28941E3B0C4}</a:tableStyleId>
+                <a:tableStyleId>{4E0AA120-28A6-443F-85A9-BCC0C0008E91}</a:tableStyleId>
               </a:tblPr>
               <a:tblGrid>
                 <a:gridCol w="3619500"/>
@@ -35039,6 +35123,560 @@
 </file>
 
 <file path=ppt/theme/theme1.xml><?xml version="1.0" encoding="utf-8"?>
+<a:theme xmlns:a="http://schemas.openxmlformats.org/drawingml/2006/main" xmlns:r="http://schemas.openxmlformats.org/officeDocument/2006/relationships" name="sketched">
+  <a:themeElements>
+    <a:clrScheme name="Custom 398">
+      <a:dk1>
+        <a:srgbClr val="000000"/>
+      </a:dk1>
+      <a:lt1>
+        <a:srgbClr val="FFFFFF"/>
+      </a:lt1>
+      <a:dk2>
+        <a:srgbClr val="51535D"/>
+      </a:dk2>
+      <a:lt2>
+        <a:srgbClr val="EDEDED"/>
+      </a:lt2>
+      <a:accent1>
+        <a:srgbClr val="676871"/>
+      </a:accent1>
+      <a:accent2>
+        <a:srgbClr val="988489"/>
+      </a:accent2>
+      <a:accent3>
+        <a:srgbClr val="6B7B67"/>
+      </a:accent3>
+      <a:accent4>
+        <a:srgbClr val="747B85"/>
+      </a:accent4>
+      <a:accent5>
+        <a:srgbClr val="A5A9AF"/>
+      </a:accent5>
+      <a:accent6>
+        <a:srgbClr val="85716D"/>
+      </a:accent6>
+      <a:hlink>
+        <a:srgbClr val="676871"/>
+      </a:hlink>
+      <a:folHlink>
+        <a:srgbClr val="3F414A"/>
+      </a:folHlink>
+    </a:clrScheme>
+    <a:fontScheme name="Office">
+      <a:majorFont>
+        <a:latin typeface="Arial"/>
+        <a:ea typeface=""/>
+        <a:cs typeface=""/>
+        <a:font script="Jpan" typeface="ＭＳ Ｐゴシック"/>
+        <a:font script="Hang" typeface="맑은 고딕"/>
+        <a:font script="Hans" typeface="宋体"/>
+        <a:font script="Hant" typeface="新細明體"/>
+        <a:font script="Arab" typeface="Times New Roman"/>
+        <a:font script="Hebr" typeface="Times New Roman"/>
+        <a:font script="Thai" typeface="Angsana New"/>
+        <a:font script="Ethi" typeface="Nyala"/>
+        <a:font script="Beng" typeface="Vrinda"/>
+        <a:font script="Gujr" typeface="Shruti"/>
+        <a:font script="Khmr" typeface="MoolBoran"/>
+        <a:font script="Knda" typeface="Tunga"/>
+        <a:font script="Guru" typeface="Raavi"/>
+        <a:font script="Cans" typeface="Euphemia"/>
+        <a:font script="Cher" typeface="Plantagenet Cherokee"/>
+        <a:font script="Yiii" typeface="Microsoft Yi Baiti"/>
+        <a:font script="Tibt" typeface="Microsoft Himalaya"/>
+        <a:font script="Thaa" typeface="MV Boli"/>
+        <a:font script="Deva" typeface="Mangal"/>
+        <a:font script="Telu" typeface="Gautami"/>
+        <a:font script="Taml" typeface="Latha"/>
+        <a:font script="Syrc" typeface="Estrangelo Edessa"/>
+        <a:font script="Orya" typeface="Kalinga"/>
+        <a:font script="Mlym" typeface="Kartika"/>
+        <a:font script="Laoo" typeface="DokChampa"/>
+        <a:font script="Sinh" typeface="Iskoola Pota"/>
+        <a:font script="Mong" typeface="Mongolian Baiti"/>
+        <a:font script="Viet" typeface="Times New Roman"/>
+        <a:font script="Uigh" typeface="Microsoft Uighur"/>
+      </a:majorFont>
+      <a:minorFont>
+        <a:latin typeface="Arial"/>
+        <a:ea typeface=""/>
+        <a:cs typeface=""/>
+        <a:font script="Jpan" typeface="ＭＳ Ｐゴシック"/>
+        <a:font script="Hang" typeface="맑은 고딕"/>
+        <a:font script="Hans" typeface="宋体"/>
+        <a:font script="Hant" typeface="新細明體"/>
+        <a:font script="Arab" typeface="Times New Roman"/>
+        <a:font script="Hebr" typeface="Times New Roman"/>
+        <a:font script="Thai" typeface="Angsana New"/>
+        <a:font script="Ethi" typeface="Nyala"/>
+        <a:font script="Beng" typeface="Vrinda"/>
+        <a:font script="Gujr" typeface="Shruti"/>
+        <a:font script="Khmr" typeface="MoolBoran"/>
+        <a:font script="Knda" typeface="Tunga"/>
+        <a:font script="Guru" typeface="Raavi"/>
+        <a:font script="Cans" typeface="Euphemia"/>
+        <a:font script="Cher" typeface="Plantagenet Cherokee"/>
+        <a:font script="Yiii" typeface="Microsoft Yi Baiti"/>
+        <a:font script="Tibt" typeface="Microsoft Himalaya"/>
+        <a:font script="Thaa" typeface="MV Boli"/>
+        <a:font script="Deva" typeface="Mangal"/>
+        <a:font script="Telu" typeface="Gautami"/>
+        <a:font script="Taml" typeface="Latha"/>
+        <a:font script="Syrc" typeface="Estrangelo Edessa"/>
+        <a:font script="Orya" typeface="Kalinga"/>
+        <a:font script="Mlym" typeface="Kartika"/>
+        <a:font script="Laoo" typeface="DokChampa"/>
+        <a:font script="Sinh" typeface="Iskoola Pota"/>
+        <a:font script="Mong" typeface="Mongolian Baiti"/>
+        <a:font script="Viet" typeface="Times New Roman"/>
+        <a:font script="Uigh" typeface="Microsoft Uighur"/>
+      </a:minorFont>
+    </a:fontScheme>
+    <a:fmtScheme name="Office">
+      <a:fillStyleLst>
+        <a:solidFill>
+          <a:schemeClr val="phClr"/>
+        </a:solidFill>
+        <a:gradFill rotWithShape="1">
+          <a:gsLst>
+            <a:gs pos="0">
+              <a:schemeClr val="phClr">
+                <a:tint val="50000"/>
+                <a:satMod val="300000"/>
+              </a:schemeClr>
+            </a:gs>
+            <a:gs pos="35000">
+              <a:schemeClr val="phClr">
+                <a:tint val="37000"/>
+                <a:satMod val="300000"/>
+              </a:schemeClr>
+            </a:gs>
+            <a:gs pos="100000">
+              <a:schemeClr val="phClr">
+                <a:tint val="15000"/>
+                <a:satMod val="350000"/>
+              </a:schemeClr>
+            </a:gs>
+          </a:gsLst>
+          <a:lin ang="16200000" scaled="1"/>
+        </a:gradFill>
+        <a:gradFill rotWithShape="1">
+          <a:gsLst>
+            <a:gs pos="0">
+              <a:schemeClr val="phClr">
+                <a:tint val="100000"/>
+                <a:shade val="100000"/>
+                <a:satMod val="130000"/>
+              </a:schemeClr>
+            </a:gs>
+            <a:gs pos="100000">
+              <a:schemeClr val="phClr">
+                <a:tint val="50000"/>
+                <a:shade val="100000"/>
+                <a:satMod val="350000"/>
+              </a:schemeClr>
+            </a:gs>
+          </a:gsLst>
+          <a:lin ang="16200000" scaled="0"/>
+        </a:gradFill>
+      </a:fillStyleLst>
+      <a:lnStyleLst>
+        <a:ln cap="flat" cmpd="sng" w="9525" algn="ctr">
+          <a:solidFill>
+            <a:schemeClr val="phClr">
+              <a:shade val="95000"/>
+              <a:satMod val="105000"/>
+            </a:schemeClr>
+          </a:solidFill>
+          <a:prstDash val="solid"/>
+        </a:ln>
+        <a:ln cap="flat" cmpd="sng" w="25400" algn="ctr">
+          <a:solidFill>
+            <a:schemeClr val="phClr"/>
+          </a:solidFill>
+          <a:prstDash val="solid"/>
+        </a:ln>
+        <a:ln cap="flat" cmpd="sng" w="38100" algn="ctr">
+          <a:solidFill>
+            <a:schemeClr val="phClr"/>
+          </a:solidFill>
+          <a:prstDash val="solid"/>
+        </a:ln>
+      </a:lnStyleLst>
+      <a:effectStyleLst>
+        <a:effectStyle>
+          <a:effectLst>
+            <a:outerShdw blurRad="40000" rotWithShape="0" dir="5400000" dist="20000">
+              <a:srgbClr val="000000">
+                <a:alpha val="38000"/>
+              </a:srgbClr>
+            </a:outerShdw>
+          </a:effectLst>
+        </a:effectStyle>
+        <a:effectStyle>
+          <a:effectLst>
+            <a:outerShdw blurRad="40000" rotWithShape="0" dir="5400000" dist="23000">
+              <a:srgbClr val="000000">
+                <a:alpha val="35000"/>
+              </a:srgbClr>
+            </a:outerShdw>
+          </a:effectLst>
+        </a:effectStyle>
+        <a:effectStyle>
+          <a:effectLst>
+            <a:outerShdw blurRad="40000" rotWithShape="0" dir="5400000" dist="23000">
+              <a:srgbClr val="000000">
+                <a:alpha val="35000"/>
+              </a:srgbClr>
+            </a:outerShdw>
+          </a:effectLst>
+          <a:scene3d>
+            <a:camera prst="orthographicFront">
+              <a:rot lat="0" lon="0" rev="0"/>
+            </a:camera>
+            <a:lightRig dir="t" rig="threePt">
+              <a:rot lat="0" lon="0" rev="1200000"/>
+            </a:lightRig>
+          </a:scene3d>
+          <a:sp3d>
+            <a:bevelT h="25400" w="63500"/>
+          </a:sp3d>
+        </a:effectStyle>
+      </a:effectStyleLst>
+      <a:bgFillStyleLst>
+        <a:solidFill>
+          <a:schemeClr val="phClr"/>
+        </a:solidFill>
+        <a:gradFill rotWithShape="1">
+          <a:gsLst>
+            <a:gs pos="0">
+              <a:schemeClr val="phClr">
+                <a:tint val="40000"/>
+                <a:satMod val="350000"/>
+              </a:schemeClr>
+            </a:gs>
+            <a:gs pos="40000">
+              <a:schemeClr val="phClr">
+                <a:tint val="45000"/>
+                <a:shade val="99000"/>
+                <a:satMod val="350000"/>
+              </a:schemeClr>
+            </a:gs>
+            <a:gs pos="100000">
+              <a:schemeClr val="phClr">
+                <a:shade val="20000"/>
+                <a:satMod val="255000"/>
+              </a:schemeClr>
+            </a:gs>
+          </a:gsLst>
+          <a:path path="circle">
+            <a:fillToRect b="180000" l="50000" r="50000" t="-80000"/>
+          </a:path>
+        </a:gradFill>
+        <a:gradFill rotWithShape="1">
+          <a:gsLst>
+            <a:gs pos="0">
+              <a:schemeClr val="phClr">
+                <a:tint val="80000"/>
+                <a:satMod val="300000"/>
+              </a:schemeClr>
+            </a:gs>
+            <a:gs pos="100000">
+              <a:schemeClr val="phClr">
+                <a:shade val="30000"/>
+                <a:satMod val="200000"/>
+              </a:schemeClr>
+            </a:gs>
+          </a:gsLst>
+          <a:path path="circle">
+            <a:fillToRect b="50000" l="50000" r="50000" t="50000"/>
+          </a:path>
+        </a:gradFill>
+      </a:bgFillStyleLst>
+    </a:fmtScheme>
+  </a:themeElements>
+</a:theme>
+</file>
+
+<file path=ppt/theme/theme2.xml><?xml version="1.0" encoding="utf-8"?>
+<a:theme xmlns:a="http://schemas.openxmlformats.org/drawingml/2006/main" xmlns:r="http://schemas.openxmlformats.org/officeDocument/2006/relationships" name="Custom Theme">
+  <a:themeElements>
+    <a:clrScheme name="Default">
+      <a:dk1>
+        <a:srgbClr val="000000"/>
+      </a:dk1>
+      <a:lt1>
+        <a:srgbClr val="FFFFFF"/>
+      </a:lt1>
+      <a:dk2>
+        <a:srgbClr val="158158"/>
+      </a:dk2>
+      <a:lt2>
+        <a:srgbClr val="F3F3F3"/>
+      </a:lt2>
+      <a:accent1>
+        <a:srgbClr val="058DC7"/>
+      </a:accent1>
+      <a:accent2>
+        <a:srgbClr val="50B432"/>
+      </a:accent2>
+      <a:accent3>
+        <a:srgbClr val="ED561B"/>
+      </a:accent3>
+      <a:accent4>
+        <a:srgbClr val="EDEF00"/>
+      </a:accent4>
+      <a:accent5>
+        <a:srgbClr val="24CBE5"/>
+      </a:accent5>
+      <a:accent6>
+        <a:srgbClr val="64E572"/>
+      </a:accent6>
+      <a:hlink>
+        <a:srgbClr val="2200CC"/>
+      </a:hlink>
+      <a:folHlink>
+        <a:srgbClr val="551A8B"/>
+      </a:folHlink>
+    </a:clrScheme>
+    <a:fontScheme name="Office">
+      <a:majorFont>
+        <a:latin typeface="Arial"/>
+        <a:ea typeface=""/>
+        <a:cs typeface=""/>
+        <a:font script="Jpan" typeface="ＭＳ Ｐゴシック"/>
+        <a:font script="Hang" typeface="맑은 고딕"/>
+        <a:font script="Hans" typeface="宋体"/>
+        <a:font script="Hant" typeface="新細明體"/>
+        <a:font script="Arab" typeface="Times New Roman"/>
+        <a:font script="Hebr" typeface="Times New Roman"/>
+        <a:font script="Thai" typeface="Angsana New"/>
+        <a:font script="Ethi" typeface="Nyala"/>
+        <a:font script="Beng" typeface="Vrinda"/>
+        <a:font script="Gujr" typeface="Shruti"/>
+        <a:font script="Khmr" typeface="MoolBoran"/>
+        <a:font script="Knda" typeface="Tunga"/>
+        <a:font script="Guru" typeface="Raavi"/>
+        <a:font script="Cans" typeface="Euphemia"/>
+        <a:font script="Cher" typeface="Plantagenet Cherokee"/>
+        <a:font script="Yiii" typeface="Microsoft Yi Baiti"/>
+        <a:font script="Tibt" typeface="Microsoft Himalaya"/>
+        <a:font script="Thaa" typeface="MV Boli"/>
+        <a:font script="Deva" typeface="Mangal"/>
+        <a:font script="Telu" typeface="Gautami"/>
+        <a:font script="Taml" typeface="Latha"/>
+        <a:font script="Syrc" typeface="Estrangelo Edessa"/>
+        <a:font script="Orya" typeface="Kalinga"/>
+        <a:font script="Mlym" typeface="Kartika"/>
+        <a:font script="Laoo" typeface="DokChampa"/>
+        <a:font script="Sinh" typeface="Iskoola Pota"/>
+        <a:font script="Mong" typeface="Mongolian Baiti"/>
+        <a:font script="Viet" typeface="Times New Roman"/>
+        <a:font script="Uigh" typeface="Microsoft Uighur"/>
+      </a:majorFont>
+      <a:minorFont>
+        <a:latin typeface="Arial"/>
+        <a:ea typeface=""/>
+        <a:cs typeface=""/>
+        <a:font script="Jpan" typeface="ＭＳ Ｐゴシック"/>
+        <a:font script="Hang" typeface="맑은 고딕"/>
+        <a:font script="Hans" typeface="宋体"/>
+        <a:font script="Hant" typeface="新細明體"/>
+        <a:font script="Arab" typeface="Times New Roman"/>
+        <a:font script="Hebr" typeface="Times New Roman"/>
+        <a:font script="Thai" typeface="Angsana New"/>
+        <a:font script="Ethi" typeface="Nyala"/>
+        <a:font script="Beng" typeface="Vrinda"/>
+        <a:font script="Gujr" typeface="Shruti"/>
+        <a:font script="Khmr" typeface="MoolBoran"/>
+        <a:font script="Knda" typeface="Tunga"/>
+        <a:font script="Guru" typeface="Raavi"/>
+        <a:font script="Cans" typeface="Euphemia"/>
+        <a:font script="Cher" typeface="Plantagenet Cherokee"/>
+        <a:font script="Yiii" typeface="Microsoft Yi Baiti"/>
+        <a:font script="Tibt" typeface="Microsoft Himalaya"/>
+        <a:font script="Thaa" typeface="MV Boli"/>
+        <a:font script="Deva" typeface="Mangal"/>
+        <a:font script="Telu" typeface="Gautami"/>
+        <a:font script="Taml" typeface="Latha"/>
+        <a:font script="Syrc" typeface="Estrangelo Edessa"/>
+        <a:font script="Orya" typeface="Kalinga"/>
+        <a:font script="Mlym" typeface="Kartika"/>
+        <a:font script="Laoo" typeface="DokChampa"/>
+        <a:font script="Sinh" typeface="Iskoola Pota"/>
+        <a:font script="Mong" typeface="Mongolian Baiti"/>
+        <a:font script="Viet" typeface="Times New Roman"/>
+        <a:font script="Uigh" typeface="Microsoft Uighur"/>
+      </a:minorFont>
+    </a:fontScheme>
+    <a:fmtScheme name="Office">
+      <a:fillStyleLst>
+        <a:solidFill>
+          <a:schemeClr val="phClr"/>
+        </a:solidFill>
+        <a:gradFill rotWithShape="1">
+          <a:gsLst>
+            <a:gs pos="0">
+              <a:schemeClr val="phClr">
+                <a:tint val="50000"/>
+                <a:satMod val="300000"/>
+              </a:schemeClr>
+            </a:gs>
+            <a:gs pos="35000">
+              <a:schemeClr val="phClr">
+                <a:tint val="37000"/>
+                <a:satMod val="300000"/>
+              </a:schemeClr>
+            </a:gs>
+            <a:gs pos="100000">
+              <a:schemeClr val="phClr">
+                <a:tint val="15000"/>
+                <a:satMod val="350000"/>
+              </a:schemeClr>
+            </a:gs>
+          </a:gsLst>
+          <a:lin ang="16200000" scaled="1"/>
+        </a:gradFill>
+        <a:gradFill rotWithShape="1">
+          <a:gsLst>
+            <a:gs pos="0">
+              <a:schemeClr val="phClr">
+                <a:tint val="100000"/>
+                <a:shade val="100000"/>
+                <a:satMod val="130000"/>
+              </a:schemeClr>
+            </a:gs>
+            <a:gs pos="100000">
+              <a:schemeClr val="phClr">
+                <a:tint val="50000"/>
+                <a:shade val="100000"/>
+                <a:satMod val="350000"/>
+              </a:schemeClr>
+            </a:gs>
+          </a:gsLst>
+          <a:lin ang="16200000" scaled="0"/>
+        </a:gradFill>
+      </a:fillStyleLst>
+      <a:lnStyleLst>
+        <a:ln cap="flat" cmpd="sng" w="9525" algn="ctr">
+          <a:solidFill>
+            <a:schemeClr val="phClr">
+              <a:shade val="95000"/>
+              <a:satMod val="105000"/>
+            </a:schemeClr>
+          </a:solidFill>
+          <a:prstDash val="solid"/>
+        </a:ln>
+        <a:ln cap="flat" cmpd="sng" w="25400" algn="ctr">
+          <a:solidFill>
+            <a:schemeClr val="phClr"/>
+          </a:solidFill>
+          <a:prstDash val="solid"/>
+        </a:ln>
+        <a:ln cap="flat" cmpd="sng" w="38100" algn="ctr">
+          <a:solidFill>
+            <a:schemeClr val="phClr"/>
+          </a:solidFill>
+          <a:prstDash val="solid"/>
+        </a:ln>
+      </a:lnStyleLst>
+      <a:effectStyleLst>
+        <a:effectStyle>
+          <a:effectLst>
+            <a:outerShdw blurRad="40000" rotWithShape="0" dir="5400000" dist="20000">
+              <a:srgbClr val="000000">
+                <a:alpha val="38000"/>
+              </a:srgbClr>
+            </a:outerShdw>
+          </a:effectLst>
+        </a:effectStyle>
+        <a:effectStyle>
+          <a:effectLst>
+            <a:outerShdw blurRad="40000" rotWithShape="0" dir="5400000" dist="23000">
+              <a:srgbClr val="000000">
+                <a:alpha val="35000"/>
+              </a:srgbClr>
+            </a:outerShdw>
+          </a:effectLst>
+        </a:effectStyle>
+        <a:effectStyle>
+          <a:effectLst>
+            <a:outerShdw blurRad="40000" rotWithShape="0" dir="5400000" dist="23000">
+              <a:srgbClr val="000000">
+                <a:alpha val="35000"/>
+              </a:srgbClr>
+            </a:outerShdw>
+          </a:effectLst>
+          <a:scene3d>
+            <a:camera prst="orthographicFront">
+              <a:rot lat="0" lon="0" rev="0"/>
+            </a:camera>
+            <a:lightRig dir="t" rig="threePt">
+              <a:rot lat="0" lon="0" rev="1200000"/>
+            </a:lightRig>
+          </a:scene3d>
+          <a:sp3d>
+            <a:bevelT h="25400" w="63500"/>
+          </a:sp3d>
+        </a:effectStyle>
+      </a:effectStyleLst>
+      <a:bgFillStyleLst>
+        <a:solidFill>
+          <a:schemeClr val="phClr"/>
+        </a:solidFill>
+        <a:gradFill rotWithShape="1">
+          <a:gsLst>
+            <a:gs pos="0">
+              <a:schemeClr val="phClr">
+                <a:tint val="40000"/>
+                <a:satMod val="350000"/>
+              </a:schemeClr>
+            </a:gs>
+            <a:gs pos="40000">
+              <a:schemeClr val="phClr">
+                <a:tint val="45000"/>
+                <a:shade val="99000"/>
+                <a:satMod val="350000"/>
+              </a:schemeClr>
+            </a:gs>
+            <a:gs pos="100000">
+              <a:schemeClr val="phClr">
+                <a:shade val="20000"/>
+                <a:satMod val="255000"/>
+              </a:schemeClr>
+            </a:gs>
+          </a:gsLst>
+          <a:path path="circle">
+            <a:fillToRect b="180000" l="50000" r="50000" t="-80000"/>
+          </a:path>
+        </a:gradFill>
+        <a:gradFill rotWithShape="1">
+          <a:gsLst>
+            <a:gs pos="0">
+              <a:schemeClr val="phClr">
+                <a:tint val="80000"/>
+                <a:satMod val="300000"/>
+              </a:schemeClr>
+            </a:gs>
+            <a:gs pos="100000">
+              <a:schemeClr val="phClr">
+                <a:shade val="30000"/>
+                <a:satMod val="200000"/>
+              </a:schemeClr>
+            </a:gs>
+          </a:gsLst>
+          <a:path path="circle">
+            <a:fillToRect b="50000" l="50000" r="50000" t="50000"/>
+          </a:path>
+        </a:gradFill>
+      </a:bgFillStyleLst>
+    </a:fmtScheme>
+  </a:themeElements>
+</a:theme>
+</file>
+
+<file path=ppt/theme/theme3.xml><?xml version="1.0" encoding="utf-8"?>
 <a:theme xmlns:a="http://schemas.openxmlformats.org/drawingml/2006/main" xmlns:r="http://schemas.openxmlformats.org/officeDocument/2006/relationships" name="Office Theme">
   <a:themeElements>
     <a:clrScheme name="Office">
@@ -35353,558 +35991,4 @@
     </a:lnDef>
   </a:objectDefaults>
 </a:theme>
-</file>
-
-<file path=ppt/theme/theme2.xml><?xml version="1.0" encoding="utf-8"?>
-<a:theme xmlns:a="http://schemas.openxmlformats.org/drawingml/2006/main" xmlns:r="http://schemas.openxmlformats.org/officeDocument/2006/relationships" name="sketched">
-  <a:themeElements>
-    <a:clrScheme name="Custom 398">
-      <a:dk1>
-        <a:srgbClr val="000000"/>
-      </a:dk1>
-      <a:lt1>
-        <a:srgbClr val="FFFFFF"/>
-      </a:lt1>
-      <a:dk2>
-        <a:srgbClr val="51535D"/>
-      </a:dk2>
-      <a:lt2>
-        <a:srgbClr val="EDEDED"/>
-      </a:lt2>
-      <a:accent1>
-        <a:srgbClr val="676871"/>
-      </a:accent1>
-      <a:accent2>
-        <a:srgbClr val="988489"/>
-      </a:accent2>
-      <a:accent3>
-        <a:srgbClr val="6B7B67"/>
-      </a:accent3>
-      <a:accent4>
-        <a:srgbClr val="747B85"/>
-      </a:accent4>
-      <a:accent5>
-        <a:srgbClr val="A5A9AF"/>
-      </a:accent5>
-      <a:accent6>
-        <a:srgbClr val="85716D"/>
-      </a:accent6>
-      <a:hlink>
-        <a:srgbClr val="676871"/>
-      </a:hlink>
-      <a:folHlink>
-        <a:srgbClr val="3F414A"/>
-      </a:folHlink>
-    </a:clrScheme>
-    <a:fontScheme name="Office">
-      <a:majorFont>
-        <a:latin typeface="Arial"/>
-        <a:ea typeface=""/>
-        <a:cs typeface=""/>
-        <a:font script="Jpan" typeface="ＭＳ Ｐゴシック"/>
-        <a:font script="Hang" typeface="맑은 고딕"/>
-        <a:font script="Hans" typeface="宋体"/>
-        <a:font script="Hant" typeface="新細明體"/>
-        <a:font script="Arab" typeface="Times New Roman"/>
-        <a:font script="Hebr" typeface="Times New Roman"/>
-        <a:font script="Thai" typeface="Angsana New"/>
-        <a:font script="Ethi" typeface="Nyala"/>
-        <a:font script="Beng" typeface="Vrinda"/>
-        <a:font script="Gujr" typeface="Shruti"/>
-        <a:font script="Khmr" typeface="MoolBoran"/>
-        <a:font script="Knda" typeface="Tunga"/>
-        <a:font script="Guru" typeface="Raavi"/>
-        <a:font script="Cans" typeface="Euphemia"/>
-        <a:font script="Cher" typeface="Plantagenet Cherokee"/>
-        <a:font script="Yiii" typeface="Microsoft Yi Baiti"/>
-        <a:font script="Tibt" typeface="Microsoft Himalaya"/>
-        <a:font script="Thaa" typeface="MV Boli"/>
-        <a:font script="Deva" typeface="Mangal"/>
-        <a:font script="Telu" typeface="Gautami"/>
-        <a:font script="Taml" typeface="Latha"/>
-        <a:font script="Syrc" typeface="Estrangelo Edessa"/>
-        <a:font script="Orya" typeface="Kalinga"/>
-        <a:font script="Mlym" typeface="Kartika"/>
-        <a:font script="Laoo" typeface="DokChampa"/>
-        <a:font script="Sinh" typeface="Iskoola Pota"/>
-        <a:font script="Mong" typeface="Mongolian Baiti"/>
-        <a:font script="Viet" typeface="Times New Roman"/>
-        <a:font script="Uigh" typeface="Microsoft Uighur"/>
-      </a:majorFont>
-      <a:minorFont>
-        <a:latin typeface="Arial"/>
-        <a:ea typeface=""/>
-        <a:cs typeface=""/>
-        <a:font script="Jpan" typeface="ＭＳ Ｐゴシック"/>
-        <a:font script="Hang" typeface="맑은 고딕"/>
-        <a:font script="Hans" typeface="宋体"/>
-        <a:font script="Hant" typeface="新細明體"/>
-        <a:font script="Arab" typeface="Times New Roman"/>
-        <a:font script="Hebr" typeface="Times New Roman"/>
-        <a:font script="Thai" typeface="Angsana New"/>
-        <a:font script="Ethi" typeface="Nyala"/>
-        <a:font script="Beng" typeface="Vrinda"/>
-        <a:font script="Gujr" typeface="Shruti"/>
-        <a:font script="Khmr" typeface="MoolBoran"/>
-        <a:font script="Knda" typeface="Tunga"/>
-        <a:font script="Guru" typeface="Raavi"/>
-        <a:font script="Cans" typeface="Euphemia"/>
-        <a:font script="Cher" typeface="Plantagenet Cherokee"/>
-        <a:font script="Yiii" typeface="Microsoft Yi Baiti"/>
-        <a:font script="Tibt" typeface="Microsoft Himalaya"/>
-        <a:font script="Thaa" typeface="MV Boli"/>
-        <a:font script="Deva" typeface="Mangal"/>
-        <a:font script="Telu" typeface="Gautami"/>
-        <a:font script="Taml" typeface="Latha"/>
-        <a:font script="Syrc" typeface="Estrangelo Edessa"/>
-        <a:font script="Orya" typeface="Kalinga"/>
-        <a:font script="Mlym" typeface="Kartika"/>
-        <a:font script="Laoo" typeface="DokChampa"/>
-        <a:font script="Sinh" typeface="Iskoola Pota"/>
-        <a:font script="Mong" typeface="Mongolian Baiti"/>
-        <a:font script="Viet" typeface="Times New Roman"/>
-        <a:font script="Uigh" typeface="Microsoft Uighur"/>
-      </a:minorFont>
-    </a:fontScheme>
-    <a:fmtScheme name="Office">
-      <a:fillStyleLst>
-        <a:solidFill>
-          <a:schemeClr val="phClr"/>
-        </a:solidFill>
-        <a:gradFill rotWithShape="1">
-          <a:gsLst>
-            <a:gs pos="0">
-              <a:schemeClr val="phClr">
-                <a:tint val="50000"/>
-                <a:satMod val="300000"/>
-              </a:schemeClr>
-            </a:gs>
-            <a:gs pos="35000">
-              <a:schemeClr val="phClr">
-                <a:tint val="37000"/>
-                <a:satMod val="300000"/>
-              </a:schemeClr>
-            </a:gs>
-            <a:gs pos="100000">
-              <a:schemeClr val="phClr">
-                <a:tint val="15000"/>
-                <a:satMod val="350000"/>
-              </a:schemeClr>
-            </a:gs>
-          </a:gsLst>
-          <a:lin ang="16200000" scaled="1"/>
-        </a:gradFill>
-        <a:gradFill rotWithShape="1">
-          <a:gsLst>
-            <a:gs pos="0">
-              <a:schemeClr val="phClr">
-                <a:tint val="100000"/>
-                <a:shade val="100000"/>
-                <a:satMod val="130000"/>
-              </a:schemeClr>
-            </a:gs>
-            <a:gs pos="100000">
-              <a:schemeClr val="phClr">
-                <a:tint val="50000"/>
-                <a:shade val="100000"/>
-                <a:satMod val="350000"/>
-              </a:schemeClr>
-            </a:gs>
-          </a:gsLst>
-          <a:lin ang="16200000" scaled="0"/>
-        </a:gradFill>
-      </a:fillStyleLst>
-      <a:lnStyleLst>
-        <a:ln cap="flat" cmpd="sng" w="9525" algn="ctr">
-          <a:solidFill>
-            <a:schemeClr val="phClr">
-              <a:shade val="95000"/>
-              <a:satMod val="105000"/>
-            </a:schemeClr>
-          </a:solidFill>
-          <a:prstDash val="solid"/>
-        </a:ln>
-        <a:ln cap="flat" cmpd="sng" w="25400" algn="ctr">
-          <a:solidFill>
-            <a:schemeClr val="phClr"/>
-          </a:solidFill>
-          <a:prstDash val="solid"/>
-        </a:ln>
-        <a:ln cap="flat" cmpd="sng" w="38100" algn="ctr">
-          <a:solidFill>
-            <a:schemeClr val="phClr"/>
-          </a:solidFill>
-          <a:prstDash val="solid"/>
-        </a:ln>
-      </a:lnStyleLst>
-      <a:effectStyleLst>
-        <a:effectStyle>
-          <a:effectLst>
-            <a:outerShdw blurRad="40000" rotWithShape="0" dir="5400000" dist="20000">
-              <a:srgbClr val="000000">
-                <a:alpha val="38000"/>
-              </a:srgbClr>
-            </a:outerShdw>
-          </a:effectLst>
-        </a:effectStyle>
-        <a:effectStyle>
-          <a:effectLst>
-            <a:outerShdw blurRad="40000" rotWithShape="0" dir="5400000" dist="23000">
-              <a:srgbClr val="000000">
-                <a:alpha val="35000"/>
-              </a:srgbClr>
-            </a:outerShdw>
-          </a:effectLst>
-        </a:effectStyle>
-        <a:effectStyle>
-          <a:effectLst>
-            <a:outerShdw blurRad="40000" rotWithShape="0" dir="5400000" dist="23000">
-              <a:srgbClr val="000000">
-                <a:alpha val="35000"/>
-              </a:srgbClr>
-            </a:outerShdw>
-          </a:effectLst>
-          <a:scene3d>
-            <a:camera prst="orthographicFront">
-              <a:rot lat="0" lon="0" rev="0"/>
-            </a:camera>
-            <a:lightRig dir="t" rig="threePt">
-              <a:rot lat="0" lon="0" rev="1200000"/>
-            </a:lightRig>
-          </a:scene3d>
-          <a:sp3d>
-            <a:bevelT h="25400" w="63500"/>
-          </a:sp3d>
-        </a:effectStyle>
-      </a:effectStyleLst>
-      <a:bgFillStyleLst>
-        <a:solidFill>
-          <a:schemeClr val="phClr"/>
-        </a:solidFill>
-        <a:gradFill rotWithShape="1">
-          <a:gsLst>
-            <a:gs pos="0">
-              <a:schemeClr val="phClr">
-                <a:tint val="40000"/>
-                <a:satMod val="350000"/>
-              </a:schemeClr>
-            </a:gs>
-            <a:gs pos="40000">
-              <a:schemeClr val="phClr">
-                <a:tint val="45000"/>
-                <a:shade val="99000"/>
-                <a:satMod val="350000"/>
-              </a:schemeClr>
-            </a:gs>
-            <a:gs pos="100000">
-              <a:schemeClr val="phClr">
-                <a:shade val="20000"/>
-                <a:satMod val="255000"/>
-              </a:schemeClr>
-            </a:gs>
-          </a:gsLst>
-          <a:path path="circle">
-            <a:fillToRect b="180000" l="50000" r="50000" t="-80000"/>
-          </a:path>
-        </a:gradFill>
-        <a:gradFill rotWithShape="1">
-          <a:gsLst>
-            <a:gs pos="0">
-              <a:schemeClr val="phClr">
-                <a:tint val="80000"/>
-                <a:satMod val="300000"/>
-              </a:schemeClr>
-            </a:gs>
-            <a:gs pos="100000">
-              <a:schemeClr val="phClr">
-                <a:shade val="30000"/>
-                <a:satMod val="200000"/>
-              </a:schemeClr>
-            </a:gs>
-          </a:gsLst>
-          <a:path path="circle">
-            <a:fillToRect b="50000" l="50000" r="50000" t="50000"/>
-          </a:path>
-        </a:gradFill>
-      </a:bgFillStyleLst>
-    </a:fmtScheme>
-  </a:themeElements>
-</a:theme>
-</file>
-
-<file path=ppt/theme/theme3.xml><?xml version="1.0" encoding="utf-8"?>
-<a:theme xmlns:a="http://schemas.openxmlformats.org/drawingml/2006/main" xmlns:r="http://schemas.openxmlformats.org/officeDocument/2006/relationships" name="Custom Theme">
-  <a:themeElements>
-    <a:clrScheme name="Default">
-      <a:dk1>
-        <a:srgbClr val="000000"/>
-      </a:dk1>
-      <a:lt1>
-        <a:srgbClr val="FFFFFF"/>
-      </a:lt1>
-      <a:dk2>
-        <a:srgbClr val="158158"/>
-      </a:dk2>
-      <a:lt2>
-        <a:srgbClr val="F3F3F3"/>
-      </a:lt2>
-      <a:accent1>
-        <a:srgbClr val="058DC7"/>
-      </a:accent1>
-      <a:accent2>
-        <a:srgbClr val="50B432"/>
-      </a:accent2>
-      <a:accent3>
-        <a:srgbClr val="ED561B"/>
-      </a:accent3>
-      <a:accent4>
-        <a:srgbClr val="EDEF00"/>
-      </a:accent4>
-      <a:accent5>
-        <a:srgbClr val="24CBE5"/>
-      </a:accent5>
-      <a:accent6>
-        <a:srgbClr val="64E572"/>
-      </a:accent6>
-      <a:hlink>
-        <a:srgbClr val="2200CC"/>
-      </a:hlink>
-      <a:folHlink>
-        <a:srgbClr val="551A8B"/>
-      </a:folHlink>
-    </a:clrScheme>
-    <a:fontScheme name="Office">
-      <a:majorFont>
-        <a:latin typeface="Arial"/>
-        <a:ea typeface=""/>
-        <a:cs typeface=""/>
-        <a:font script="Jpan" typeface="ＭＳ Ｐゴシック"/>
-        <a:font script="Hang" typeface="맑은 고딕"/>
-        <a:font script="Hans" typeface="宋体"/>
-        <a:font script="Hant" typeface="新細明體"/>
-        <a:font script="Arab" typeface="Times New Roman"/>
-        <a:font script="Hebr" typeface="Times New Roman"/>
-        <a:font script="Thai" typeface="Angsana New"/>
-        <a:font script="Ethi" typeface="Nyala"/>
-        <a:font script="Beng" typeface="Vrinda"/>
-        <a:font script="Gujr" typeface="Shruti"/>
-        <a:font script="Khmr" typeface="MoolBoran"/>
-        <a:font script="Knda" typeface="Tunga"/>
-        <a:font script="Guru" typeface="Raavi"/>
-        <a:font script="Cans" typeface="Euphemia"/>
-        <a:font script="Cher" typeface="Plantagenet Cherokee"/>
-        <a:font script="Yiii" typeface="Microsoft Yi Baiti"/>
-        <a:font script="Tibt" typeface="Microsoft Himalaya"/>
-        <a:font script="Thaa" typeface="MV Boli"/>
-        <a:font script="Deva" typeface="Mangal"/>
-        <a:font script="Telu" typeface="Gautami"/>
-        <a:font script="Taml" typeface="Latha"/>
-        <a:font script="Syrc" typeface="Estrangelo Edessa"/>
-        <a:font script="Orya" typeface="Kalinga"/>
-        <a:font script="Mlym" typeface="Kartika"/>
-        <a:font script="Laoo" typeface="DokChampa"/>
-        <a:font script="Sinh" typeface="Iskoola Pota"/>
-        <a:font script="Mong" typeface="Mongolian Baiti"/>
-        <a:font script="Viet" typeface="Times New Roman"/>
-        <a:font script="Uigh" typeface="Microsoft Uighur"/>
-      </a:majorFont>
-      <a:minorFont>
-        <a:latin typeface="Arial"/>
-        <a:ea typeface=""/>
-        <a:cs typeface=""/>
-        <a:font script="Jpan" typeface="ＭＳ Ｐゴシック"/>
-        <a:font script="Hang" typeface="맑은 고딕"/>
-        <a:font script="Hans" typeface="宋体"/>
-        <a:font script="Hant" typeface="新細明體"/>
-        <a:font script="Arab" typeface="Times New Roman"/>
-        <a:font script="Hebr" typeface="Times New Roman"/>
-        <a:font script="Thai" typeface="Angsana New"/>
-        <a:font script="Ethi" typeface="Nyala"/>
-        <a:font script="Beng" typeface="Vrinda"/>
-        <a:font script="Gujr" typeface="Shruti"/>
-        <a:font script="Khmr" typeface="MoolBoran"/>
-        <a:font script="Knda" typeface="Tunga"/>
-        <a:font script="Guru" typeface="Raavi"/>
-        <a:font script="Cans" typeface="Euphemia"/>
-        <a:font script="Cher" typeface="Plantagenet Cherokee"/>
-        <a:font script="Yiii" typeface="Microsoft Yi Baiti"/>
-        <a:font script="Tibt" typeface="Microsoft Himalaya"/>
-        <a:font script="Thaa" typeface="MV Boli"/>
-        <a:font script="Deva" typeface="Mangal"/>
-        <a:font script="Telu" typeface="Gautami"/>
-        <a:font script="Taml" typeface="Latha"/>
-        <a:font script="Syrc" typeface="Estrangelo Edessa"/>
-        <a:font script="Orya" typeface="Kalinga"/>
-        <a:font script="Mlym" typeface="Kartika"/>
-        <a:font script="Laoo" typeface="DokChampa"/>
-        <a:font script="Sinh" typeface="Iskoola Pota"/>
-        <a:font script="Mong" typeface="Mongolian Baiti"/>
-        <a:font script="Viet" typeface="Times New Roman"/>
-        <a:font script="Uigh" typeface="Microsoft Uighur"/>
-      </a:minorFont>
-    </a:fontScheme>
-    <a:fmtScheme name="Office">
-      <a:fillStyleLst>
-        <a:solidFill>
-          <a:schemeClr val="phClr"/>
-        </a:solidFill>
-        <a:gradFill rotWithShape="1">
-          <a:gsLst>
-            <a:gs pos="0">
-              <a:schemeClr val="phClr">
-                <a:tint val="50000"/>
-                <a:satMod val="300000"/>
-              </a:schemeClr>
-            </a:gs>
-            <a:gs pos="35000">
-              <a:schemeClr val="phClr">
-                <a:tint val="37000"/>
-                <a:satMod val="300000"/>
-              </a:schemeClr>
-            </a:gs>
-            <a:gs pos="100000">
-              <a:schemeClr val="phClr">
-                <a:tint val="15000"/>
-                <a:satMod val="350000"/>
-              </a:schemeClr>
-            </a:gs>
-          </a:gsLst>
-          <a:lin ang="16200000" scaled="1"/>
-        </a:gradFill>
-        <a:gradFill rotWithShape="1">
-          <a:gsLst>
-            <a:gs pos="0">
-              <a:schemeClr val="phClr">
-                <a:tint val="100000"/>
-                <a:shade val="100000"/>
-                <a:satMod val="130000"/>
-              </a:schemeClr>
-            </a:gs>
-            <a:gs pos="100000">
-              <a:schemeClr val="phClr">
-                <a:tint val="50000"/>
-                <a:shade val="100000"/>
-                <a:satMod val="350000"/>
-              </a:schemeClr>
-            </a:gs>
-          </a:gsLst>
-          <a:lin ang="16200000" scaled="0"/>
-        </a:gradFill>
-      </a:fillStyleLst>
-      <a:lnStyleLst>
-        <a:ln cap="flat" cmpd="sng" w="9525" algn="ctr">
-          <a:solidFill>
-            <a:schemeClr val="phClr">
-              <a:shade val="95000"/>
-              <a:satMod val="105000"/>
-            </a:schemeClr>
-          </a:solidFill>
-          <a:prstDash val="solid"/>
-        </a:ln>
-        <a:ln cap="flat" cmpd="sng" w="25400" algn="ctr">
-          <a:solidFill>
-            <a:schemeClr val="phClr"/>
-          </a:solidFill>
-          <a:prstDash val="solid"/>
-        </a:ln>
-        <a:ln cap="flat" cmpd="sng" w="38100" algn="ctr">
-          <a:solidFill>
-            <a:schemeClr val="phClr"/>
-          </a:solidFill>
-          <a:prstDash val="solid"/>
-        </a:ln>
-      </a:lnStyleLst>
-      <a:effectStyleLst>
-        <a:effectStyle>
-          <a:effectLst>
-            <a:outerShdw blurRad="40000" rotWithShape="0" dir="5400000" dist="20000">
-              <a:srgbClr val="000000">
-                <a:alpha val="38000"/>
-              </a:srgbClr>
-            </a:outerShdw>
-          </a:effectLst>
-        </a:effectStyle>
-        <a:effectStyle>
-          <a:effectLst>
-            <a:outerShdw blurRad="40000" rotWithShape="0" dir="5400000" dist="23000">
-              <a:srgbClr val="000000">
-                <a:alpha val="35000"/>
-              </a:srgbClr>
-            </a:outerShdw>
-          </a:effectLst>
-        </a:effectStyle>
-        <a:effectStyle>
-          <a:effectLst>
-            <a:outerShdw blurRad="40000" rotWithShape="0" dir="5400000" dist="23000">
-              <a:srgbClr val="000000">
-                <a:alpha val="35000"/>
-              </a:srgbClr>
-            </a:outerShdw>
-          </a:effectLst>
-          <a:scene3d>
-            <a:camera prst="orthographicFront">
-              <a:rot lat="0" lon="0" rev="0"/>
-            </a:camera>
-            <a:lightRig dir="t" rig="threePt">
-              <a:rot lat="0" lon="0" rev="1200000"/>
-            </a:lightRig>
-          </a:scene3d>
-          <a:sp3d>
-            <a:bevelT h="25400" w="63500"/>
-          </a:sp3d>
-        </a:effectStyle>
-      </a:effectStyleLst>
-      <a:bgFillStyleLst>
-        <a:solidFill>
-          <a:schemeClr val="phClr"/>
-        </a:solidFill>
-        <a:gradFill rotWithShape="1">
-          <a:gsLst>
-            <a:gs pos="0">
-              <a:schemeClr val="phClr">
-                <a:tint val="40000"/>
-                <a:satMod val="350000"/>
-              </a:schemeClr>
-            </a:gs>
-            <a:gs pos="40000">
-              <a:schemeClr val="phClr">
-                <a:tint val="45000"/>
-                <a:shade val="99000"/>
-                <a:satMod val="350000"/>
-              </a:schemeClr>
-            </a:gs>
-            <a:gs pos="100000">
-              <a:schemeClr val="phClr">
-                <a:shade val="20000"/>
-                <a:satMod val="255000"/>
-              </a:schemeClr>
-            </a:gs>
-          </a:gsLst>
-          <a:path path="circle">
-            <a:fillToRect b="180000" l="50000" r="50000" t="-80000"/>
-          </a:path>
-        </a:gradFill>
-        <a:gradFill rotWithShape="1">
-          <a:gsLst>
-            <a:gs pos="0">
-              <a:schemeClr val="phClr">
-                <a:tint val="80000"/>
-                <a:satMod val="300000"/>
-              </a:schemeClr>
-            </a:gs>
-            <a:gs pos="100000">
-              <a:schemeClr val="phClr">
-                <a:shade val="30000"/>
-                <a:satMod val="200000"/>
-              </a:schemeClr>
-            </a:gs>
-          </a:gsLst>
-          <a:path path="circle">
-            <a:fillToRect b="50000" l="50000" r="50000" t="50000"/>
-          </a:path>
-        </a:gradFill>
-      </a:bgFillStyleLst>
-    </a:fmtScheme>
-  </a:themeElements>
-</a:theme>
 </file>
</xml_diff>

<commit_message>
Update with entries from BT.
</commit_message>
<xml_diff>
--- a/Meeting20150425/Lack of manpower.pptx
+++ b/Meeting20150425/Lack of manpower.pptx
@@ -30849,7 +30849,7 @@
             </a:pPr>
             <a:r>
               <a:rPr lang="nl"/>
-              <a:t>Move documentation to GitHub: ?</a:t>
+              <a:t>Move documentation to GitHub: JV</a:t>
             </a:r>
           </a:p>
           <a:p>
@@ -30866,7 +30866,7 @@
             </a:pPr>
             <a:r>
               <a:rPr lang="nl"/>
-              <a:t>Deepsky database (Mail from GvdB): ?</a:t>
+              <a:t>Deepsky database (Mail from GvdB): EvdJ</a:t>
             </a:r>
           </a:p>
         </p:txBody>
@@ -30986,7 +30986,7 @@
             <a:tbl>
               <a:tblPr>
                 <a:noFill/>
-                <a:tableStyleId>{6F3971F6-C8E7-4DE4-A285-0F7F7C67FEB2}</a:tableStyleId>
+                <a:tableStyleId>{74A7E921-0417-467D-9B8B-25A46C2A682C}</a:tableStyleId>
               </a:tblPr>
               <a:tblGrid>
                 <a:gridCol w="3619500"/>
@@ -31535,7 +31535,7 @@
             <a:tbl>
               <a:tblPr>
                 <a:noFill/>
-                <a:tableStyleId>{D7A304F0-313B-42BD-B8AD-00FCE21F1C61}</a:tableStyleId>
+                <a:tableStyleId>{CEFA2CBD-7663-4E6F-9BF5-A7E5B75E2F86}</a:tableStyleId>
               </a:tblPr>
               <a:tblGrid>
                 <a:gridCol w="3619500"/>
@@ -32012,7 +32012,7 @@
             <a:tbl>
               <a:tblPr>
                 <a:noFill/>
-                <a:tableStyleId>{F17281D8-5D7B-4E76-8C8A-53B53F1A319D}</a:tableStyleId>
+                <a:tableStyleId>{370CA6A3-20E6-44DB-8BEA-1AB1B5C0B98B}</a:tableStyleId>
               </a:tblPr>
               <a:tblGrid>
                 <a:gridCol w="3619500"/>
@@ -32561,7 +32561,7 @@
             <a:tbl>
               <a:tblPr>
                 <a:noFill/>
-                <a:tableStyleId>{3AAB625D-7A7B-45B9-B50C-4F5CE6590BF7}</a:tableStyleId>
+                <a:tableStyleId>{AEC17936-EF52-4E24-A24C-4DE43B5B8821}</a:tableStyleId>
               </a:tblPr>
               <a:tblGrid>
                 <a:gridCol w="3619500"/>
@@ -33110,7 +33110,7 @@
             <a:tbl>
               <a:tblPr>
                 <a:noFill/>
-                <a:tableStyleId>{DF7C1563-4758-4A96-9472-AD6E870FD448}</a:tableStyleId>
+                <a:tableStyleId>{E9C474D2-7911-4D35-941D-62661E617DA9}</a:tableStyleId>
               </a:tblPr>
               <a:tblGrid>
                 <a:gridCol w="3619500"/>
@@ -33153,7 +33153,51 @@
                       </a:pPr>
                       <a:r>
                         <a:rPr lang="nl"/>
-                        <a:t>php:      mysql:      android:      iOS:</a:t>
+                        <a:t>php: </a:t>
+                      </a:r>
+                      <a:r>
+                        <a:rPr lang="nl">
+                          <a:solidFill>
+                            <a:srgbClr val="FF0000"/>
+                          </a:solidFill>
+                        </a:rPr>
+                        <a:t>X</a:t>
+                      </a:r>
+                      <a:r>
+                        <a:rPr lang="nl"/>
+                        <a:t>    mysql: </a:t>
+                      </a:r>
+                      <a:r>
+                        <a:rPr lang="nl">
+                          <a:solidFill>
+                            <a:srgbClr val="FF0000"/>
+                          </a:solidFill>
+                        </a:rPr>
+                        <a:t>X</a:t>
+                      </a:r>
+                      <a:r>
+                        <a:rPr lang="nl"/>
+                        <a:t>    android: </a:t>
+                      </a:r>
+                      <a:r>
+                        <a:rPr lang="nl">
+                          <a:solidFill>
+                            <a:srgbClr val="FF0000"/>
+                          </a:solidFill>
+                        </a:rPr>
+                        <a:t>X</a:t>
+                      </a:r>
+                      <a:r>
+                        <a:rPr lang="nl"/>
+                        <a:t>    iOS: </a:t>
+                      </a:r>
+                      <a:r>
+                        <a:rPr lang="nl">
+                          <a:solidFill>
+                            <a:srgbClr val="FF0000"/>
+                          </a:solidFill>
+                        </a:rPr>
+                        <a:t>X</a:t>
                       </a:r>
                     </a:p>
                   </a:txBody>
@@ -33196,9 +33240,13 @@
                         <a:buNone/>
                       </a:pPr>
                       <a:r>
-                        <a:t/>
+                        <a:rPr lang="nl">
+                          <a:solidFill>
+                            <a:srgbClr val="FF0000"/>
+                          </a:solidFill>
+                        </a:rPr>
+                        <a:t>X</a:t>
                       </a:r>
-                      <a:endParaRPr/>
                     </a:p>
                   </a:txBody>
                   <a:tcPr marT="91425" marB="91425" marR="91425" marL="91425"/>
@@ -33240,9 +33288,13 @@
                         <a:buNone/>
                       </a:pPr>
                       <a:r>
-                        <a:t/>
+                        <a:rPr lang="nl">
+                          <a:solidFill>
+                            <a:srgbClr val="00FF00"/>
+                          </a:solidFill>
+                        </a:rPr>
+                        <a:t>V</a:t>
                       </a:r>
-                      <a:endParaRPr/>
                     </a:p>
                   </a:txBody>
                   <a:tcPr marT="91425" marB="91425" marR="91425" marL="91425"/>
@@ -33284,9 +33336,13 @@
                         <a:buNone/>
                       </a:pPr>
                       <a:r>
-                        <a:t/>
+                        <a:rPr lang="nl">
+                          <a:solidFill>
+                            <a:srgbClr val="00FF00"/>
+                          </a:solidFill>
+                        </a:rPr>
+                        <a:t>V</a:t>
                       </a:r>
-                      <a:endParaRPr/>
                     </a:p>
                   </a:txBody>
                   <a:tcPr marT="91425" marB="91425" marR="91425" marL="91425"/>
@@ -33328,9 +33384,13 @@
                         <a:buNone/>
                       </a:pPr>
                       <a:r>
-                        <a:t/>
+                        <a:rPr lang="nl">
+                          <a:solidFill>
+                            <a:srgbClr val="00FF00"/>
+                          </a:solidFill>
+                        </a:rPr>
+                        <a:t>V</a:t>
                       </a:r>
-                      <a:endParaRPr/>
                     </a:p>
                   </a:txBody>
                   <a:tcPr marT="91425" marB="91425" marR="91425" marL="91425"/>
@@ -33372,9 +33432,13 @@
                         <a:buNone/>
                       </a:pPr>
                       <a:r>
-                        <a:t/>
+                        <a:rPr lang="nl">
+                          <a:solidFill>
+                            <a:srgbClr val="00FF00"/>
+                          </a:solidFill>
+                        </a:rPr>
+                        <a:t>V</a:t>
                       </a:r>
-                      <a:endParaRPr/>
                     </a:p>
                   </a:txBody>
                   <a:tcPr marT="91425" marB="91425" marR="91425" marL="91425"/>
@@ -33416,9 +33480,13 @@
                         <a:buNone/>
                       </a:pPr>
                       <a:r>
-                        <a:t/>
+                        <a:rPr lang="nl">
+                          <a:solidFill>
+                            <a:srgbClr val="00FF00"/>
+                          </a:solidFill>
+                        </a:rPr>
+                        <a:t>(?)</a:t>
                       </a:r>
-                      <a:endParaRPr/>
                     </a:p>
                   </a:txBody>
                   <a:tcPr marT="91425" marB="91425" marR="91425" marL="91425"/>
@@ -33460,9 +33528,13 @@
                         <a:buNone/>
                       </a:pPr>
                       <a:r>
-                        <a:t/>
+                        <a:rPr lang="nl">
+                          <a:solidFill>
+                            <a:srgbClr val="00FF00"/>
+                          </a:solidFill>
+                        </a:rPr>
+                        <a:t>V</a:t>
                       </a:r>
-                      <a:endParaRPr/>
                     </a:p>
                   </a:txBody>
                   <a:tcPr marT="91425" marB="91425" marR="91425" marL="91425"/>
@@ -33591,7 +33663,7 @@
             <a:tbl>
               <a:tblPr>
                 <a:noFill/>
-                <a:tableStyleId>{88AA6145-3139-4354-AEA4-1FF8BFAE4B8C}</a:tableStyleId>
+                <a:tableStyleId>{CBA9D62B-E1C9-4A0A-9ECA-1DF94E962977}</a:tableStyleId>
               </a:tblPr>
               <a:tblGrid>
                 <a:gridCol w="3619500"/>
@@ -34140,7 +34212,7 @@
             <a:tbl>
               <a:tblPr>
                 <a:noFill/>
-                <a:tableStyleId>{C4E02172-A11A-4333-AC28-C11DEA62CD45}</a:tableStyleId>
+                <a:tableStyleId>{9118E077-9E5F-4F53-B292-786B41F7A164}</a:tableStyleId>
               </a:tblPr>
               <a:tblGrid>
                 <a:gridCol w="3619500"/>
@@ -34689,7 +34761,7 @@
             <a:tbl>
               <a:tblPr>
                 <a:noFill/>
-                <a:tableStyleId>{4E0AA120-28A6-443F-85A9-BCC0C0008E91}</a:tableStyleId>
+                <a:tableStyleId>{B8862038-043A-4A16-937A-3D66B32ABABE}</a:tableStyleId>
               </a:tblPr>
               <a:tblGrid>
                 <a:gridCol w="3619500"/>
@@ -35123,283 +35195,6 @@
 </file>
 
 <file path=ppt/theme/theme1.xml><?xml version="1.0" encoding="utf-8"?>
-<a:theme xmlns:a="http://schemas.openxmlformats.org/drawingml/2006/main" xmlns:r="http://schemas.openxmlformats.org/officeDocument/2006/relationships" name="sketched">
-  <a:themeElements>
-    <a:clrScheme name="Custom 398">
-      <a:dk1>
-        <a:srgbClr val="000000"/>
-      </a:dk1>
-      <a:lt1>
-        <a:srgbClr val="FFFFFF"/>
-      </a:lt1>
-      <a:dk2>
-        <a:srgbClr val="51535D"/>
-      </a:dk2>
-      <a:lt2>
-        <a:srgbClr val="EDEDED"/>
-      </a:lt2>
-      <a:accent1>
-        <a:srgbClr val="676871"/>
-      </a:accent1>
-      <a:accent2>
-        <a:srgbClr val="988489"/>
-      </a:accent2>
-      <a:accent3>
-        <a:srgbClr val="6B7B67"/>
-      </a:accent3>
-      <a:accent4>
-        <a:srgbClr val="747B85"/>
-      </a:accent4>
-      <a:accent5>
-        <a:srgbClr val="A5A9AF"/>
-      </a:accent5>
-      <a:accent6>
-        <a:srgbClr val="85716D"/>
-      </a:accent6>
-      <a:hlink>
-        <a:srgbClr val="676871"/>
-      </a:hlink>
-      <a:folHlink>
-        <a:srgbClr val="3F414A"/>
-      </a:folHlink>
-    </a:clrScheme>
-    <a:fontScheme name="Office">
-      <a:majorFont>
-        <a:latin typeface="Arial"/>
-        <a:ea typeface=""/>
-        <a:cs typeface=""/>
-        <a:font script="Jpan" typeface="ＭＳ Ｐゴシック"/>
-        <a:font script="Hang" typeface="맑은 고딕"/>
-        <a:font script="Hans" typeface="宋体"/>
-        <a:font script="Hant" typeface="新細明體"/>
-        <a:font script="Arab" typeface="Times New Roman"/>
-        <a:font script="Hebr" typeface="Times New Roman"/>
-        <a:font script="Thai" typeface="Angsana New"/>
-        <a:font script="Ethi" typeface="Nyala"/>
-        <a:font script="Beng" typeface="Vrinda"/>
-        <a:font script="Gujr" typeface="Shruti"/>
-        <a:font script="Khmr" typeface="MoolBoran"/>
-        <a:font script="Knda" typeface="Tunga"/>
-        <a:font script="Guru" typeface="Raavi"/>
-        <a:font script="Cans" typeface="Euphemia"/>
-        <a:font script="Cher" typeface="Plantagenet Cherokee"/>
-        <a:font script="Yiii" typeface="Microsoft Yi Baiti"/>
-        <a:font script="Tibt" typeface="Microsoft Himalaya"/>
-        <a:font script="Thaa" typeface="MV Boli"/>
-        <a:font script="Deva" typeface="Mangal"/>
-        <a:font script="Telu" typeface="Gautami"/>
-        <a:font script="Taml" typeface="Latha"/>
-        <a:font script="Syrc" typeface="Estrangelo Edessa"/>
-        <a:font script="Orya" typeface="Kalinga"/>
-        <a:font script="Mlym" typeface="Kartika"/>
-        <a:font script="Laoo" typeface="DokChampa"/>
-        <a:font script="Sinh" typeface="Iskoola Pota"/>
-        <a:font script="Mong" typeface="Mongolian Baiti"/>
-        <a:font script="Viet" typeface="Times New Roman"/>
-        <a:font script="Uigh" typeface="Microsoft Uighur"/>
-      </a:majorFont>
-      <a:minorFont>
-        <a:latin typeface="Arial"/>
-        <a:ea typeface=""/>
-        <a:cs typeface=""/>
-        <a:font script="Jpan" typeface="ＭＳ Ｐゴシック"/>
-        <a:font script="Hang" typeface="맑은 고딕"/>
-        <a:font script="Hans" typeface="宋体"/>
-        <a:font script="Hant" typeface="新細明體"/>
-        <a:font script="Arab" typeface="Times New Roman"/>
-        <a:font script="Hebr" typeface="Times New Roman"/>
-        <a:font script="Thai" typeface="Angsana New"/>
-        <a:font script="Ethi" typeface="Nyala"/>
-        <a:font script="Beng" typeface="Vrinda"/>
-        <a:font script="Gujr" typeface="Shruti"/>
-        <a:font script="Khmr" typeface="MoolBoran"/>
-        <a:font script="Knda" typeface="Tunga"/>
-        <a:font script="Guru" typeface="Raavi"/>
-        <a:font script="Cans" typeface="Euphemia"/>
-        <a:font script="Cher" typeface="Plantagenet Cherokee"/>
-        <a:font script="Yiii" typeface="Microsoft Yi Baiti"/>
-        <a:font script="Tibt" typeface="Microsoft Himalaya"/>
-        <a:font script="Thaa" typeface="MV Boli"/>
-        <a:font script="Deva" typeface="Mangal"/>
-        <a:font script="Telu" typeface="Gautami"/>
-        <a:font script="Taml" typeface="Latha"/>
-        <a:font script="Syrc" typeface="Estrangelo Edessa"/>
-        <a:font script="Orya" typeface="Kalinga"/>
-        <a:font script="Mlym" typeface="Kartika"/>
-        <a:font script="Laoo" typeface="DokChampa"/>
-        <a:font script="Sinh" typeface="Iskoola Pota"/>
-        <a:font script="Mong" typeface="Mongolian Baiti"/>
-        <a:font script="Viet" typeface="Times New Roman"/>
-        <a:font script="Uigh" typeface="Microsoft Uighur"/>
-      </a:minorFont>
-    </a:fontScheme>
-    <a:fmtScheme name="Office">
-      <a:fillStyleLst>
-        <a:solidFill>
-          <a:schemeClr val="phClr"/>
-        </a:solidFill>
-        <a:gradFill rotWithShape="1">
-          <a:gsLst>
-            <a:gs pos="0">
-              <a:schemeClr val="phClr">
-                <a:tint val="50000"/>
-                <a:satMod val="300000"/>
-              </a:schemeClr>
-            </a:gs>
-            <a:gs pos="35000">
-              <a:schemeClr val="phClr">
-                <a:tint val="37000"/>
-                <a:satMod val="300000"/>
-              </a:schemeClr>
-            </a:gs>
-            <a:gs pos="100000">
-              <a:schemeClr val="phClr">
-                <a:tint val="15000"/>
-                <a:satMod val="350000"/>
-              </a:schemeClr>
-            </a:gs>
-          </a:gsLst>
-          <a:lin ang="16200000" scaled="1"/>
-        </a:gradFill>
-        <a:gradFill rotWithShape="1">
-          <a:gsLst>
-            <a:gs pos="0">
-              <a:schemeClr val="phClr">
-                <a:tint val="100000"/>
-                <a:shade val="100000"/>
-                <a:satMod val="130000"/>
-              </a:schemeClr>
-            </a:gs>
-            <a:gs pos="100000">
-              <a:schemeClr val="phClr">
-                <a:tint val="50000"/>
-                <a:shade val="100000"/>
-                <a:satMod val="350000"/>
-              </a:schemeClr>
-            </a:gs>
-          </a:gsLst>
-          <a:lin ang="16200000" scaled="0"/>
-        </a:gradFill>
-      </a:fillStyleLst>
-      <a:lnStyleLst>
-        <a:ln cap="flat" cmpd="sng" w="9525" algn="ctr">
-          <a:solidFill>
-            <a:schemeClr val="phClr">
-              <a:shade val="95000"/>
-              <a:satMod val="105000"/>
-            </a:schemeClr>
-          </a:solidFill>
-          <a:prstDash val="solid"/>
-        </a:ln>
-        <a:ln cap="flat" cmpd="sng" w="25400" algn="ctr">
-          <a:solidFill>
-            <a:schemeClr val="phClr"/>
-          </a:solidFill>
-          <a:prstDash val="solid"/>
-        </a:ln>
-        <a:ln cap="flat" cmpd="sng" w="38100" algn="ctr">
-          <a:solidFill>
-            <a:schemeClr val="phClr"/>
-          </a:solidFill>
-          <a:prstDash val="solid"/>
-        </a:ln>
-      </a:lnStyleLst>
-      <a:effectStyleLst>
-        <a:effectStyle>
-          <a:effectLst>
-            <a:outerShdw blurRad="40000" rotWithShape="0" dir="5400000" dist="20000">
-              <a:srgbClr val="000000">
-                <a:alpha val="38000"/>
-              </a:srgbClr>
-            </a:outerShdw>
-          </a:effectLst>
-        </a:effectStyle>
-        <a:effectStyle>
-          <a:effectLst>
-            <a:outerShdw blurRad="40000" rotWithShape="0" dir="5400000" dist="23000">
-              <a:srgbClr val="000000">
-                <a:alpha val="35000"/>
-              </a:srgbClr>
-            </a:outerShdw>
-          </a:effectLst>
-        </a:effectStyle>
-        <a:effectStyle>
-          <a:effectLst>
-            <a:outerShdw blurRad="40000" rotWithShape="0" dir="5400000" dist="23000">
-              <a:srgbClr val="000000">
-                <a:alpha val="35000"/>
-              </a:srgbClr>
-            </a:outerShdw>
-          </a:effectLst>
-          <a:scene3d>
-            <a:camera prst="orthographicFront">
-              <a:rot lat="0" lon="0" rev="0"/>
-            </a:camera>
-            <a:lightRig dir="t" rig="threePt">
-              <a:rot lat="0" lon="0" rev="1200000"/>
-            </a:lightRig>
-          </a:scene3d>
-          <a:sp3d>
-            <a:bevelT h="25400" w="63500"/>
-          </a:sp3d>
-        </a:effectStyle>
-      </a:effectStyleLst>
-      <a:bgFillStyleLst>
-        <a:solidFill>
-          <a:schemeClr val="phClr"/>
-        </a:solidFill>
-        <a:gradFill rotWithShape="1">
-          <a:gsLst>
-            <a:gs pos="0">
-              <a:schemeClr val="phClr">
-                <a:tint val="40000"/>
-                <a:satMod val="350000"/>
-              </a:schemeClr>
-            </a:gs>
-            <a:gs pos="40000">
-              <a:schemeClr val="phClr">
-                <a:tint val="45000"/>
-                <a:shade val="99000"/>
-                <a:satMod val="350000"/>
-              </a:schemeClr>
-            </a:gs>
-            <a:gs pos="100000">
-              <a:schemeClr val="phClr">
-                <a:shade val="20000"/>
-                <a:satMod val="255000"/>
-              </a:schemeClr>
-            </a:gs>
-          </a:gsLst>
-          <a:path path="circle">
-            <a:fillToRect b="180000" l="50000" r="50000" t="-80000"/>
-          </a:path>
-        </a:gradFill>
-        <a:gradFill rotWithShape="1">
-          <a:gsLst>
-            <a:gs pos="0">
-              <a:schemeClr val="phClr">
-                <a:tint val="80000"/>
-                <a:satMod val="300000"/>
-              </a:schemeClr>
-            </a:gs>
-            <a:gs pos="100000">
-              <a:schemeClr val="phClr">
-                <a:shade val="30000"/>
-                <a:satMod val="200000"/>
-              </a:schemeClr>
-            </a:gs>
-          </a:gsLst>
-          <a:path path="circle">
-            <a:fillToRect b="50000" l="50000" r="50000" t="50000"/>
-          </a:path>
-        </a:gradFill>
-      </a:bgFillStyleLst>
-    </a:fmtScheme>
-  </a:themeElements>
-</a:theme>
-</file>
-
-<file path=ppt/theme/theme2.xml><?xml version="1.0" encoding="utf-8"?>
 <a:theme xmlns:a="http://schemas.openxmlformats.org/drawingml/2006/main" xmlns:r="http://schemas.openxmlformats.org/officeDocument/2006/relationships" name="Custom Theme">
   <a:themeElements>
     <a:clrScheme name="Default">
@@ -35676,7 +35471,7 @@
 </a:theme>
 </file>
 
-<file path=ppt/theme/theme3.xml><?xml version="1.0" encoding="utf-8"?>
+<file path=ppt/theme/theme2.xml><?xml version="1.0" encoding="utf-8"?>
 <a:theme xmlns:a="http://schemas.openxmlformats.org/drawingml/2006/main" xmlns:r="http://schemas.openxmlformats.org/officeDocument/2006/relationships" name="Office Theme">
   <a:themeElements>
     <a:clrScheme name="Office">
@@ -35991,4 +35786,281 @@
     </a:lnDef>
   </a:objectDefaults>
 </a:theme>
+</file>
+
+<file path=ppt/theme/theme3.xml><?xml version="1.0" encoding="utf-8"?>
+<a:theme xmlns:a="http://schemas.openxmlformats.org/drawingml/2006/main" xmlns:r="http://schemas.openxmlformats.org/officeDocument/2006/relationships" name="sketched">
+  <a:themeElements>
+    <a:clrScheme name="Custom 398">
+      <a:dk1>
+        <a:srgbClr val="000000"/>
+      </a:dk1>
+      <a:lt1>
+        <a:srgbClr val="FFFFFF"/>
+      </a:lt1>
+      <a:dk2>
+        <a:srgbClr val="51535D"/>
+      </a:dk2>
+      <a:lt2>
+        <a:srgbClr val="EDEDED"/>
+      </a:lt2>
+      <a:accent1>
+        <a:srgbClr val="676871"/>
+      </a:accent1>
+      <a:accent2>
+        <a:srgbClr val="988489"/>
+      </a:accent2>
+      <a:accent3>
+        <a:srgbClr val="6B7B67"/>
+      </a:accent3>
+      <a:accent4>
+        <a:srgbClr val="747B85"/>
+      </a:accent4>
+      <a:accent5>
+        <a:srgbClr val="A5A9AF"/>
+      </a:accent5>
+      <a:accent6>
+        <a:srgbClr val="85716D"/>
+      </a:accent6>
+      <a:hlink>
+        <a:srgbClr val="676871"/>
+      </a:hlink>
+      <a:folHlink>
+        <a:srgbClr val="3F414A"/>
+      </a:folHlink>
+    </a:clrScheme>
+    <a:fontScheme name="Office">
+      <a:majorFont>
+        <a:latin typeface="Arial"/>
+        <a:ea typeface=""/>
+        <a:cs typeface=""/>
+        <a:font script="Jpan" typeface="ＭＳ Ｐゴシック"/>
+        <a:font script="Hang" typeface="맑은 고딕"/>
+        <a:font script="Hans" typeface="宋体"/>
+        <a:font script="Hant" typeface="新細明體"/>
+        <a:font script="Arab" typeface="Times New Roman"/>
+        <a:font script="Hebr" typeface="Times New Roman"/>
+        <a:font script="Thai" typeface="Angsana New"/>
+        <a:font script="Ethi" typeface="Nyala"/>
+        <a:font script="Beng" typeface="Vrinda"/>
+        <a:font script="Gujr" typeface="Shruti"/>
+        <a:font script="Khmr" typeface="MoolBoran"/>
+        <a:font script="Knda" typeface="Tunga"/>
+        <a:font script="Guru" typeface="Raavi"/>
+        <a:font script="Cans" typeface="Euphemia"/>
+        <a:font script="Cher" typeface="Plantagenet Cherokee"/>
+        <a:font script="Yiii" typeface="Microsoft Yi Baiti"/>
+        <a:font script="Tibt" typeface="Microsoft Himalaya"/>
+        <a:font script="Thaa" typeface="MV Boli"/>
+        <a:font script="Deva" typeface="Mangal"/>
+        <a:font script="Telu" typeface="Gautami"/>
+        <a:font script="Taml" typeface="Latha"/>
+        <a:font script="Syrc" typeface="Estrangelo Edessa"/>
+        <a:font script="Orya" typeface="Kalinga"/>
+        <a:font script="Mlym" typeface="Kartika"/>
+        <a:font script="Laoo" typeface="DokChampa"/>
+        <a:font script="Sinh" typeface="Iskoola Pota"/>
+        <a:font script="Mong" typeface="Mongolian Baiti"/>
+        <a:font script="Viet" typeface="Times New Roman"/>
+        <a:font script="Uigh" typeface="Microsoft Uighur"/>
+      </a:majorFont>
+      <a:minorFont>
+        <a:latin typeface="Arial"/>
+        <a:ea typeface=""/>
+        <a:cs typeface=""/>
+        <a:font script="Jpan" typeface="ＭＳ Ｐゴシック"/>
+        <a:font script="Hang" typeface="맑은 고딕"/>
+        <a:font script="Hans" typeface="宋体"/>
+        <a:font script="Hant" typeface="新細明體"/>
+        <a:font script="Arab" typeface="Times New Roman"/>
+        <a:font script="Hebr" typeface="Times New Roman"/>
+        <a:font script="Thai" typeface="Angsana New"/>
+        <a:font script="Ethi" typeface="Nyala"/>
+        <a:font script="Beng" typeface="Vrinda"/>
+        <a:font script="Gujr" typeface="Shruti"/>
+        <a:font script="Khmr" typeface="MoolBoran"/>
+        <a:font script="Knda" typeface="Tunga"/>
+        <a:font script="Guru" typeface="Raavi"/>
+        <a:font script="Cans" typeface="Euphemia"/>
+        <a:font script="Cher" typeface="Plantagenet Cherokee"/>
+        <a:font script="Yiii" typeface="Microsoft Yi Baiti"/>
+        <a:font script="Tibt" typeface="Microsoft Himalaya"/>
+        <a:font script="Thaa" typeface="MV Boli"/>
+        <a:font script="Deva" typeface="Mangal"/>
+        <a:font script="Telu" typeface="Gautami"/>
+        <a:font script="Taml" typeface="Latha"/>
+        <a:font script="Syrc" typeface="Estrangelo Edessa"/>
+        <a:font script="Orya" typeface="Kalinga"/>
+        <a:font script="Mlym" typeface="Kartika"/>
+        <a:font script="Laoo" typeface="DokChampa"/>
+        <a:font script="Sinh" typeface="Iskoola Pota"/>
+        <a:font script="Mong" typeface="Mongolian Baiti"/>
+        <a:font script="Viet" typeface="Times New Roman"/>
+        <a:font script="Uigh" typeface="Microsoft Uighur"/>
+      </a:minorFont>
+    </a:fontScheme>
+    <a:fmtScheme name="Office">
+      <a:fillStyleLst>
+        <a:solidFill>
+          <a:schemeClr val="phClr"/>
+        </a:solidFill>
+        <a:gradFill rotWithShape="1">
+          <a:gsLst>
+            <a:gs pos="0">
+              <a:schemeClr val="phClr">
+                <a:tint val="50000"/>
+                <a:satMod val="300000"/>
+              </a:schemeClr>
+            </a:gs>
+            <a:gs pos="35000">
+              <a:schemeClr val="phClr">
+                <a:tint val="37000"/>
+                <a:satMod val="300000"/>
+              </a:schemeClr>
+            </a:gs>
+            <a:gs pos="100000">
+              <a:schemeClr val="phClr">
+                <a:tint val="15000"/>
+                <a:satMod val="350000"/>
+              </a:schemeClr>
+            </a:gs>
+          </a:gsLst>
+          <a:lin ang="16200000" scaled="1"/>
+        </a:gradFill>
+        <a:gradFill rotWithShape="1">
+          <a:gsLst>
+            <a:gs pos="0">
+              <a:schemeClr val="phClr">
+                <a:tint val="100000"/>
+                <a:shade val="100000"/>
+                <a:satMod val="130000"/>
+              </a:schemeClr>
+            </a:gs>
+            <a:gs pos="100000">
+              <a:schemeClr val="phClr">
+                <a:tint val="50000"/>
+                <a:shade val="100000"/>
+                <a:satMod val="350000"/>
+              </a:schemeClr>
+            </a:gs>
+          </a:gsLst>
+          <a:lin ang="16200000" scaled="0"/>
+        </a:gradFill>
+      </a:fillStyleLst>
+      <a:lnStyleLst>
+        <a:ln cap="flat" cmpd="sng" w="9525" algn="ctr">
+          <a:solidFill>
+            <a:schemeClr val="phClr">
+              <a:shade val="95000"/>
+              <a:satMod val="105000"/>
+            </a:schemeClr>
+          </a:solidFill>
+          <a:prstDash val="solid"/>
+        </a:ln>
+        <a:ln cap="flat" cmpd="sng" w="25400" algn="ctr">
+          <a:solidFill>
+            <a:schemeClr val="phClr"/>
+          </a:solidFill>
+          <a:prstDash val="solid"/>
+        </a:ln>
+        <a:ln cap="flat" cmpd="sng" w="38100" algn="ctr">
+          <a:solidFill>
+            <a:schemeClr val="phClr"/>
+          </a:solidFill>
+          <a:prstDash val="solid"/>
+        </a:ln>
+      </a:lnStyleLst>
+      <a:effectStyleLst>
+        <a:effectStyle>
+          <a:effectLst>
+            <a:outerShdw blurRad="40000" rotWithShape="0" dir="5400000" dist="20000">
+              <a:srgbClr val="000000">
+                <a:alpha val="38000"/>
+              </a:srgbClr>
+            </a:outerShdw>
+          </a:effectLst>
+        </a:effectStyle>
+        <a:effectStyle>
+          <a:effectLst>
+            <a:outerShdw blurRad="40000" rotWithShape="0" dir="5400000" dist="23000">
+              <a:srgbClr val="000000">
+                <a:alpha val="35000"/>
+              </a:srgbClr>
+            </a:outerShdw>
+          </a:effectLst>
+        </a:effectStyle>
+        <a:effectStyle>
+          <a:effectLst>
+            <a:outerShdw blurRad="40000" rotWithShape="0" dir="5400000" dist="23000">
+              <a:srgbClr val="000000">
+                <a:alpha val="35000"/>
+              </a:srgbClr>
+            </a:outerShdw>
+          </a:effectLst>
+          <a:scene3d>
+            <a:camera prst="orthographicFront">
+              <a:rot lat="0" lon="0" rev="0"/>
+            </a:camera>
+            <a:lightRig dir="t" rig="threePt">
+              <a:rot lat="0" lon="0" rev="1200000"/>
+            </a:lightRig>
+          </a:scene3d>
+          <a:sp3d>
+            <a:bevelT h="25400" w="63500"/>
+          </a:sp3d>
+        </a:effectStyle>
+      </a:effectStyleLst>
+      <a:bgFillStyleLst>
+        <a:solidFill>
+          <a:schemeClr val="phClr"/>
+        </a:solidFill>
+        <a:gradFill rotWithShape="1">
+          <a:gsLst>
+            <a:gs pos="0">
+              <a:schemeClr val="phClr">
+                <a:tint val="40000"/>
+                <a:satMod val="350000"/>
+              </a:schemeClr>
+            </a:gs>
+            <a:gs pos="40000">
+              <a:schemeClr val="phClr">
+                <a:tint val="45000"/>
+                <a:shade val="99000"/>
+                <a:satMod val="350000"/>
+              </a:schemeClr>
+            </a:gs>
+            <a:gs pos="100000">
+              <a:schemeClr val="phClr">
+                <a:shade val="20000"/>
+                <a:satMod val="255000"/>
+              </a:schemeClr>
+            </a:gs>
+          </a:gsLst>
+          <a:path path="circle">
+            <a:fillToRect b="180000" l="50000" r="50000" t="-80000"/>
+          </a:path>
+        </a:gradFill>
+        <a:gradFill rotWithShape="1">
+          <a:gsLst>
+            <a:gs pos="0">
+              <a:schemeClr val="phClr">
+                <a:tint val="80000"/>
+                <a:satMod val="300000"/>
+              </a:schemeClr>
+            </a:gs>
+            <a:gs pos="100000">
+              <a:schemeClr val="phClr">
+                <a:shade val="30000"/>
+                <a:satMod val="200000"/>
+              </a:schemeClr>
+            </a:gs>
+          </a:gsLst>
+          <a:path path="circle">
+            <a:fillToRect b="50000" l="50000" r="50000" t="50000"/>
+          </a:path>
+        </a:gradFill>
+      </a:bgFillStyleLst>
+    </a:fmtScheme>
+  </a:themeElements>
+</a:theme>
 </file>
</xml_diff>

<commit_message>
Updated with input from JV.
</commit_message>
<xml_diff>
--- a/Meeting20150425/Lack of manpower.pptx
+++ b/Meeting20150425/Lack of manpower.pptx
@@ -30587,7 +30587,7 @@
             </a:pPr>
             <a:r>
               <a:rPr lang="nl"/>
-              <a:t>Issues, testing: ?</a:t>
+              <a:t>Issues, testing: WDM</a:t>
             </a:r>
           </a:p>
           <a:p>
@@ -30611,7 +30611,7 @@
             </a:pPr>
             <a:r>
               <a:rPr lang="nl"/>
-              <a:t>Documentation: ?</a:t>
+              <a:t>Documentation: JV</a:t>
             </a:r>
           </a:p>
           <a:p>
@@ -30986,7 +30986,7 @@
             <a:tbl>
               <a:tblPr>
                 <a:noFill/>
-                <a:tableStyleId>{74A7E921-0417-467D-9B8B-25A46C2A682C}</a:tableStyleId>
+                <a:tableStyleId>{1EBCD317-E828-41EE-8CC0-C0311EC78576}</a:tableStyleId>
               </a:tblPr>
               <a:tblGrid>
                 <a:gridCol w="3619500"/>
@@ -31535,7 +31535,7 @@
             <a:tbl>
               <a:tblPr>
                 <a:noFill/>
-                <a:tableStyleId>{CEFA2CBD-7663-4E6F-9BF5-A7E5B75E2F86}</a:tableStyleId>
+                <a:tableStyleId>{1731BCAC-4D57-4F2E-B953-940BAD70A9CB}</a:tableStyleId>
               </a:tblPr>
               <a:tblGrid>
                 <a:gridCol w="3619500"/>
@@ -31578,7 +31578,51 @@
                       </a:pPr>
                       <a:r>
                         <a:rPr lang="nl"/>
-                        <a:t>php:      mysql:      android:      iOS:</a:t>
+                        <a:t>php: </a:t>
+                      </a:r>
+                      <a:r>
+                        <a:rPr lang="nl">
+                          <a:solidFill>
+                            <a:srgbClr val="00FF00"/>
+                          </a:solidFill>
+                        </a:rPr>
+                        <a:t>V</a:t>
+                      </a:r>
+                      <a:r>
+                        <a:rPr lang="nl"/>
+                        <a:t>    mysql: </a:t>
+                      </a:r>
+                      <a:r>
+                        <a:rPr lang="nl">
+                          <a:solidFill>
+                            <a:srgbClr val="00FF00"/>
+                          </a:solidFill>
+                        </a:rPr>
+                        <a:t>V</a:t>
+                      </a:r>
+                      <a:r>
+                        <a:rPr lang="nl"/>
+                        <a:t>    android: </a:t>
+                      </a:r>
+                      <a:r>
+                        <a:rPr lang="nl">
+                          <a:solidFill>
+                            <a:srgbClr val="FF0000"/>
+                          </a:solidFill>
+                        </a:rPr>
+                        <a:t>X</a:t>
+                      </a:r>
+                      <a:r>
+                        <a:rPr lang="nl"/>
+                        <a:t>    iOS: </a:t>
+                      </a:r>
+                      <a:r>
+                        <a:rPr lang="nl">
+                          <a:solidFill>
+                            <a:srgbClr val="FF0000"/>
+                          </a:solidFill>
+                        </a:rPr>
+                        <a:t>X</a:t>
                       </a:r>
                     </a:p>
                   </a:txBody>
@@ -31621,9 +31665,13 @@
                         <a:buNone/>
                       </a:pPr>
                       <a:r>
-                        <a:t/>
+                        <a:rPr lang="nl">
+                          <a:solidFill>
+                            <a:srgbClr val="FF0000"/>
+                          </a:solidFill>
+                        </a:rPr>
+                        <a:t>X</a:t>
                       </a:r>
-                      <a:endParaRPr/>
                     </a:p>
                   </a:txBody>
                   <a:tcPr marT="91425" marB="91425" marR="91425" marL="91425"/>
@@ -31665,9 +31713,13 @@
                         <a:buNone/>
                       </a:pPr>
                       <a:r>
-                        <a:t/>
+                        <a:rPr lang="nl">
+                          <a:solidFill>
+                            <a:srgbClr val="00FF00"/>
+                          </a:solidFill>
+                        </a:rPr>
+                        <a:t>V</a:t>
                       </a:r>
-                      <a:endParaRPr/>
                     </a:p>
                   </a:txBody>
                   <a:tcPr marT="91425" marB="91425" marR="91425" marL="91425"/>
@@ -31709,9 +31761,13 @@
                         <a:buNone/>
                       </a:pPr>
                       <a:r>
-                        <a:t/>
+                        <a:rPr lang="nl">
+                          <a:solidFill>
+                            <a:srgbClr val="00FF00"/>
+                          </a:solidFill>
+                        </a:rPr>
+                        <a:t>V (help if needed)</a:t>
                       </a:r>
-                      <a:endParaRPr/>
                     </a:p>
                   </a:txBody>
                   <a:tcPr marT="91425" marB="91425" marR="91425" marL="91425"/>
@@ -31753,9 +31809,13 @@
                         <a:buNone/>
                       </a:pPr>
                       <a:r>
-                        <a:t/>
+                        <a:rPr lang="nl">
+                          <a:solidFill>
+                            <a:srgbClr val="00FF00"/>
+                          </a:solidFill>
+                        </a:rPr>
+                        <a:t>V (lead)</a:t>
                       </a:r>
-                      <a:endParaRPr/>
                     </a:p>
                   </a:txBody>
                   <a:tcPr marT="91425" marB="91425" marR="91425" marL="91425"/>
@@ -31797,9 +31857,13 @@
                         <a:buNone/>
                       </a:pPr>
                       <a:r>
-                        <a:t/>
+                        <a:rPr lang="nl">
+                          <a:solidFill>
+                            <a:srgbClr val="00FF00"/>
+                          </a:solidFill>
+                        </a:rPr>
+                        <a:t>V (help if needed)</a:t>
                       </a:r>
-                      <a:endParaRPr/>
                     </a:p>
                   </a:txBody>
                   <a:tcPr marT="91425" marB="91425" marR="91425" marL="91425"/>
@@ -31841,9 +31905,13 @@
                         <a:buNone/>
                       </a:pPr>
                       <a:r>
-                        <a:t/>
+                        <a:rPr lang="nl">
+                          <a:solidFill>
+                            <a:srgbClr val="FF0000"/>
+                          </a:solidFill>
+                        </a:rPr>
+                        <a:t>X</a:t>
                       </a:r>
-                      <a:endParaRPr/>
                     </a:p>
                   </a:txBody>
                   <a:tcPr marT="91425" marB="91425" marR="91425" marL="91425"/>
@@ -31885,9 +31953,13 @@
                         <a:buNone/>
                       </a:pPr>
                       <a:r>
-                        <a:t/>
+                        <a:rPr lang="nl">
+                          <a:solidFill>
+                            <a:srgbClr val="FF0000"/>
+                          </a:solidFill>
+                        </a:rPr>
+                        <a:t>X</a:t>
                       </a:r>
-                      <a:endParaRPr/>
                     </a:p>
                   </a:txBody>
                   <a:tcPr marT="91425" marB="91425" marR="91425" marL="91425"/>
@@ -32012,7 +32084,7 @@
             <a:tbl>
               <a:tblPr>
                 <a:noFill/>
-                <a:tableStyleId>{370CA6A3-20E6-44DB-8BEA-1AB1B5C0B98B}</a:tableStyleId>
+                <a:tableStyleId>{A17ACE61-63B7-4C22-BC67-27DF884F3ADB}</a:tableStyleId>
               </a:tblPr>
               <a:tblGrid>
                 <a:gridCol w="3619500"/>
@@ -32561,7 +32633,7 @@
             <a:tbl>
               <a:tblPr>
                 <a:noFill/>
-                <a:tableStyleId>{AEC17936-EF52-4E24-A24C-4DE43B5B8821}</a:tableStyleId>
+                <a:tableStyleId>{D51A1A8B-55C1-4ED9-99D8-70F084F7588C}</a:tableStyleId>
               </a:tblPr>
               <a:tblGrid>
                 <a:gridCol w="3619500"/>
@@ -33110,7 +33182,7 @@
             <a:tbl>
               <a:tblPr>
                 <a:noFill/>
-                <a:tableStyleId>{E9C474D2-7911-4D35-941D-62661E617DA9}</a:tableStyleId>
+                <a:tableStyleId>{7444AEFA-2A1F-4F30-A139-486497A01289}</a:tableStyleId>
               </a:tblPr>
               <a:tblGrid>
                 <a:gridCol w="3619500"/>
@@ -33663,7 +33735,7 @@
             <a:tbl>
               <a:tblPr>
                 <a:noFill/>
-                <a:tableStyleId>{CBA9D62B-E1C9-4A0A-9ECA-1DF94E962977}</a:tableStyleId>
+                <a:tableStyleId>{0E44AA97-3424-4374-A8FB-E775D61B3678}</a:tableStyleId>
               </a:tblPr>
               <a:tblGrid>
                 <a:gridCol w="3619500"/>
@@ -34212,7 +34284,7 @@
             <a:tbl>
               <a:tblPr>
                 <a:noFill/>
-                <a:tableStyleId>{9118E077-9E5F-4F53-B292-786B41F7A164}</a:tableStyleId>
+                <a:tableStyleId>{C8CBF6B2-49A8-4E8C-A199-C844A431BDE1}</a:tableStyleId>
               </a:tblPr>
               <a:tblGrid>
                 <a:gridCol w="3619500"/>
@@ -34761,7 +34833,7 @@
             <a:tbl>
               <a:tblPr>
                 <a:noFill/>
-                <a:tableStyleId>{B8862038-043A-4A16-937A-3D66B32ABABE}</a:tableStyleId>
+                <a:tableStyleId>{AC96FA11-6433-4FBF-AA9C-EB771D7967E2}</a:tableStyleId>
               </a:tblPr>
               <a:tblGrid>
                 <a:gridCol w="3619500"/>
@@ -35472,6 +35544,283 @@
 </file>
 
 <file path=ppt/theme/theme2.xml><?xml version="1.0" encoding="utf-8"?>
+<a:theme xmlns:a="http://schemas.openxmlformats.org/drawingml/2006/main" xmlns:r="http://schemas.openxmlformats.org/officeDocument/2006/relationships" name="sketched">
+  <a:themeElements>
+    <a:clrScheme name="Custom 398">
+      <a:dk1>
+        <a:srgbClr val="000000"/>
+      </a:dk1>
+      <a:lt1>
+        <a:srgbClr val="FFFFFF"/>
+      </a:lt1>
+      <a:dk2>
+        <a:srgbClr val="51535D"/>
+      </a:dk2>
+      <a:lt2>
+        <a:srgbClr val="EDEDED"/>
+      </a:lt2>
+      <a:accent1>
+        <a:srgbClr val="676871"/>
+      </a:accent1>
+      <a:accent2>
+        <a:srgbClr val="988489"/>
+      </a:accent2>
+      <a:accent3>
+        <a:srgbClr val="6B7B67"/>
+      </a:accent3>
+      <a:accent4>
+        <a:srgbClr val="747B85"/>
+      </a:accent4>
+      <a:accent5>
+        <a:srgbClr val="A5A9AF"/>
+      </a:accent5>
+      <a:accent6>
+        <a:srgbClr val="85716D"/>
+      </a:accent6>
+      <a:hlink>
+        <a:srgbClr val="676871"/>
+      </a:hlink>
+      <a:folHlink>
+        <a:srgbClr val="3F414A"/>
+      </a:folHlink>
+    </a:clrScheme>
+    <a:fontScheme name="Office">
+      <a:majorFont>
+        <a:latin typeface="Arial"/>
+        <a:ea typeface=""/>
+        <a:cs typeface=""/>
+        <a:font script="Jpan" typeface="ＭＳ Ｐゴシック"/>
+        <a:font script="Hang" typeface="맑은 고딕"/>
+        <a:font script="Hans" typeface="宋体"/>
+        <a:font script="Hant" typeface="新細明體"/>
+        <a:font script="Arab" typeface="Times New Roman"/>
+        <a:font script="Hebr" typeface="Times New Roman"/>
+        <a:font script="Thai" typeface="Angsana New"/>
+        <a:font script="Ethi" typeface="Nyala"/>
+        <a:font script="Beng" typeface="Vrinda"/>
+        <a:font script="Gujr" typeface="Shruti"/>
+        <a:font script="Khmr" typeface="MoolBoran"/>
+        <a:font script="Knda" typeface="Tunga"/>
+        <a:font script="Guru" typeface="Raavi"/>
+        <a:font script="Cans" typeface="Euphemia"/>
+        <a:font script="Cher" typeface="Plantagenet Cherokee"/>
+        <a:font script="Yiii" typeface="Microsoft Yi Baiti"/>
+        <a:font script="Tibt" typeface="Microsoft Himalaya"/>
+        <a:font script="Thaa" typeface="MV Boli"/>
+        <a:font script="Deva" typeface="Mangal"/>
+        <a:font script="Telu" typeface="Gautami"/>
+        <a:font script="Taml" typeface="Latha"/>
+        <a:font script="Syrc" typeface="Estrangelo Edessa"/>
+        <a:font script="Orya" typeface="Kalinga"/>
+        <a:font script="Mlym" typeface="Kartika"/>
+        <a:font script="Laoo" typeface="DokChampa"/>
+        <a:font script="Sinh" typeface="Iskoola Pota"/>
+        <a:font script="Mong" typeface="Mongolian Baiti"/>
+        <a:font script="Viet" typeface="Times New Roman"/>
+        <a:font script="Uigh" typeface="Microsoft Uighur"/>
+      </a:majorFont>
+      <a:minorFont>
+        <a:latin typeface="Arial"/>
+        <a:ea typeface=""/>
+        <a:cs typeface=""/>
+        <a:font script="Jpan" typeface="ＭＳ Ｐゴシック"/>
+        <a:font script="Hang" typeface="맑은 고딕"/>
+        <a:font script="Hans" typeface="宋体"/>
+        <a:font script="Hant" typeface="新細明體"/>
+        <a:font script="Arab" typeface="Times New Roman"/>
+        <a:font script="Hebr" typeface="Times New Roman"/>
+        <a:font script="Thai" typeface="Angsana New"/>
+        <a:font script="Ethi" typeface="Nyala"/>
+        <a:font script="Beng" typeface="Vrinda"/>
+        <a:font script="Gujr" typeface="Shruti"/>
+        <a:font script="Khmr" typeface="MoolBoran"/>
+        <a:font script="Knda" typeface="Tunga"/>
+        <a:font script="Guru" typeface="Raavi"/>
+        <a:font script="Cans" typeface="Euphemia"/>
+        <a:font script="Cher" typeface="Plantagenet Cherokee"/>
+        <a:font script="Yiii" typeface="Microsoft Yi Baiti"/>
+        <a:font script="Tibt" typeface="Microsoft Himalaya"/>
+        <a:font script="Thaa" typeface="MV Boli"/>
+        <a:font script="Deva" typeface="Mangal"/>
+        <a:font script="Telu" typeface="Gautami"/>
+        <a:font script="Taml" typeface="Latha"/>
+        <a:font script="Syrc" typeface="Estrangelo Edessa"/>
+        <a:font script="Orya" typeface="Kalinga"/>
+        <a:font script="Mlym" typeface="Kartika"/>
+        <a:font script="Laoo" typeface="DokChampa"/>
+        <a:font script="Sinh" typeface="Iskoola Pota"/>
+        <a:font script="Mong" typeface="Mongolian Baiti"/>
+        <a:font script="Viet" typeface="Times New Roman"/>
+        <a:font script="Uigh" typeface="Microsoft Uighur"/>
+      </a:minorFont>
+    </a:fontScheme>
+    <a:fmtScheme name="Office">
+      <a:fillStyleLst>
+        <a:solidFill>
+          <a:schemeClr val="phClr"/>
+        </a:solidFill>
+        <a:gradFill rotWithShape="1">
+          <a:gsLst>
+            <a:gs pos="0">
+              <a:schemeClr val="phClr">
+                <a:tint val="50000"/>
+                <a:satMod val="300000"/>
+              </a:schemeClr>
+            </a:gs>
+            <a:gs pos="35000">
+              <a:schemeClr val="phClr">
+                <a:tint val="37000"/>
+                <a:satMod val="300000"/>
+              </a:schemeClr>
+            </a:gs>
+            <a:gs pos="100000">
+              <a:schemeClr val="phClr">
+                <a:tint val="15000"/>
+                <a:satMod val="350000"/>
+              </a:schemeClr>
+            </a:gs>
+          </a:gsLst>
+          <a:lin ang="16200000" scaled="1"/>
+        </a:gradFill>
+        <a:gradFill rotWithShape="1">
+          <a:gsLst>
+            <a:gs pos="0">
+              <a:schemeClr val="phClr">
+                <a:tint val="100000"/>
+                <a:shade val="100000"/>
+                <a:satMod val="130000"/>
+              </a:schemeClr>
+            </a:gs>
+            <a:gs pos="100000">
+              <a:schemeClr val="phClr">
+                <a:tint val="50000"/>
+                <a:shade val="100000"/>
+                <a:satMod val="350000"/>
+              </a:schemeClr>
+            </a:gs>
+          </a:gsLst>
+          <a:lin ang="16200000" scaled="0"/>
+        </a:gradFill>
+      </a:fillStyleLst>
+      <a:lnStyleLst>
+        <a:ln cap="flat" cmpd="sng" w="9525" algn="ctr">
+          <a:solidFill>
+            <a:schemeClr val="phClr">
+              <a:shade val="95000"/>
+              <a:satMod val="105000"/>
+            </a:schemeClr>
+          </a:solidFill>
+          <a:prstDash val="solid"/>
+        </a:ln>
+        <a:ln cap="flat" cmpd="sng" w="25400" algn="ctr">
+          <a:solidFill>
+            <a:schemeClr val="phClr"/>
+          </a:solidFill>
+          <a:prstDash val="solid"/>
+        </a:ln>
+        <a:ln cap="flat" cmpd="sng" w="38100" algn="ctr">
+          <a:solidFill>
+            <a:schemeClr val="phClr"/>
+          </a:solidFill>
+          <a:prstDash val="solid"/>
+        </a:ln>
+      </a:lnStyleLst>
+      <a:effectStyleLst>
+        <a:effectStyle>
+          <a:effectLst>
+            <a:outerShdw blurRad="40000" rotWithShape="0" dir="5400000" dist="20000">
+              <a:srgbClr val="000000">
+                <a:alpha val="38000"/>
+              </a:srgbClr>
+            </a:outerShdw>
+          </a:effectLst>
+        </a:effectStyle>
+        <a:effectStyle>
+          <a:effectLst>
+            <a:outerShdw blurRad="40000" rotWithShape="0" dir="5400000" dist="23000">
+              <a:srgbClr val="000000">
+                <a:alpha val="35000"/>
+              </a:srgbClr>
+            </a:outerShdw>
+          </a:effectLst>
+        </a:effectStyle>
+        <a:effectStyle>
+          <a:effectLst>
+            <a:outerShdw blurRad="40000" rotWithShape="0" dir="5400000" dist="23000">
+              <a:srgbClr val="000000">
+                <a:alpha val="35000"/>
+              </a:srgbClr>
+            </a:outerShdw>
+          </a:effectLst>
+          <a:scene3d>
+            <a:camera prst="orthographicFront">
+              <a:rot lat="0" lon="0" rev="0"/>
+            </a:camera>
+            <a:lightRig dir="t" rig="threePt">
+              <a:rot lat="0" lon="0" rev="1200000"/>
+            </a:lightRig>
+          </a:scene3d>
+          <a:sp3d>
+            <a:bevelT h="25400" w="63500"/>
+          </a:sp3d>
+        </a:effectStyle>
+      </a:effectStyleLst>
+      <a:bgFillStyleLst>
+        <a:solidFill>
+          <a:schemeClr val="phClr"/>
+        </a:solidFill>
+        <a:gradFill rotWithShape="1">
+          <a:gsLst>
+            <a:gs pos="0">
+              <a:schemeClr val="phClr">
+                <a:tint val="40000"/>
+                <a:satMod val="350000"/>
+              </a:schemeClr>
+            </a:gs>
+            <a:gs pos="40000">
+              <a:schemeClr val="phClr">
+                <a:tint val="45000"/>
+                <a:shade val="99000"/>
+                <a:satMod val="350000"/>
+              </a:schemeClr>
+            </a:gs>
+            <a:gs pos="100000">
+              <a:schemeClr val="phClr">
+                <a:shade val="20000"/>
+                <a:satMod val="255000"/>
+              </a:schemeClr>
+            </a:gs>
+          </a:gsLst>
+          <a:path path="circle">
+            <a:fillToRect b="180000" l="50000" r="50000" t="-80000"/>
+          </a:path>
+        </a:gradFill>
+        <a:gradFill rotWithShape="1">
+          <a:gsLst>
+            <a:gs pos="0">
+              <a:schemeClr val="phClr">
+                <a:tint val="80000"/>
+                <a:satMod val="300000"/>
+              </a:schemeClr>
+            </a:gs>
+            <a:gs pos="100000">
+              <a:schemeClr val="phClr">
+                <a:shade val="30000"/>
+                <a:satMod val="200000"/>
+              </a:schemeClr>
+            </a:gs>
+          </a:gsLst>
+          <a:path path="circle">
+            <a:fillToRect b="50000" l="50000" r="50000" t="50000"/>
+          </a:path>
+        </a:gradFill>
+      </a:bgFillStyleLst>
+    </a:fmtScheme>
+  </a:themeElements>
+</a:theme>
+</file>
+
+<file path=ppt/theme/theme3.xml><?xml version="1.0" encoding="utf-8"?>
 <a:theme xmlns:a="http://schemas.openxmlformats.org/drawingml/2006/main" xmlns:r="http://schemas.openxmlformats.org/officeDocument/2006/relationships" name="Office Theme">
   <a:themeElements>
     <a:clrScheme name="Office">
@@ -35786,281 +36135,4 @@
     </a:lnDef>
   </a:objectDefaults>
 </a:theme>
-</file>
-
-<file path=ppt/theme/theme3.xml><?xml version="1.0" encoding="utf-8"?>
-<a:theme xmlns:a="http://schemas.openxmlformats.org/drawingml/2006/main" xmlns:r="http://schemas.openxmlformats.org/officeDocument/2006/relationships" name="sketched">
-  <a:themeElements>
-    <a:clrScheme name="Custom 398">
-      <a:dk1>
-        <a:srgbClr val="000000"/>
-      </a:dk1>
-      <a:lt1>
-        <a:srgbClr val="FFFFFF"/>
-      </a:lt1>
-      <a:dk2>
-        <a:srgbClr val="51535D"/>
-      </a:dk2>
-      <a:lt2>
-        <a:srgbClr val="EDEDED"/>
-      </a:lt2>
-      <a:accent1>
-        <a:srgbClr val="676871"/>
-      </a:accent1>
-      <a:accent2>
-        <a:srgbClr val="988489"/>
-      </a:accent2>
-      <a:accent3>
-        <a:srgbClr val="6B7B67"/>
-      </a:accent3>
-      <a:accent4>
-        <a:srgbClr val="747B85"/>
-      </a:accent4>
-      <a:accent5>
-        <a:srgbClr val="A5A9AF"/>
-      </a:accent5>
-      <a:accent6>
-        <a:srgbClr val="85716D"/>
-      </a:accent6>
-      <a:hlink>
-        <a:srgbClr val="676871"/>
-      </a:hlink>
-      <a:folHlink>
-        <a:srgbClr val="3F414A"/>
-      </a:folHlink>
-    </a:clrScheme>
-    <a:fontScheme name="Office">
-      <a:majorFont>
-        <a:latin typeface="Arial"/>
-        <a:ea typeface=""/>
-        <a:cs typeface=""/>
-        <a:font script="Jpan" typeface="ＭＳ Ｐゴシック"/>
-        <a:font script="Hang" typeface="맑은 고딕"/>
-        <a:font script="Hans" typeface="宋体"/>
-        <a:font script="Hant" typeface="新細明體"/>
-        <a:font script="Arab" typeface="Times New Roman"/>
-        <a:font script="Hebr" typeface="Times New Roman"/>
-        <a:font script="Thai" typeface="Angsana New"/>
-        <a:font script="Ethi" typeface="Nyala"/>
-        <a:font script="Beng" typeface="Vrinda"/>
-        <a:font script="Gujr" typeface="Shruti"/>
-        <a:font script="Khmr" typeface="MoolBoran"/>
-        <a:font script="Knda" typeface="Tunga"/>
-        <a:font script="Guru" typeface="Raavi"/>
-        <a:font script="Cans" typeface="Euphemia"/>
-        <a:font script="Cher" typeface="Plantagenet Cherokee"/>
-        <a:font script="Yiii" typeface="Microsoft Yi Baiti"/>
-        <a:font script="Tibt" typeface="Microsoft Himalaya"/>
-        <a:font script="Thaa" typeface="MV Boli"/>
-        <a:font script="Deva" typeface="Mangal"/>
-        <a:font script="Telu" typeface="Gautami"/>
-        <a:font script="Taml" typeface="Latha"/>
-        <a:font script="Syrc" typeface="Estrangelo Edessa"/>
-        <a:font script="Orya" typeface="Kalinga"/>
-        <a:font script="Mlym" typeface="Kartika"/>
-        <a:font script="Laoo" typeface="DokChampa"/>
-        <a:font script="Sinh" typeface="Iskoola Pota"/>
-        <a:font script="Mong" typeface="Mongolian Baiti"/>
-        <a:font script="Viet" typeface="Times New Roman"/>
-        <a:font script="Uigh" typeface="Microsoft Uighur"/>
-      </a:majorFont>
-      <a:minorFont>
-        <a:latin typeface="Arial"/>
-        <a:ea typeface=""/>
-        <a:cs typeface=""/>
-        <a:font script="Jpan" typeface="ＭＳ Ｐゴシック"/>
-        <a:font script="Hang" typeface="맑은 고딕"/>
-        <a:font script="Hans" typeface="宋体"/>
-        <a:font script="Hant" typeface="新細明體"/>
-        <a:font script="Arab" typeface="Times New Roman"/>
-        <a:font script="Hebr" typeface="Times New Roman"/>
-        <a:font script="Thai" typeface="Angsana New"/>
-        <a:font script="Ethi" typeface="Nyala"/>
-        <a:font script="Beng" typeface="Vrinda"/>
-        <a:font script="Gujr" typeface="Shruti"/>
-        <a:font script="Khmr" typeface="MoolBoran"/>
-        <a:font script="Knda" typeface="Tunga"/>
-        <a:font script="Guru" typeface="Raavi"/>
-        <a:font script="Cans" typeface="Euphemia"/>
-        <a:font script="Cher" typeface="Plantagenet Cherokee"/>
-        <a:font script="Yiii" typeface="Microsoft Yi Baiti"/>
-        <a:font script="Tibt" typeface="Microsoft Himalaya"/>
-        <a:font script="Thaa" typeface="MV Boli"/>
-        <a:font script="Deva" typeface="Mangal"/>
-        <a:font script="Telu" typeface="Gautami"/>
-        <a:font script="Taml" typeface="Latha"/>
-        <a:font script="Syrc" typeface="Estrangelo Edessa"/>
-        <a:font script="Orya" typeface="Kalinga"/>
-        <a:font script="Mlym" typeface="Kartika"/>
-        <a:font script="Laoo" typeface="DokChampa"/>
-        <a:font script="Sinh" typeface="Iskoola Pota"/>
-        <a:font script="Mong" typeface="Mongolian Baiti"/>
-        <a:font script="Viet" typeface="Times New Roman"/>
-        <a:font script="Uigh" typeface="Microsoft Uighur"/>
-      </a:minorFont>
-    </a:fontScheme>
-    <a:fmtScheme name="Office">
-      <a:fillStyleLst>
-        <a:solidFill>
-          <a:schemeClr val="phClr"/>
-        </a:solidFill>
-        <a:gradFill rotWithShape="1">
-          <a:gsLst>
-            <a:gs pos="0">
-              <a:schemeClr val="phClr">
-                <a:tint val="50000"/>
-                <a:satMod val="300000"/>
-              </a:schemeClr>
-            </a:gs>
-            <a:gs pos="35000">
-              <a:schemeClr val="phClr">
-                <a:tint val="37000"/>
-                <a:satMod val="300000"/>
-              </a:schemeClr>
-            </a:gs>
-            <a:gs pos="100000">
-              <a:schemeClr val="phClr">
-                <a:tint val="15000"/>
-                <a:satMod val="350000"/>
-              </a:schemeClr>
-            </a:gs>
-          </a:gsLst>
-          <a:lin ang="16200000" scaled="1"/>
-        </a:gradFill>
-        <a:gradFill rotWithShape="1">
-          <a:gsLst>
-            <a:gs pos="0">
-              <a:schemeClr val="phClr">
-                <a:tint val="100000"/>
-                <a:shade val="100000"/>
-                <a:satMod val="130000"/>
-              </a:schemeClr>
-            </a:gs>
-            <a:gs pos="100000">
-              <a:schemeClr val="phClr">
-                <a:tint val="50000"/>
-                <a:shade val="100000"/>
-                <a:satMod val="350000"/>
-              </a:schemeClr>
-            </a:gs>
-          </a:gsLst>
-          <a:lin ang="16200000" scaled="0"/>
-        </a:gradFill>
-      </a:fillStyleLst>
-      <a:lnStyleLst>
-        <a:ln cap="flat" cmpd="sng" w="9525" algn="ctr">
-          <a:solidFill>
-            <a:schemeClr val="phClr">
-              <a:shade val="95000"/>
-              <a:satMod val="105000"/>
-            </a:schemeClr>
-          </a:solidFill>
-          <a:prstDash val="solid"/>
-        </a:ln>
-        <a:ln cap="flat" cmpd="sng" w="25400" algn="ctr">
-          <a:solidFill>
-            <a:schemeClr val="phClr"/>
-          </a:solidFill>
-          <a:prstDash val="solid"/>
-        </a:ln>
-        <a:ln cap="flat" cmpd="sng" w="38100" algn="ctr">
-          <a:solidFill>
-            <a:schemeClr val="phClr"/>
-          </a:solidFill>
-          <a:prstDash val="solid"/>
-        </a:ln>
-      </a:lnStyleLst>
-      <a:effectStyleLst>
-        <a:effectStyle>
-          <a:effectLst>
-            <a:outerShdw blurRad="40000" rotWithShape="0" dir="5400000" dist="20000">
-              <a:srgbClr val="000000">
-                <a:alpha val="38000"/>
-              </a:srgbClr>
-            </a:outerShdw>
-          </a:effectLst>
-        </a:effectStyle>
-        <a:effectStyle>
-          <a:effectLst>
-            <a:outerShdw blurRad="40000" rotWithShape="0" dir="5400000" dist="23000">
-              <a:srgbClr val="000000">
-                <a:alpha val="35000"/>
-              </a:srgbClr>
-            </a:outerShdw>
-          </a:effectLst>
-        </a:effectStyle>
-        <a:effectStyle>
-          <a:effectLst>
-            <a:outerShdw blurRad="40000" rotWithShape="0" dir="5400000" dist="23000">
-              <a:srgbClr val="000000">
-                <a:alpha val="35000"/>
-              </a:srgbClr>
-            </a:outerShdw>
-          </a:effectLst>
-          <a:scene3d>
-            <a:camera prst="orthographicFront">
-              <a:rot lat="0" lon="0" rev="0"/>
-            </a:camera>
-            <a:lightRig dir="t" rig="threePt">
-              <a:rot lat="0" lon="0" rev="1200000"/>
-            </a:lightRig>
-          </a:scene3d>
-          <a:sp3d>
-            <a:bevelT h="25400" w="63500"/>
-          </a:sp3d>
-        </a:effectStyle>
-      </a:effectStyleLst>
-      <a:bgFillStyleLst>
-        <a:solidFill>
-          <a:schemeClr val="phClr"/>
-        </a:solidFill>
-        <a:gradFill rotWithShape="1">
-          <a:gsLst>
-            <a:gs pos="0">
-              <a:schemeClr val="phClr">
-                <a:tint val="40000"/>
-                <a:satMod val="350000"/>
-              </a:schemeClr>
-            </a:gs>
-            <a:gs pos="40000">
-              <a:schemeClr val="phClr">
-                <a:tint val="45000"/>
-                <a:shade val="99000"/>
-                <a:satMod val="350000"/>
-              </a:schemeClr>
-            </a:gs>
-            <a:gs pos="100000">
-              <a:schemeClr val="phClr">
-                <a:shade val="20000"/>
-                <a:satMod val="255000"/>
-              </a:schemeClr>
-            </a:gs>
-          </a:gsLst>
-          <a:path path="circle">
-            <a:fillToRect b="180000" l="50000" r="50000" t="-80000"/>
-          </a:path>
-        </a:gradFill>
-        <a:gradFill rotWithShape="1">
-          <a:gsLst>
-            <a:gs pos="0">
-              <a:schemeClr val="phClr">
-                <a:tint val="80000"/>
-                <a:satMod val="300000"/>
-              </a:schemeClr>
-            </a:gs>
-            <a:gs pos="100000">
-              <a:schemeClr val="phClr">
-                <a:shade val="30000"/>
-                <a:satMod val="200000"/>
-              </a:schemeClr>
-            </a:gs>
-          </a:gsLst>
-          <a:path path="circle">
-            <a:fillToRect b="50000" l="50000" r="50000" t="50000"/>
-          </a:path>
-        </a:gradFill>
-      </a:bgFillStyleLst>
-    </a:fmtScheme>
-  </a:themeElements>
-</a:theme>
 </file>
</xml_diff>